<commit_message>
Worked on metagol presentation
</commit_message>
<xml_diff>
--- a/ATAI_Presentation.pptx
+++ b/ATAI_Presentation.pptx
@@ -9,6 +9,13 @@
     <p:sldId id="260" r:id="rId3"/>
     <p:sldId id="258" r:id="rId4"/>
     <p:sldId id="259" r:id="rId5"/>
+    <p:sldId id="261" r:id="rId6"/>
+    <p:sldId id="262" r:id="rId7"/>
+    <p:sldId id="263" r:id="rId8"/>
+    <p:sldId id="264" r:id="rId9"/>
+    <p:sldId id="265" r:id="rId10"/>
+    <p:sldId id="266" r:id="rId11"/>
+    <p:sldId id="267" r:id="rId12"/>
   </p:sldIdLst>
   <p:sldSz cx="12192000" cy="6858000"/>
   <p:notesSz cx="6858000" cy="9144000"/>
@@ -118,7 +125,7 @@
 <file path=ppt/revisionInfo.xml><?xml version="1.0" encoding="utf-8"?>
 <p1510:revInfo xmlns:a="http://schemas.openxmlformats.org/drawingml/2006/main" xmlns:r="http://schemas.openxmlformats.org/officeDocument/2006/relationships" xmlns:p1510="http://schemas.microsoft.com/office/powerpoint/2015/10/main">
   <p1510:revLst>
-    <p1510:client id="{AB8C1610-9B0F-4A3A-96F9-A0FB1F9855A7}" v="149" dt="2021-07-01T15:12:46.962"/>
+    <p1510:client id="{AB8C1610-9B0F-4A3A-96F9-A0FB1F9855A7}" v="156" dt="2021-07-02T15:39:33.245"/>
   </p1510:revLst>
 </p1510:revInfo>
 </file>
@@ -127,8 +134,8 @@
 <pc:chgInfo xmlns:a="http://schemas.openxmlformats.org/drawingml/2006/main" xmlns:r="http://schemas.openxmlformats.org/officeDocument/2006/relationships" xmlns:ac="http://schemas.microsoft.com/office/drawing/2013/main/command" xmlns:pc="http://schemas.microsoft.com/office/powerpoint/2013/main/command">
   <pc:docChgLst>
     <pc:chgData name="Al ex" userId="1d73023b5acb93cf" providerId="LiveId" clId="{AB8C1610-9B0F-4A3A-96F9-A0FB1F9855A7}"/>
-    <pc:docChg chg="undo custSel addSld delSld modSld sldOrd addMainMaster delMainMaster">
-      <pc:chgData name="Al ex" userId="1d73023b5acb93cf" providerId="LiveId" clId="{AB8C1610-9B0F-4A3A-96F9-A0FB1F9855A7}" dt="2021-07-01T15:30:52.411" v="1804" actId="20577"/>
+    <pc:docChg chg="undo redo custSel addSld delSld modSld sldOrd addMainMaster delMainMaster modMainMaster">
+      <pc:chgData name="Al ex" userId="1d73023b5acb93cf" providerId="LiveId" clId="{AB8C1610-9B0F-4A3A-96F9-A0FB1F9855A7}" dt="2021-07-02T15:43:13.266" v="4707" actId="20577"/>
       <pc:docMkLst>
         <pc:docMk/>
       </pc:docMkLst>
@@ -304,7 +311,7 @@
         </pc:spChg>
       </pc:sldChg>
       <pc:sldChg chg="addSp delSp modSp new mod ord setBg">
-        <pc:chgData name="Al ex" userId="1d73023b5acb93cf" providerId="LiveId" clId="{AB8C1610-9B0F-4A3A-96F9-A0FB1F9855A7}" dt="2021-07-01T15:13:02.588" v="881" actId="122"/>
+        <pc:chgData name="Al ex" userId="1d73023b5acb93cf" providerId="LiveId" clId="{AB8C1610-9B0F-4A3A-96F9-A0FB1F9855A7}" dt="2021-07-02T15:34:50.659" v="4003"/>
         <pc:sldMkLst>
           <pc:docMk/>
           <pc:sldMk cId="4057583148" sldId="260"/>
@@ -406,94 +413,383 @@
           </ac:picMkLst>
         </pc:picChg>
       </pc:sldChg>
-      <pc:sldMasterChg chg="add del addSldLayout delSldLayout">
-        <pc:chgData name="Al ex" userId="1d73023b5acb93cf" providerId="LiveId" clId="{AB8C1610-9B0F-4A3A-96F9-A0FB1F9855A7}" dt="2021-07-01T08:07:51.280" v="65" actId="26606"/>
+      <pc:sldChg chg="addSp delSp modSp new mod modClrScheme chgLayout">
+        <pc:chgData name="Al ex" userId="1d73023b5acb93cf" providerId="LiveId" clId="{AB8C1610-9B0F-4A3A-96F9-A0FB1F9855A7}" dt="2021-07-02T14:51:28.823" v="1819" actId="700"/>
+        <pc:sldMkLst>
+          <pc:docMk/>
+          <pc:sldMk cId="2213073460" sldId="261"/>
+        </pc:sldMkLst>
+        <pc:spChg chg="del mod ord">
+          <ac:chgData name="Al ex" userId="1d73023b5acb93cf" providerId="LiveId" clId="{AB8C1610-9B0F-4A3A-96F9-A0FB1F9855A7}" dt="2021-07-02T14:50:06.669" v="1806" actId="700"/>
+          <ac:spMkLst>
+            <pc:docMk/>
+            <pc:sldMk cId="2213073460" sldId="261"/>
+            <ac:spMk id="2" creationId="{25F7B09D-C634-4A36-851F-71CEF357B723}"/>
+          </ac:spMkLst>
+        </pc:spChg>
+        <pc:spChg chg="del">
+          <ac:chgData name="Al ex" userId="1d73023b5acb93cf" providerId="LiveId" clId="{AB8C1610-9B0F-4A3A-96F9-A0FB1F9855A7}" dt="2021-07-02T14:50:06.669" v="1806" actId="700"/>
+          <ac:spMkLst>
+            <pc:docMk/>
+            <pc:sldMk cId="2213073460" sldId="261"/>
+            <ac:spMk id="3" creationId="{C33479E6-07C8-4F6F-A4D5-9C5A3DAC9749}"/>
+          </ac:spMkLst>
+        </pc:spChg>
+        <pc:spChg chg="add mod ord">
+          <ac:chgData name="Al ex" userId="1d73023b5acb93cf" providerId="LiveId" clId="{AB8C1610-9B0F-4A3A-96F9-A0FB1F9855A7}" dt="2021-07-02T14:51:28.823" v="1819" actId="700"/>
+          <ac:spMkLst>
+            <pc:docMk/>
+            <pc:sldMk cId="2213073460" sldId="261"/>
+            <ac:spMk id="4" creationId="{C219A1C0-0B46-405B-A2A6-78424FE9EE86}"/>
+          </ac:spMkLst>
+        </pc:spChg>
+        <pc:spChg chg="add mod ord">
+          <ac:chgData name="Al ex" userId="1d73023b5acb93cf" providerId="LiveId" clId="{AB8C1610-9B0F-4A3A-96F9-A0FB1F9855A7}" dt="2021-07-02T14:51:28.823" v="1819" actId="700"/>
+          <ac:spMkLst>
+            <pc:docMk/>
+            <pc:sldMk cId="2213073460" sldId="261"/>
+            <ac:spMk id="5" creationId="{1B09F84D-3E3B-4CFC-B045-25FEB4890D73}"/>
+          </ac:spMkLst>
+        </pc:spChg>
+      </pc:sldChg>
+      <pc:sldChg chg="addSp delSp modSp new mod setBg">
+        <pc:chgData name="Al ex" userId="1d73023b5acb93cf" providerId="LiveId" clId="{AB8C1610-9B0F-4A3A-96F9-A0FB1F9855A7}" dt="2021-07-02T15:36:30.898" v="4068" actId="20577"/>
+        <pc:sldMkLst>
+          <pc:docMk/>
+          <pc:sldMk cId="2664905817" sldId="262"/>
+        </pc:sldMkLst>
+        <pc:spChg chg="mod">
+          <ac:chgData name="Al ex" userId="1d73023b5acb93cf" providerId="LiveId" clId="{AB8C1610-9B0F-4A3A-96F9-A0FB1F9855A7}" dt="2021-07-02T15:36:20.694" v="4065" actId="26606"/>
+          <ac:spMkLst>
+            <pc:docMk/>
+            <pc:sldMk cId="2664905817" sldId="262"/>
+            <ac:spMk id="2" creationId="{961205A0-A20A-460D-BF41-0547177EC004}"/>
+          </ac:spMkLst>
+        </pc:spChg>
+        <pc:spChg chg="mod">
+          <ac:chgData name="Al ex" userId="1d73023b5acb93cf" providerId="LiveId" clId="{AB8C1610-9B0F-4A3A-96F9-A0FB1F9855A7}" dt="2021-07-02T15:36:30.898" v="4068" actId="20577"/>
+          <ac:spMkLst>
+            <pc:docMk/>
+            <pc:sldMk cId="2664905817" sldId="262"/>
+            <ac:spMk id="3" creationId="{BCDD5A86-9E2C-47B9-9ED6-667DF1173A9E}"/>
+          </ac:spMkLst>
+        </pc:spChg>
+        <pc:spChg chg="add del">
+          <ac:chgData name="Al ex" userId="1d73023b5acb93cf" providerId="LiveId" clId="{AB8C1610-9B0F-4A3A-96F9-A0FB1F9855A7}" dt="2021-07-02T15:36:20.694" v="4065" actId="26606"/>
+          <ac:spMkLst>
+            <pc:docMk/>
+            <pc:sldMk cId="2664905817" sldId="262"/>
+            <ac:spMk id="9" creationId="{989683EB-D202-4B4D-B1BD-8BA6965FBEF5}"/>
+          </ac:spMkLst>
+        </pc:spChg>
+        <pc:spChg chg="add del">
+          <ac:chgData name="Al ex" userId="1d73023b5acb93cf" providerId="LiveId" clId="{AB8C1610-9B0F-4A3A-96F9-A0FB1F9855A7}" dt="2021-07-02T15:36:20.679" v="4064" actId="26606"/>
+          <ac:spMkLst>
+            <pc:docMk/>
+            <pc:sldMk cId="2664905817" sldId="262"/>
+            <ac:spMk id="14" creationId="{B4147794-66B7-4CDE-BC75-BBDC48B2FCEB}"/>
+          </ac:spMkLst>
+        </pc:spChg>
+        <pc:picChg chg="add mod ord">
+          <ac:chgData name="Al ex" userId="1d73023b5acb93cf" providerId="LiveId" clId="{AB8C1610-9B0F-4A3A-96F9-A0FB1F9855A7}" dt="2021-07-02T15:36:20.694" v="4065" actId="26606"/>
+          <ac:picMkLst>
+            <pc:docMk/>
+            <pc:sldMk cId="2664905817" sldId="262"/>
+            <ac:picMk id="4" creationId="{F5C4AB35-6373-45C6-8803-7349E7B6A6A9}"/>
+          </ac:picMkLst>
+        </pc:picChg>
+      </pc:sldChg>
+      <pc:sldChg chg="addSp modSp new mod setBg">
+        <pc:chgData name="Al ex" userId="1d73023b5acb93cf" providerId="LiveId" clId="{AB8C1610-9B0F-4A3A-96F9-A0FB1F9855A7}" dt="2021-07-02T15:35:50.853" v="4060" actId="27636"/>
+        <pc:sldMkLst>
+          <pc:docMk/>
+          <pc:sldMk cId="4194125777" sldId="263"/>
+        </pc:sldMkLst>
+        <pc:spChg chg="mod">
+          <ac:chgData name="Al ex" userId="1d73023b5acb93cf" providerId="LiveId" clId="{AB8C1610-9B0F-4A3A-96F9-A0FB1F9855A7}" dt="2021-07-02T15:35:50.841" v="4059" actId="26606"/>
+          <ac:spMkLst>
+            <pc:docMk/>
+            <pc:sldMk cId="4194125777" sldId="263"/>
+            <ac:spMk id="2" creationId="{0A12707C-3206-4993-9DBE-17D9EACB1C00}"/>
+          </ac:spMkLst>
+        </pc:spChg>
+        <pc:spChg chg="mod">
+          <ac:chgData name="Al ex" userId="1d73023b5acb93cf" providerId="LiveId" clId="{AB8C1610-9B0F-4A3A-96F9-A0FB1F9855A7}" dt="2021-07-02T15:35:50.853" v="4060" actId="27636"/>
+          <ac:spMkLst>
+            <pc:docMk/>
+            <pc:sldMk cId="4194125777" sldId="263"/>
+            <ac:spMk id="3" creationId="{D879B614-B7EF-4C41-B525-645B6994B712}"/>
+          </ac:spMkLst>
+        </pc:spChg>
+        <pc:spChg chg="add">
+          <ac:chgData name="Al ex" userId="1d73023b5acb93cf" providerId="LiveId" clId="{AB8C1610-9B0F-4A3A-96F9-A0FB1F9855A7}" dt="2021-07-02T15:35:50.841" v="4059" actId="26606"/>
+          <ac:spMkLst>
+            <pc:docMk/>
+            <pc:sldMk cId="4194125777" sldId="263"/>
+            <ac:spMk id="9" creationId="{989683EB-D202-4B4D-B1BD-8BA6965FBEF5}"/>
+          </ac:spMkLst>
+        </pc:spChg>
+        <pc:picChg chg="add mod ord">
+          <ac:chgData name="Al ex" userId="1d73023b5acb93cf" providerId="LiveId" clId="{AB8C1610-9B0F-4A3A-96F9-A0FB1F9855A7}" dt="2021-07-02T15:35:50.841" v="4059" actId="26606"/>
+          <ac:picMkLst>
+            <pc:docMk/>
+            <pc:sldMk cId="4194125777" sldId="263"/>
+            <ac:picMk id="4" creationId="{15FFD1B1-AEEE-4EE4-9047-6C67FEA2BDA9}"/>
+          </ac:picMkLst>
+        </pc:picChg>
+      </pc:sldChg>
+      <pc:sldChg chg="addSp modSp new mod setBg">
+        <pc:chgData name="Al ex" userId="1d73023b5acb93cf" providerId="LiveId" clId="{AB8C1610-9B0F-4A3A-96F9-A0FB1F9855A7}" dt="2021-07-02T15:35:47.341" v="4057" actId="26606"/>
+        <pc:sldMkLst>
+          <pc:docMk/>
+          <pc:sldMk cId="986449292" sldId="264"/>
+        </pc:sldMkLst>
+        <pc:spChg chg="mod">
+          <ac:chgData name="Al ex" userId="1d73023b5acb93cf" providerId="LiveId" clId="{AB8C1610-9B0F-4A3A-96F9-A0FB1F9855A7}" dt="2021-07-02T15:35:47.341" v="4057" actId="26606"/>
+          <ac:spMkLst>
+            <pc:docMk/>
+            <pc:sldMk cId="986449292" sldId="264"/>
+            <ac:spMk id="2" creationId="{77994A76-64F1-4AEE-BC4F-FB664D9A36F7}"/>
+          </ac:spMkLst>
+        </pc:spChg>
+        <pc:spChg chg="mod">
+          <ac:chgData name="Al ex" userId="1d73023b5acb93cf" providerId="LiveId" clId="{AB8C1610-9B0F-4A3A-96F9-A0FB1F9855A7}" dt="2021-07-02T15:35:47.341" v="4057" actId="26606"/>
+          <ac:spMkLst>
+            <pc:docMk/>
+            <pc:sldMk cId="986449292" sldId="264"/>
+            <ac:spMk id="3" creationId="{C7D1522B-DD16-4ED0-B890-B3427CE8EB23}"/>
+          </ac:spMkLst>
+        </pc:spChg>
+        <pc:spChg chg="add">
+          <ac:chgData name="Al ex" userId="1d73023b5acb93cf" providerId="LiveId" clId="{AB8C1610-9B0F-4A3A-96F9-A0FB1F9855A7}" dt="2021-07-02T15:35:47.341" v="4057" actId="26606"/>
+          <ac:spMkLst>
+            <pc:docMk/>
+            <pc:sldMk cId="986449292" sldId="264"/>
+            <ac:spMk id="9" creationId="{989683EB-D202-4B4D-B1BD-8BA6965FBEF5}"/>
+          </ac:spMkLst>
+        </pc:spChg>
+        <pc:picChg chg="add mod ord">
+          <ac:chgData name="Al ex" userId="1d73023b5acb93cf" providerId="LiveId" clId="{AB8C1610-9B0F-4A3A-96F9-A0FB1F9855A7}" dt="2021-07-02T15:35:47.341" v="4057" actId="26606"/>
+          <ac:picMkLst>
+            <pc:docMk/>
+            <pc:sldMk cId="986449292" sldId="264"/>
+            <ac:picMk id="4" creationId="{5511DBA9-FF92-407F-A794-61FC31C5161F}"/>
+          </ac:picMkLst>
+        </pc:picChg>
+      </pc:sldChg>
+      <pc:sldChg chg="addSp delSp modSp new mod setBg">
+        <pc:chgData name="Al ex" userId="1d73023b5acb93cf" providerId="LiveId" clId="{AB8C1610-9B0F-4A3A-96F9-A0FB1F9855A7}" dt="2021-07-02T15:39:22.150" v="4249" actId="20577"/>
+        <pc:sldMkLst>
+          <pc:docMk/>
+          <pc:sldMk cId="257936271" sldId="265"/>
+        </pc:sldMkLst>
+        <pc:spChg chg="mod">
+          <ac:chgData name="Al ex" userId="1d73023b5acb93cf" providerId="LiveId" clId="{AB8C1610-9B0F-4A3A-96F9-A0FB1F9855A7}" dt="2021-07-02T15:35:08.252" v="4051" actId="26606"/>
+          <ac:spMkLst>
+            <pc:docMk/>
+            <pc:sldMk cId="257936271" sldId="265"/>
+            <ac:spMk id="2" creationId="{D02D210C-DC25-442C-A0DC-2021B3ABC932}"/>
+          </ac:spMkLst>
+        </pc:spChg>
+        <pc:spChg chg="mod">
+          <ac:chgData name="Al ex" userId="1d73023b5acb93cf" providerId="LiveId" clId="{AB8C1610-9B0F-4A3A-96F9-A0FB1F9855A7}" dt="2021-07-02T15:39:22.150" v="4249" actId="20577"/>
+          <ac:spMkLst>
+            <pc:docMk/>
+            <pc:sldMk cId="257936271" sldId="265"/>
+            <ac:spMk id="3" creationId="{C6D47933-B121-49D1-9D84-21CF203209CD}"/>
+          </ac:spMkLst>
+        </pc:spChg>
+        <pc:spChg chg="add del">
+          <ac:chgData name="Al ex" userId="1d73023b5acb93cf" providerId="LiveId" clId="{AB8C1610-9B0F-4A3A-96F9-A0FB1F9855A7}" dt="2021-07-02T15:35:38.236" v="4055" actId="26606"/>
+          <ac:spMkLst>
+            <pc:docMk/>
+            <pc:sldMk cId="257936271" sldId="265"/>
+            <ac:spMk id="9" creationId="{989683EB-D202-4B4D-B1BD-8BA6965FBEF5}"/>
+          </ac:spMkLst>
+        </pc:spChg>
+        <pc:spChg chg="add del">
+          <ac:chgData name="Al ex" userId="1d73023b5acb93cf" providerId="LiveId" clId="{AB8C1610-9B0F-4A3A-96F9-A0FB1F9855A7}" dt="2021-07-02T15:35:38.236" v="4055" actId="26606"/>
+          <ac:spMkLst>
+            <pc:docMk/>
+            <pc:sldMk cId="257936271" sldId="265"/>
+            <ac:spMk id="14" creationId="{989683EB-D202-4B4D-B1BD-8BA6965FBEF5}"/>
+          </ac:spMkLst>
+        </pc:spChg>
+        <pc:picChg chg="add mod ord">
+          <ac:chgData name="Al ex" userId="1d73023b5acb93cf" providerId="LiveId" clId="{AB8C1610-9B0F-4A3A-96F9-A0FB1F9855A7}" dt="2021-07-02T15:35:08.252" v="4051" actId="26606"/>
+          <ac:picMkLst>
+            <pc:docMk/>
+            <pc:sldMk cId="257936271" sldId="265"/>
+            <ac:picMk id="4" creationId="{C8005455-DE52-4166-891D-E22990B7B159}"/>
+          </ac:picMkLst>
+        </pc:picChg>
+      </pc:sldChg>
+      <pc:sldChg chg="addSp modSp new mod setBg">
+        <pc:chgData name="Al ex" userId="1d73023b5acb93cf" providerId="LiveId" clId="{AB8C1610-9B0F-4A3A-96F9-A0FB1F9855A7}" dt="2021-07-02T15:38:48.252" v="4248" actId="403"/>
+        <pc:sldMkLst>
+          <pc:docMk/>
+          <pc:sldMk cId="1716667692" sldId="266"/>
+        </pc:sldMkLst>
+        <pc:spChg chg="mod ord">
+          <ac:chgData name="Al ex" userId="1d73023b5acb93cf" providerId="LiveId" clId="{AB8C1610-9B0F-4A3A-96F9-A0FB1F9855A7}" dt="2021-07-02T15:33:49.673" v="4001" actId="26606"/>
+          <ac:spMkLst>
+            <pc:docMk/>
+            <pc:sldMk cId="1716667692" sldId="266"/>
+            <ac:spMk id="2" creationId="{53FD79FB-C723-4EE6-843C-33599473613F}"/>
+          </ac:spMkLst>
+        </pc:spChg>
+        <pc:spChg chg="mod">
+          <ac:chgData name="Al ex" userId="1d73023b5acb93cf" providerId="LiveId" clId="{AB8C1610-9B0F-4A3A-96F9-A0FB1F9855A7}" dt="2021-07-02T15:38:48.252" v="4248" actId="403"/>
+          <ac:spMkLst>
+            <pc:docMk/>
+            <pc:sldMk cId="1716667692" sldId="266"/>
+            <ac:spMk id="3" creationId="{7BF06AF6-F9B6-4411-9EF0-4EE6B29F9CBA}"/>
+          </ac:spMkLst>
+        </pc:spChg>
+        <pc:spChg chg="add">
+          <ac:chgData name="Al ex" userId="1d73023b5acb93cf" providerId="LiveId" clId="{AB8C1610-9B0F-4A3A-96F9-A0FB1F9855A7}" dt="2021-07-02T15:33:49.673" v="4001" actId="26606"/>
+          <ac:spMkLst>
+            <pc:docMk/>
+            <pc:sldMk cId="1716667692" sldId="266"/>
+            <ac:spMk id="10" creationId="{989683EB-D202-4B4D-B1BD-8BA6965FBEF5}"/>
+          </ac:spMkLst>
+        </pc:spChg>
+        <pc:picChg chg="add mod">
+          <ac:chgData name="Al ex" userId="1d73023b5acb93cf" providerId="LiveId" clId="{AB8C1610-9B0F-4A3A-96F9-A0FB1F9855A7}" dt="2021-07-02T15:34:59.569" v="4049" actId="1038"/>
+          <ac:picMkLst>
+            <pc:docMk/>
+            <pc:sldMk cId="1716667692" sldId="266"/>
+            <ac:picMk id="5" creationId="{8CBB88FA-6CC5-4058-B997-6B93B0B98EB6}"/>
+          </ac:picMkLst>
+        </pc:picChg>
+      </pc:sldChg>
+      <pc:sldChg chg="addSp modSp new mod setBg">
+        <pc:chgData name="Al ex" userId="1d73023b5acb93cf" providerId="LiveId" clId="{AB8C1610-9B0F-4A3A-96F9-A0FB1F9855A7}" dt="2021-07-02T15:43:13.266" v="4707" actId="20577"/>
+        <pc:sldMkLst>
+          <pc:docMk/>
+          <pc:sldMk cId="2386237977" sldId="267"/>
+        </pc:sldMkLst>
+        <pc:spChg chg="mod">
+          <ac:chgData name="Al ex" userId="1d73023b5acb93cf" providerId="LiveId" clId="{AB8C1610-9B0F-4A3A-96F9-A0FB1F9855A7}" dt="2021-07-02T15:39:40.742" v="4263" actId="20577"/>
+          <ac:spMkLst>
+            <pc:docMk/>
+            <pc:sldMk cId="2386237977" sldId="267"/>
+            <ac:spMk id="2" creationId="{D4B244B0-14BC-4D2F-B5AF-483644B6F9C8}"/>
+          </ac:spMkLst>
+        </pc:spChg>
+        <pc:spChg chg="mod">
+          <ac:chgData name="Al ex" userId="1d73023b5acb93cf" providerId="LiveId" clId="{AB8C1610-9B0F-4A3A-96F9-A0FB1F9855A7}" dt="2021-07-02T15:43:13.266" v="4707" actId="20577"/>
+          <ac:spMkLst>
+            <pc:docMk/>
+            <pc:sldMk cId="2386237977" sldId="267"/>
+            <ac:spMk id="3" creationId="{5A1B9CF7-7836-45FA-8266-852C7D3D1E59}"/>
+          </ac:spMkLst>
+        </pc:spChg>
+        <pc:spChg chg="add">
+          <ac:chgData name="Al ex" userId="1d73023b5acb93cf" providerId="LiveId" clId="{AB8C1610-9B0F-4A3A-96F9-A0FB1F9855A7}" dt="2021-07-02T15:39:36.725" v="4252" actId="26606"/>
+          <ac:spMkLst>
+            <pc:docMk/>
+            <pc:sldMk cId="2386237977" sldId="267"/>
+            <ac:spMk id="9" creationId="{989683EB-D202-4B4D-B1BD-8BA6965FBEF5}"/>
+          </ac:spMkLst>
+        </pc:spChg>
+        <pc:picChg chg="add mod ord">
+          <ac:chgData name="Al ex" userId="1d73023b5acb93cf" providerId="LiveId" clId="{AB8C1610-9B0F-4A3A-96F9-A0FB1F9855A7}" dt="2021-07-02T15:39:36.725" v="4252" actId="26606"/>
+          <ac:picMkLst>
+            <pc:docMk/>
+            <pc:sldMk cId="2386237977" sldId="267"/>
+            <ac:picMk id="4" creationId="{E450A686-C174-48D8-AD85-3F16996FCDBB}"/>
+          </ac:picMkLst>
+        </pc:picChg>
+      </pc:sldChg>
+      <pc:sldMasterChg chg="add del setBg addSldLayout delSldLayout modSldLayout">
+        <pc:chgData name="Al ex" userId="1d73023b5acb93cf" providerId="LiveId" clId="{AB8C1610-9B0F-4A3A-96F9-A0FB1F9855A7}" dt="2021-07-02T15:34:50.659" v="4003"/>
         <pc:sldMasterMkLst>
           <pc:docMk/>
           <pc:sldMasterMk cId="2549467387" sldId="2147483660"/>
         </pc:sldMasterMkLst>
-        <pc:sldLayoutChg chg="add del">
-          <pc:chgData name="Al ex" userId="1d73023b5acb93cf" providerId="LiveId" clId="{AB8C1610-9B0F-4A3A-96F9-A0FB1F9855A7}" dt="2021-07-01T08:07:51.280" v="65" actId="26606"/>
+        <pc:sldLayoutChg chg="add del setBg">
+          <pc:chgData name="Al ex" userId="1d73023b5acb93cf" providerId="LiveId" clId="{AB8C1610-9B0F-4A3A-96F9-A0FB1F9855A7}" dt="2021-07-02T15:34:50.659" v="4003"/>
           <pc:sldLayoutMkLst>
             <pc:docMk/>
             <pc:sldMasterMk cId="2549467387" sldId="2147483660"/>
             <pc:sldLayoutMk cId="2354977107" sldId="2147483661"/>
           </pc:sldLayoutMkLst>
         </pc:sldLayoutChg>
-        <pc:sldLayoutChg chg="add del">
-          <pc:chgData name="Al ex" userId="1d73023b5acb93cf" providerId="LiveId" clId="{AB8C1610-9B0F-4A3A-96F9-A0FB1F9855A7}" dt="2021-07-01T08:07:51.280" v="65" actId="26606"/>
+        <pc:sldLayoutChg chg="add del setBg">
+          <pc:chgData name="Al ex" userId="1d73023b5acb93cf" providerId="LiveId" clId="{AB8C1610-9B0F-4A3A-96F9-A0FB1F9855A7}" dt="2021-07-02T15:34:50.659" v="4003"/>
           <pc:sldLayoutMkLst>
             <pc:docMk/>
             <pc:sldMasterMk cId="2549467387" sldId="2147483660"/>
             <pc:sldLayoutMk cId="1591234160" sldId="2147483662"/>
           </pc:sldLayoutMkLst>
         </pc:sldLayoutChg>
-        <pc:sldLayoutChg chg="add del">
-          <pc:chgData name="Al ex" userId="1d73023b5acb93cf" providerId="LiveId" clId="{AB8C1610-9B0F-4A3A-96F9-A0FB1F9855A7}" dt="2021-07-01T08:07:51.280" v="65" actId="26606"/>
+        <pc:sldLayoutChg chg="add del setBg">
+          <pc:chgData name="Al ex" userId="1d73023b5acb93cf" providerId="LiveId" clId="{AB8C1610-9B0F-4A3A-96F9-A0FB1F9855A7}" dt="2021-07-02T15:34:50.659" v="4003"/>
           <pc:sldLayoutMkLst>
             <pc:docMk/>
             <pc:sldMasterMk cId="2549467387" sldId="2147483660"/>
             <pc:sldLayoutMk cId="3417041690" sldId="2147483663"/>
           </pc:sldLayoutMkLst>
         </pc:sldLayoutChg>
-        <pc:sldLayoutChg chg="add del">
-          <pc:chgData name="Al ex" userId="1d73023b5acb93cf" providerId="LiveId" clId="{AB8C1610-9B0F-4A3A-96F9-A0FB1F9855A7}" dt="2021-07-01T08:07:51.280" v="65" actId="26606"/>
+        <pc:sldLayoutChg chg="add del setBg">
+          <pc:chgData name="Al ex" userId="1d73023b5acb93cf" providerId="LiveId" clId="{AB8C1610-9B0F-4A3A-96F9-A0FB1F9855A7}" dt="2021-07-02T15:34:50.659" v="4003"/>
           <pc:sldLayoutMkLst>
             <pc:docMk/>
             <pc:sldMasterMk cId="2549467387" sldId="2147483660"/>
             <pc:sldLayoutMk cId="897355772" sldId="2147483664"/>
           </pc:sldLayoutMkLst>
         </pc:sldLayoutChg>
-        <pc:sldLayoutChg chg="add del">
-          <pc:chgData name="Al ex" userId="1d73023b5acb93cf" providerId="LiveId" clId="{AB8C1610-9B0F-4A3A-96F9-A0FB1F9855A7}" dt="2021-07-01T08:07:51.280" v="65" actId="26606"/>
+        <pc:sldLayoutChg chg="add del setBg">
+          <pc:chgData name="Al ex" userId="1d73023b5acb93cf" providerId="LiveId" clId="{AB8C1610-9B0F-4A3A-96F9-A0FB1F9855A7}" dt="2021-07-02T15:34:50.659" v="4003"/>
           <pc:sldLayoutMkLst>
             <pc:docMk/>
             <pc:sldMasterMk cId="2549467387" sldId="2147483660"/>
             <pc:sldLayoutMk cId="2853757144" sldId="2147483665"/>
           </pc:sldLayoutMkLst>
         </pc:sldLayoutChg>
-        <pc:sldLayoutChg chg="add del">
-          <pc:chgData name="Al ex" userId="1d73023b5acb93cf" providerId="LiveId" clId="{AB8C1610-9B0F-4A3A-96F9-A0FB1F9855A7}" dt="2021-07-01T08:07:51.280" v="65" actId="26606"/>
+        <pc:sldLayoutChg chg="add del setBg">
+          <pc:chgData name="Al ex" userId="1d73023b5acb93cf" providerId="LiveId" clId="{AB8C1610-9B0F-4A3A-96F9-A0FB1F9855A7}" dt="2021-07-02T15:34:50.659" v="4003"/>
           <pc:sldLayoutMkLst>
             <pc:docMk/>
             <pc:sldMasterMk cId="2549467387" sldId="2147483660"/>
             <pc:sldLayoutMk cId="293929128" sldId="2147483666"/>
           </pc:sldLayoutMkLst>
         </pc:sldLayoutChg>
-        <pc:sldLayoutChg chg="add del">
-          <pc:chgData name="Al ex" userId="1d73023b5acb93cf" providerId="LiveId" clId="{AB8C1610-9B0F-4A3A-96F9-A0FB1F9855A7}" dt="2021-07-01T08:07:51.280" v="65" actId="26606"/>
+        <pc:sldLayoutChg chg="add del setBg">
+          <pc:chgData name="Al ex" userId="1d73023b5acb93cf" providerId="LiveId" clId="{AB8C1610-9B0F-4A3A-96F9-A0FB1F9855A7}" dt="2021-07-02T15:34:50.659" v="4003"/>
           <pc:sldLayoutMkLst>
             <pc:docMk/>
             <pc:sldMasterMk cId="2549467387" sldId="2147483660"/>
             <pc:sldLayoutMk cId="1876364091" sldId="2147483667"/>
           </pc:sldLayoutMkLst>
         </pc:sldLayoutChg>
-        <pc:sldLayoutChg chg="add del">
-          <pc:chgData name="Al ex" userId="1d73023b5acb93cf" providerId="LiveId" clId="{AB8C1610-9B0F-4A3A-96F9-A0FB1F9855A7}" dt="2021-07-01T08:07:51.280" v="65" actId="26606"/>
+        <pc:sldLayoutChg chg="add del setBg">
+          <pc:chgData name="Al ex" userId="1d73023b5acb93cf" providerId="LiveId" clId="{AB8C1610-9B0F-4A3A-96F9-A0FB1F9855A7}" dt="2021-07-02T15:34:50.659" v="4003"/>
           <pc:sldLayoutMkLst>
             <pc:docMk/>
             <pc:sldMasterMk cId="2549467387" sldId="2147483660"/>
             <pc:sldLayoutMk cId="3019157521" sldId="2147483668"/>
           </pc:sldLayoutMkLst>
         </pc:sldLayoutChg>
-        <pc:sldLayoutChg chg="add del">
-          <pc:chgData name="Al ex" userId="1d73023b5acb93cf" providerId="LiveId" clId="{AB8C1610-9B0F-4A3A-96F9-A0FB1F9855A7}" dt="2021-07-01T08:07:51.280" v="65" actId="26606"/>
+        <pc:sldLayoutChg chg="add del setBg">
+          <pc:chgData name="Al ex" userId="1d73023b5acb93cf" providerId="LiveId" clId="{AB8C1610-9B0F-4A3A-96F9-A0FB1F9855A7}" dt="2021-07-02T15:34:50.659" v="4003"/>
           <pc:sldLayoutMkLst>
             <pc:docMk/>
             <pc:sldMasterMk cId="2549467387" sldId="2147483660"/>
             <pc:sldLayoutMk cId="2692784005" sldId="2147483669"/>
           </pc:sldLayoutMkLst>
         </pc:sldLayoutChg>
-        <pc:sldLayoutChg chg="add del">
-          <pc:chgData name="Al ex" userId="1d73023b5acb93cf" providerId="LiveId" clId="{AB8C1610-9B0F-4A3A-96F9-A0FB1F9855A7}" dt="2021-07-01T08:07:51.280" v="65" actId="26606"/>
+        <pc:sldLayoutChg chg="add del setBg">
+          <pc:chgData name="Al ex" userId="1d73023b5acb93cf" providerId="LiveId" clId="{AB8C1610-9B0F-4A3A-96F9-A0FB1F9855A7}" dt="2021-07-02T15:34:50.659" v="4003"/>
           <pc:sldLayoutMkLst>
             <pc:docMk/>
             <pc:sldMasterMk cId="2549467387" sldId="2147483660"/>
             <pc:sldLayoutMk cId="3464616208" sldId="2147483670"/>
           </pc:sldLayoutMkLst>
         </pc:sldLayoutChg>
-        <pc:sldLayoutChg chg="add del">
-          <pc:chgData name="Al ex" userId="1d73023b5acb93cf" providerId="LiveId" clId="{AB8C1610-9B0F-4A3A-96F9-A0FB1F9855A7}" dt="2021-07-01T08:07:51.280" v="65" actId="26606"/>
+        <pc:sldLayoutChg chg="add del setBg">
+          <pc:chgData name="Al ex" userId="1d73023b5acb93cf" providerId="LiveId" clId="{AB8C1610-9B0F-4A3A-96F9-A0FB1F9855A7}" dt="2021-07-02T15:34:50.659" v="4003"/>
           <pc:sldLayoutMkLst>
             <pc:docMk/>
             <pc:sldMasterMk cId="2549467387" sldId="2147483660"/>
@@ -3443,7 +3739,7 @@
           <a:p>
             <a:fld id="{0FB1A7F6-0812-4A46-B0B3-17E31A6CF280}" type="datetimeFigureOut">
               <a:rPr lang="it-IT" smtClean="0"/>
-              <a:t>01/07/2021</a:t>
+              <a:t>02/07/2021</a:t>
             </a:fld>
             <a:endParaRPr lang="it-IT"/>
           </a:p>
@@ -3671,7 +3967,7 @@
           <a:p>
             <a:fld id="{0FB1A7F6-0812-4A46-B0B3-17E31A6CF280}" type="datetimeFigureOut">
               <a:rPr lang="it-IT" smtClean="0"/>
-              <a:t>01/07/2021</a:t>
+              <a:t>02/07/2021</a:t>
             </a:fld>
             <a:endParaRPr lang="it-IT"/>
           </a:p>
@@ -3851,7 +4147,7 @@
           <a:p>
             <a:fld id="{0FB1A7F6-0812-4A46-B0B3-17E31A6CF280}" type="datetimeFigureOut">
               <a:rPr lang="it-IT" smtClean="0"/>
-              <a:t>01/07/2021</a:t>
+              <a:t>02/07/2021</a:t>
             </a:fld>
             <a:endParaRPr lang="it-IT"/>
           </a:p>
@@ -4021,7 +4317,7 @@
           <a:p>
             <a:fld id="{0FB1A7F6-0812-4A46-B0B3-17E31A6CF280}" type="datetimeFigureOut">
               <a:rPr lang="it-IT" smtClean="0"/>
-              <a:t>01/07/2021</a:t>
+              <a:t>02/07/2021</a:t>
             </a:fld>
             <a:endParaRPr lang="it-IT"/>
           </a:p>
@@ -4275,7 +4571,7 @@
           <a:p>
             <a:fld id="{0FB1A7F6-0812-4A46-B0B3-17E31A6CF280}" type="datetimeFigureOut">
               <a:rPr lang="it-IT" smtClean="0"/>
-              <a:t>01/07/2021</a:t>
+              <a:t>02/07/2021</a:t>
             </a:fld>
             <a:endParaRPr lang="it-IT"/>
           </a:p>
@@ -4601,7 +4897,7 @@
           <a:p>
             <a:fld id="{0FB1A7F6-0812-4A46-B0B3-17E31A6CF280}" type="datetimeFigureOut">
               <a:rPr lang="it-IT" smtClean="0"/>
-              <a:t>01/07/2021</a:t>
+              <a:t>02/07/2021</a:t>
             </a:fld>
             <a:endParaRPr lang="it-IT"/>
           </a:p>
@@ -5052,7 +5348,7 @@
           <a:p>
             <a:fld id="{0FB1A7F6-0812-4A46-B0B3-17E31A6CF280}" type="datetimeFigureOut">
               <a:rPr lang="it-IT" smtClean="0"/>
-              <a:t>01/07/2021</a:t>
+              <a:t>02/07/2021</a:t>
             </a:fld>
             <a:endParaRPr lang="it-IT"/>
           </a:p>
@@ -5170,7 +5466,7 @@
           <a:p>
             <a:fld id="{0FB1A7F6-0812-4A46-B0B3-17E31A6CF280}" type="datetimeFigureOut">
               <a:rPr lang="it-IT" smtClean="0"/>
-              <a:t>01/07/2021</a:t>
+              <a:t>02/07/2021</a:t>
             </a:fld>
             <a:endParaRPr lang="it-IT"/>
           </a:p>
@@ -5265,7 +5561,7 @@
           <a:p>
             <a:fld id="{0FB1A7F6-0812-4A46-B0B3-17E31A6CF280}" type="datetimeFigureOut">
               <a:rPr lang="it-IT" smtClean="0"/>
-              <a:t>01/07/2021</a:t>
+              <a:t>02/07/2021</a:t>
             </a:fld>
             <a:endParaRPr lang="it-IT"/>
           </a:p>
@@ -5552,7 +5848,7 @@
           <a:p>
             <a:fld id="{0FB1A7F6-0812-4A46-B0B3-17E31A6CF280}" type="datetimeFigureOut">
               <a:rPr lang="it-IT" smtClean="0"/>
-              <a:t>01/07/2021</a:t>
+              <a:t>02/07/2021</a:t>
             </a:fld>
             <a:endParaRPr lang="it-IT"/>
           </a:p>
@@ -5874,7 +6170,7 @@
           <a:p>
             <a:fld id="{0FB1A7F6-0812-4A46-B0B3-17E31A6CF280}" type="datetimeFigureOut">
               <a:rPr lang="it-IT" smtClean="0"/>
-              <a:t>01/07/2021</a:t>
+              <a:t>02/07/2021</a:t>
             </a:fld>
             <a:endParaRPr lang="it-IT"/>
           </a:p>
@@ -6128,7 +6424,7 @@
           <a:p>
             <a:fld id="{0FB1A7F6-0812-4A46-B0B3-17E31A6CF280}" type="datetimeFigureOut">
               <a:rPr lang="it-IT" smtClean="0"/>
-              <a:t>01/07/2021</a:t>
+              <a:t>02/07/2021</a:t>
             </a:fld>
             <a:endParaRPr lang="it-IT"/>
           </a:p>
@@ -6706,6 +7002,1343 @@
 </p:sld>
 </file>
 
+<file path=ppt/slides/slide10.xml><?xml version="1.0" encoding="utf-8"?>
+<p:sld xmlns:a="http://schemas.openxmlformats.org/drawingml/2006/main" xmlns:r="http://schemas.openxmlformats.org/officeDocument/2006/relationships" xmlns:p="http://schemas.openxmlformats.org/presentationml/2006/main">
+  <p:cSld>
+    <p:bg>
+      <p:bgPr>
+        <a:solidFill>
+          <a:schemeClr val="bg1"/>
+        </a:solidFill>
+        <a:effectLst/>
+      </p:bgPr>
+    </p:bg>
+    <p:spTree>
+      <p:nvGrpSpPr>
+        <p:cNvPr id="1" name=""/>
+        <p:cNvGrpSpPr/>
+        <p:nvPr/>
+      </p:nvGrpSpPr>
+      <p:grpSpPr>
+        <a:xfrm>
+          <a:off x="0" y="0"/>
+          <a:ext cx="0" cy="0"/>
+          <a:chOff x="0" y="0"/>
+          <a:chExt cx="0" cy="0"/>
+        </a:xfrm>
+      </p:grpSpPr>
+      <p:sp>
+        <p:nvSpPr>
+          <p:cNvPr id="10" name="Rectangle 9">
+            <a:extLst>
+              <a:ext uri="{FF2B5EF4-FFF2-40B4-BE49-F238E27FC236}">
+                <a16:creationId xmlns:a16="http://schemas.microsoft.com/office/drawing/2014/main" id="{989683EB-D202-4B4D-B1BD-8BA6965FBEF5}"/>
+              </a:ext>
+              <a:ext uri="{C183D7F6-B498-43B3-948B-1728B52AA6E4}">
+                <adec:decorative xmlns:adec="http://schemas.microsoft.com/office/drawing/2017/decorative" val="1"/>
+              </a:ext>
+            </a:extLst>
+          </p:cNvPr>
+          <p:cNvSpPr>
+            <a:spLocks noGrp="1" noRot="1" noChangeAspect="1" noMove="1" noResize="1" noEditPoints="1" noAdjustHandles="1" noChangeArrowheads="1" noChangeShapeType="1" noTextEdit="1"/>
+          </p:cNvSpPr>
+          <p:nvPr>
+            <p:extLst>
+              <p:ext uri="{386F3935-93C4-4BCD-93E2-E3B085C9AB24}">
+                <p16:designElem xmlns:p16="http://schemas.microsoft.com/office/powerpoint/2015/main" val="1"/>
+              </p:ext>
+            </p:extLst>
+          </p:nvPr>
+        </p:nvSpPr>
+        <p:spPr>
+          <a:xfrm>
+            <a:off x="0" y="-1"/>
+            <a:ext cx="11292840" cy="6858001"/>
+          </a:xfrm>
+          <a:prstGeom prst="rect">
+            <a:avLst/>
+          </a:prstGeom>
+          <a:solidFill>
+            <a:schemeClr val="tx1"/>
+          </a:solidFill>
+          <a:ln>
+            <a:noFill/>
+          </a:ln>
+        </p:spPr>
+        <p:style>
+          <a:lnRef idx="2">
+            <a:schemeClr val="accent1">
+              <a:shade val="50000"/>
+            </a:schemeClr>
+          </a:lnRef>
+          <a:fillRef idx="1">
+            <a:schemeClr val="accent1"/>
+          </a:fillRef>
+          <a:effectRef idx="0">
+            <a:schemeClr val="accent1"/>
+          </a:effectRef>
+          <a:fontRef idx="minor">
+            <a:schemeClr val="lt1"/>
+          </a:fontRef>
+        </p:style>
+        <p:txBody>
+          <a:bodyPr rtlCol="0" anchor="ctr"/>
+          <a:lstStyle/>
+          <a:p>
+            <a:pPr algn="ctr"/>
+            <a:endParaRPr lang="en-US"/>
+          </a:p>
+        </p:txBody>
+      </p:sp>
+      <p:pic>
+        <p:nvPicPr>
+          <p:cNvPr id="5" name="Picture 4" descr="Maze">
+            <a:extLst>
+              <a:ext uri="{FF2B5EF4-FFF2-40B4-BE49-F238E27FC236}">
+                <a16:creationId xmlns:a16="http://schemas.microsoft.com/office/drawing/2014/main" id="{8CBB88FA-6CC5-4058-B997-6B93B0B98EB6}"/>
+              </a:ext>
+            </a:extLst>
+          </p:cNvPr>
+          <p:cNvPicPr>
+            <a:picLocks noChangeAspect="1"/>
+          </p:cNvPicPr>
+          <p:nvPr/>
+        </p:nvPicPr>
+        <p:blipFill rotWithShape="1">
+          <a:blip r:embed="rId2">
+            <a:alphaModFix amt="35000"/>
+          </a:blip>
+          <a:srcRect t="9021"/>
+          <a:stretch/>
+        </p:blipFill>
+        <p:spPr>
+          <a:xfrm>
+            <a:off x="20" y="10"/>
+            <a:ext cx="11292820" cy="6857990"/>
+          </a:xfrm>
+          <a:prstGeom prst="rect">
+            <a:avLst/>
+          </a:prstGeom>
+        </p:spPr>
+      </p:pic>
+      <p:sp>
+        <p:nvSpPr>
+          <p:cNvPr id="2" name="Titolo 1">
+            <a:extLst>
+              <a:ext uri="{FF2B5EF4-FFF2-40B4-BE49-F238E27FC236}">
+                <a16:creationId xmlns:a16="http://schemas.microsoft.com/office/drawing/2014/main" id="{53FD79FB-C723-4EE6-843C-33599473613F}"/>
+              </a:ext>
+            </a:extLst>
+          </p:cNvPr>
+          <p:cNvSpPr>
+            <a:spLocks noGrp="1"/>
+          </p:cNvSpPr>
+          <p:nvPr>
+            <p:ph type="title"/>
+          </p:nvPr>
+        </p:nvSpPr>
+        <p:spPr>
+          <a:xfrm>
+            <a:off x="1261872" y="365760"/>
+            <a:ext cx="9692640" cy="1325562"/>
+          </a:xfrm>
+        </p:spPr>
+        <p:txBody>
+          <a:bodyPr>
+            <a:normAutofit/>
+          </a:bodyPr>
+          <a:lstStyle/>
+          <a:p>
+            <a:r>
+              <a:rPr lang="it-IT">
+                <a:solidFill>
+                  <a:schemeClr val="bg1"/>
+                </a:solidFill>
+              </a:rPr>
+              <a:t>Interesting points</a:t>
+            </a:r>
+          </a:p>
+        </p:txBody>
+      </p:sp>
+      <p:sp>
+        <p:nvSpPr>
+          <p:cNvPr id="3" name="Segnaposto contenuto 2">
+            <a:extLst>
+              <a:ext uri="{FF2B5EF4-FFF2-40B4-BE49-F238E27FC236}">
+                <a16:creationId xmlns:a16="http://schemas.microsoft.com/office/drawing/2014/main" id="{7BF06AF6-F9B6-4411-9EF0-4EE6B29F9CBA}"/>
+              </a:ext>
+            </a:extLst>
+          </p:cNvPr>
+          <p:cNvSpPr>
+            <a:spLocks noGrp="1"/>
+          </p:cNvSpPr>
+          <p:nvPr>
+            <p:ph idx="1"/>
+          </p:nvPr>
+        </p:nvSpPr>
+        <p:spPr>
+          <a:xfrm>
+            <a:off x="1261872" y="2005739"/>
+            <a:ext cx="8595360" cy="4174398"/>
+          </a:xfrm>
+        </p:spPr>
+        <p:txBody>
+          <a:bodyPr>
+            <a:normAutofit/>
+          </a:bodyPr>
+          <a:lstStyle/>
+          <a:p>
+            <a:r>
+              <a:rPr lang="it-IT" sz="2000" dirty="0" err="1">
+                <a:solidFill>
+                  <a:schemeClr val="bg1"/>
+                </a:solidFill>
+              </a:rPr>
+              <a:t>Perhaps</a:t>
+            </a:r>
+            <a:r>
+              <a:rPr lang="it-IT" sz="2000" dirty="0">
+                <a:solidFill>
+                  <a:schemeClr val="bg1"/>
+                </a:solidFill>
+              </a:rPr>
+              <a:t> </a:t>
+            </a:r>
+            <a:r>
+              <a:rPr lang="it-IT" sz="2000" dirty="0" err="1">
+                <a:solidFill>
+                  <a:schemeClr val="bg1"/>
+                </a:solidFill>
+              </a:rPr>
+              <a:t>we</a:t>
+            </a:r>
+            <a:r>
+              <a:rPr lang="it-IT" sz="2000" dirty="0">
+                <a:solidFill>
+                  <a:schemeClr val="bg1"/>
+                </a:solidFill>
+              </a:rPr>
+              <a:t> are </a:t>
+            </a:r>
+            <a:r>
+              <a:rPr lang="it-IT" sz="2000" dirty="0" err="1">
+                <a:solidFill>
+                  <a:schemeClr val="bg1"/>
+                </a:solidFill>
+              </a:rPr>
+              <a:t>not</a:t>
+            </a:r>
+            <a:r>
+              <a:rPr lang="it-IT" sz="2000" dirty="0">
+                <a:solidFill>
+                  <a:schemeClr val="bg1"/>
+                </a:solidFill>
+              </a:rPr>
+              <a:t> </a:t>
+            </a:r>
+            <a:r>
+              <a:rPr lang="it-IT" sz="2000" dirty="0" err="1">
+                <a:solidFill>
+                  <a:schemeClr val="bg1"/>
+                </a:solidFill>
+              </a:rPr>
+              <a:t>using</a:t>
+            </a:r>
+            <a:r>
+              <a:rPr lang="it-IT" sz="2000" dirty="0">
+                <a:solidFill>
+                  <a:schemeClr val="bg1"/>
+                </a:solidFill>
+              </a:rPr>
+              <a:t> </a:t>
+            </a:r>
+            <a:r>
+              <a:rPr lang="it-IT" sz="2000" dirty="0" err="1">
+                <a:solidFill>
+                  <a:schemeClr val="bg1"/>
+                </a:solidFill>
+              </a:rPr>
+              <a:t>enough</a:t>
+            </a:r>
+            <a:r>
+              <a:rPr lang="it-IT" sz="2000" dirty="0">
+                <a:solidFill>
+                  <a:schemeClr val="bg1"/>
+                </a:solidFill>
+              </a:rPr>
+              <a:t> </a:t>
+            </a:r>
+            <a:r>
+              <a:rPr lang="it-IT" sz="2000" dirty="0" err="1">
+                <a:solidFill>
+                  <a:schemeClr val="bg1"/>
+                </a:solidFill>
+              </a:rPr>
+              <a:t>examples</a:t>
+            </a:r>
+            <a:r>
+              <a:rPr lang="it-IT" sz="2000" dirty="0">
+                <a:solidFill>
+                  <a:schemeClr val="bg1"/>
+                </a:solidFill>
+              </a:rPr>
+              <a:t>.</a:t>
+            </a:r>
+          </a:p>
+          <a:p>
+            <a:r>
+              <a:rPr lang="it-IT" sz="2000" dirty="0" err="1">
+                <a:solidFill>
+                  <a:schemeClr val="bg1"/>
+                </a:solidFill>
+              </a:rPr>
+              <a:t>But</a:t>
+            </a:r>
+            <a:r>
+              <a:rPr lang="it-IT" sz="2000" dirty="0">
+                <a:solidFill>
+                  <a:schemeClr val="bg1"/>
+                </a:solidFill>
+              </a:rPr>
+              <a:t> </a:t>
+            </a:r>
+            <a:r>
+              <a:rPr lang="it-IT" sz="2000" dirty="0" err="1">
+                <a:solidFill>
+                  <a:schemeClr val="bg1"/>
+                </a:solidFill>
+              </a:rPr>
+              <a:t>actually</a:t>
+            </a:r>
+            <a:r>
+              <a:rPr lang="it-IT" sz="2000" dirty="0">
+                <a:solidFill>
+                  <a:schemeClr val="bg1"/>
+                </a:solidFill>
+              </a:rPr>
+              <a:t>, </a:t>
+            </a:r>
+            <a:r>
+              <a:rPr lang="it-IT" sz="2000" dirty="0" err="1">
+                <a:solidFill>
+                  <a:schemeClr val="bg1"/>
+                </a:solidFill>
+              </a:rPr>
+              <a:t>we</a:t>
+            </a:r>
+            <a:r>
+              <a:rPr lang="it-IT" sz="2000" dirty="0">
+                <a:solidFill>
+                  <a:schemeClr val="bg1"/>
+                </a:solidFill>
+              </a:rPr>
+              <a:t> are </a:t>
+            </a:r>
+            <a:r>
+              <a:rPr lang="it-IT" sz="2000" dirty="0" err="1">
+                <a:solidFill>
+                  <a:schemeClr val="bg1"/>
+                </a:solidFill>
+              </a:rPr>
+              <a:t>using</a:t>
+            </a:r>
+            <a:r>
+              <a:rPr lang="it-IT" sz="2000" dirty="0">
+                <a:solidFill>
+                  <a:schemeClr val="bg1"/>
+                </a:solidFill>
+              </a:rPr>
+              <a:t> </a:t>
+            </a:r>
+            <a:r>
+              <a:rPr lang="it-IT" sz="2000" dirty="0" err="1">
+                <a:solidFill>
+                  <a:schemeClr val="bg1"/>
+                </a:solidFill>
+              </a:rPr>
+              <a:t>too</a:t>
+            </a:r>
+            <a:r>
+              <a:rPr lang="it-IT" sz="2000" dirty="0">
+                <a:solidFill>
+                  <a:schemeClr val="bg1"/>
+                </a:solidFill>
+              </a:rPr>
+              <a:t> </a:t>
+            </a:r>
+            <a:r>
+              <a:rPr lang="it-IT" sz="2000" dirty="0" err="1">
+                <a:solidFill>
+                  <a:schemeClr val="bg1"/>
+                </a:solidFill>
+              </a:rPr>
+              <a:t>many</a:t>
+            </a:r>
+            <a:r>
+              <a:rPr lang="it-IT" sz="2000" dirty="0">
+                <a:solidFill>
+                  <a:schemeClr val="bg1"/>
+                </a:solidFill>
+              </a:rPr>
+              <a:t>!</a:t>
+            </a:r>
+          </a:p>
+          <a:p>
+            <a:r>
+              <a:rPr lang="it-IT" sz="2000" dirty="0" err="1">
+                <a:solidFill>
+                  <a:schemeClr val="bg1"/>
+                </a:solidFill>
+              </a:rPr>
+              <a:t>Only</a:t>
+            </a:r>
+            <a:r>
+              <a:rPr lang="it-IT" sz="2000" dirty="0">
+                <a:solidFill>
+                  <a:schemeClr val="bg1"/>
+                </a:solidFill>
+              </a:rPr>
+              <a:t> </a:t>
+            </a:r>
+            <a:r>
+              <a:rPr lang="it-IT" sz="2000" dirty="0" err="1">
+                <a:solidFill>
+                  <a:schemeClr val="bg1"/>
+                </a:solidFill>
+              </a:rPr>
+              <a:t>using</a:t>
+            </a:r>
+            <a:r>
+              <a:rPr lang="it-IT" sz="2000" dirty="0">
+                <a:solidFill>
+                  <a:schemeClr val="bg1"/>
+                </a:solidFill>
+              </a:rPr>
+              <a:t> </a:t>
+            </a:r>
+            <a:r>
+              <a:rPr lang="en-US" sz="2000" dirty="0">
+                <a:solidFill>
+                  <a:schemeClr val="bg1"/>
+                </a:solidFill>
+                <a:latin typeface="Courier New" panose="02070309020205020404" pitchFamily="49" charset="0"/>
+                <a:cs typeface="Courier New" panose="02070309020205020404" pitchFamily="49" charset="0"/>
+              </a:rPr>
+              <a:t>reach((1,1), (2,5)). </a:t>
+            </a:r>
+            <a:r>
+              <a:rPr lang="en-US" sz="2000" dirty="0">
+                <a:solidFill>
+                  <a:schemeClr val="bg1"/>
+                </a:solidFill>
+                <a:cs typeface="Courier New" panose="02070309020205020404" pitchFamily="49" charset="0"/>
+              </a:rPr>
+              <a:t>leads to the same result!</a:t>
+            </a:r>
+          </a:p>
+          <a:p>
+            <a:r>
+              <a:rPr lang="en-US" sz="2000" dirty="0">
+                <a:solidFill>
+                  <a:schemeClr val="bg1"/>
+                </a:solidFill>
+                <a:cs typeface="Courier New" panose="02070309020205020404" pitchFamily="49" charset="0"/>
+              </a:rPr>
+              <a:t>This is possible thanks to how metarules reduce the domain, hence our search space.</a:t>
+            </a:r>
+          </a:p>
+          <a:p>
+            <a:endParaRPr lang="en-US" sz="1800" dirty="0">
+              <a:solidFill>
+                <a:schemeClr val="bg1"/>
+              </a:solidFill>
+              <a:latin typeface="Courier New" panose="02070309020205020404" pitchFamily="49" charset="0"/>
+              <a:cs typeface="Courier New" panose="02070309020205020404" pitchFamily="49" charset="0"/>
+            </a:endParaRPr>
+          </a:p>
+          <a:p>
+            <a:endParaRPr lang="it-IT" dirty="0">
+              <a:solidFill>
+                <a:schemeClr val="bg1"/>
+              </a:solidFill>
+            </a:endParaRPr>
+          </a:p>
+          <a:p>
+            <a:endParaRPr lang="it-IT" dirty="0">
+              <a:solidFill>
+                <a:schemeClr val="bg1"/>
+              </a:solidFill>
+            </a:endParaRPr>
+          </a:p>
+        </p:txBody>
+      </p:sp>
+    </p:spTree>
+    <p:extLst>
+      <p:ext uri="{BB962C8B-B14F-4D97-AF65-F5344CB8AC3E}">
+        <p14:creationId xmlns:p14="http://schemas.microsoft.com/office/powerpoint/2010/main" val="1716667692"/>
+      </p:ext>
+    </p:extLst>
+  </p:cSld>
+  <p:clrMapOvr>
+    <a:masterClrMapping/>
+  </p:clrMapOvr>
+</p:sld>
+</file>
+
+<file path=ppt/slides/slide11.xml><?xml version="1.0" encoding="utf-8"?>
+<p:sld xmlns:a="http://schemas.openxmlformats.org/drawingml/2006/main" xmlns:r="http://schemas.openxmlformats.org/officeDocument/2006/relationships" xmlns:p="http://schemas.openxmlformats.org/presentationml/2006/main">
+  <p:cSld>
+    <p:bg>
+      <p:bgPr>
+        <a:solidFill>
+          <a:schemeClr val="bg1"/>
+        </a:solidFill>
+        <a:effectLst/>
+      </p:bgPr>
+    </p:bg>
+    <p:spTree>
+      <p:nvGrpSpPr>
+        <p:cNvPr id="1" name=""/>
+        <p:cNvGrpSpPr/>
+        <p:nvPr/>
+      </p:nvGrpSpPr>
+      <p:grpSpPr>
+        <a:xfrm>
+          <a:off x="0" y="0"/>
+          <a:ext cx="0" cy="0"/>
+          <a:chOff x="0" y="0"/>
+          <a:chExt cx="0" cy="0"/>
+        </a:xfrm>
+      </p:grpSpPr>
+      <p:sp>
+        <p:nvSpPr>
+          <p:cNvPr id="9" name="Rectangle 8">
+            <a:extLst>
+              <a:ext uri="{FF2B5EF4-FFF2-40B4-BE49-F238E27FC236}">
+                <a16:creationId xmlns:a16="http://schemas.microsoft.com/office/drawing/2014/main" id="{989683EB-D202-4B4D-B1BD-8BA6965FBEF5}"/>
+              </a:ext>
+              <a:ext uri="{C183D7F6-B498-43B3-948B-1728B52AA6E4}">
+                <adec:decorative xmlns:adec="http://schemas.microsoft.com/office/drawing/2017/decorative" val="1"/>
+              </a:ext>
+            </a:extLst>
+          </p:cNvPr>
+          <p:cNvSpPr>
+            <a:spLocks noGrp="1" noRot="1" noChangeAspect="1" noMove="1" noResize="1" noEditPoints="1" noAdjustHandles="1" noChangeArrowheads="1" noChangeShapeType="1" noTextEdit="1"/>
+          </p:cNvSpPr>
+          <p:nvPr>
+            <p:extLst>
+              <p:ext uri="{386F3935-93C4-4BCD-93E2-E3B085C9AB24}">
+                <p16:designElem xmlns:p16="http://schemas.microsoft.com/office/powerpoint/2015/main" val="1"/>
+              </p:ext>
+            </p:extLst>
+          </p:nvPr>
+        </p:nvSpPr>
+        <p:spPr>
+          <a:xfrm>
+            <a:off x="0" y="-1"/>
+            <a:ext cx="11292840" cy="6858001"/>
+          </a:xfrm>
+          <a:prstGeom prst="rect">
+            <a:avLst/>
+          </a:prstGeom>
+          <a:solidFill>
+            <a:schemeClr val="tx1"/>
+          </a:solidFill>
+          <a:ln>
+            <a:noFill/>
+          </a:ln>
+        </p:spPr>
+        <p:style>
+          <a:lnRef idx="2">
+            <a:schemeClr val="accent1">
+              <a:shade val="50000"/>
+            </a:schemeClr>
+          </a:lnRef>
+          <a:fillRef idx="1">
+            <a:schemeClr val="accent1"/>
+          </a:fillRef>
+          <a:effectRef idx="0">
+            <a:schemeClr val="accent1"/>
+          </a:effectRef>
+          <a:fontRef idx="minor">
+            <a:schemeClr val="lt1"/>
+          </a:fontRef>
+        </p:style>
+        <p:txBody>
+          <a:bodyPr rtlCol="0" anchor="ctr"/>
+          <a:lstStyle/>
+          <a:p>
+            <a:pPr algn="ctr"/>
+            <a:endParaRPr lang="en-US"/>
+          </a:p>
+        </p:txBody>
+      </p:sp>
+      <p:pic>
+        <p:nvPicPr>
+          <p:cNvPr id="4" name="Picture 4" descr="Maze">
+            <a:extLst>
+              <a:ext uri="{FF2B5EF4-FFF2-40B4-BE49-F238E27FC236}">
+                <a16:creationId xmlns:a16="http://schemas.microsoft.com/office/drawing/2014/main" id="{E450A686-C174-48D8-AD85-3F16996FCDBB}"/>
+              </a:ext>
+            </a:extLst>
+          </p:cNvPr>
+          <p:cNvPicPr>
+            <a:picLocks noChangeAspect="1"/>
+          </p:cNvPicPr>
+          <p:nvPr/>
+        </p:nvPicPr>
+        <p:blipFill rotWithShape="1">
+          <a:blip r:embed="rId2">
+            <a:alphaModFix amt="35000"/>
+          </a:blip>
+          <a:srcRect t="9021"/>
+          <a:stretch/>
+        </p:blipFill>
+        <p:spPr>
+          <a:xfrm>
+            <a:off x="20" y="10"/>
+            <a:ext cx="11292820" cy="6857990"/>
+          </a:xfrm>
+          <a:prstGeom prst="rect">
+            <a:avLst/>
+          </a:prstGeom>
+        </p:spPr>
+      </p:pic>
+      <p:sp>
+        <p:nvSpPr>
+          <p:cNvPr id="2" name="Titolo 1">
+            <a:extLst>
+              <a:ext uri="{FF2B5EF4-FFF2-40B4-BE49-F238E27FC236}">
+                <a16:creationId xmlns:a16="http://schemas.microsoft.com/office/drawing/2014/main" id="{D4B244B0-14BC-4D2F-B5AF-483644B6F9C8}"/>
+              </a:ext>
+            </a:extLst>
+          </p:cNvPr>
+          <p:cNvSpPr>
+            <a:spLocks noGrp="1"/>
+          </p:cNvSpPr>
+          <p:nvPr>
+            <p:ph type="title"/>
+          </p:nvPr>
+        </p:nvSpPr>
+        <p:spPr>
+          <a:xfrm>
+            <a:off x="1261872" y="365760"/>
+            <a:ext cx="9692640" cy="1325562"/>
+          </a:xfrm>
+        </p:spPr>
+        <p:txBody>
+          <a:bodyPr>
+            <a:normAutofit/>
+          </a:bodyPr>
+          <a:lstStyle/>
+          <a:p>
+            <a:r>
+              <a:rPr lang="it-IT" dirty="0" err="1">
+                <a:solidFill>
+                  <a:schemeClr val="bg1"/>
+                </a:solidFill>
+              </a:rPr>
+              <a:t>Other</a:t>
+            </a:r>
+            <a:r>
+              <a:rPr lang="it-IT" dirty="0">
+                <a:solidFill>
+                  <a:schemeClr val="bg1"/>
+                </a:solidFill>
+              </a:rPr>
+              <a:t> tasks</a:t>
+            </a:r>
+          </a:p>
+        </p:txBody>
+      </p:sp>
+      <p:sp>
+        <p:nvSpPr>
+          <p:cNvPr id="3" name="Segnaposto contenuto 2">
+            <a:extLst>
+              <a:ext uri="{FF2B5EF4-FFF2-40B4-BE49-F238E27FC236}">
+                <a16:creationId xmlns:a16="http://schemas.microsoft.com/office/drawing/2014/main" id="{5A1B9CF7-7836-45FA-8266-852C7D3D1E59}"/>
+              </a:ext>
+            </a:extLst>
+          </p:cNvPr>
+          <p:cNvSpPr>
+            <a:spLocks noGrp="1"/>
+          </p:cNvSpPr>
+          <p:nvPr>
+            <p:ph idx="1"/>
+          </p:nvPr>
+        </p:nvSpPr>
+        <p:spPr>
+          <a:xfrm>
+            <a:off x="1261872" y="2005739"/>
+            <a:ext cx="8595360" cy="4174398"/>
+          </a:xfrm>
+        </p:spPr>
+        <p:txBody>
+          <a:bodyPr>
+            <a:normAutofit/>
+          </a:bodyPr>
+          <a:lstStyle/>
+          <a:p>
+            <a:r>
+              <a:rPr lang="it-IT" dirty="0">
+                <a:solidFill>
+                  <a:schemeClr val="bg1"/>
+                </a:solidFill>
+                <a:latin typeface="Courier New" panose="02070309020205020404" pitchFamily="49" charset="0"/>
+                <a:cs typeface="Courier New" panose="02070309020205020404" pitchFamily="49" charset="0"/>
+              </a:rPr>
+              <a:t>learning_to_travel_memory.pl: </a:t>
+            </a:r>
+            <a:r>
+              <a:rPr lang="it-IT" dirty="0" err="1">
+                <a:solidFill>
+                  <a:schemeClr val="bg1"/>
+                </a:solidFill>
+                <a:cs typeface="Courier New" panose="02070309020205020404" pitchFamily="49" charset="0"/>
+              </a:rPr>
+              <a:t>Same</a:t>
+            </a:r>
+            <a:r>
+              <a:rPr lang="it-IT" dirty="0">
+                <a:solidFill>
+                  <a:schemeClr val="bg1"/>
+                </a:solidFill>
+                <a:cs typeface="Courier New" panose="02070309020205020404" pitchFamily="49" charset="0"/>
+              </a:rPr>
+              <a:t> </a:t>
+            </a:r>
+            <a:r>
+              <a:rPr lang="it-IT" dirty="0" err="1">
+                <a:solidFill>
+                  <a:schemeClr val="bg1"/>
+                </a:solidFill>
+                <a:cs typeface="Courier New" panose="02070309020205020404" pitchFamily="49" charset="0"/>
+              </a:rPr>
+              <a:t>as</a:t>
+            </a:r>
+            <a:r>
+              <a:rPr lang="it-IT" dirty="0">
+                <a:solidFill>
+                  <a:schemeClr val="bg1"/>
+                </a:solidFill>
+                <a:cs typeface="Courier New" panose="02070309020205020404" pitchFamily="49" charset="0"/>
+              </a:rPr>
+              <a:t> </a:t>
+            </a:r>
+            <a:r>
+              <a:rPr lang="it-IT" i="1" dirty="0">
+                <a:solidFill>
+                  <a:schemeClr val="bg1"/>
+                </a:solidFill>
+                <a:cs typeface="Courier New" panose="02070309020205020404" pitchFamily="49" charset="0"/>
+              </a:rPr>
+              <a:t>«learning to travel» </a:t>
+            </a:r>
+            <a:r>
+              <a:rPr lang="it-IT" dirty="0" err="1">
+                <a:solidFill>
+                  <a:schemeClr val="bg1"/>
+                </a:solidFill>
+                <a:cs typeface="Courier New" panose="02070309020205020404" pitchFamily="49" charset="0"/>
+              </a:rPr>
+              <a:t>but</a:t>
+            </a:r>
+            <a:r>
+              <a:rPr lang="it-IT" dirty="0">
+                <a:solidFill>
+                  <a:schemeClr val="bg1"/>
+                </a:solidFill>
+                <a:cs typeface="Courier New" panose="02070309020205020404" pitchFamily="49" charset="0"/>
+              </a:rPr>
+              <a:t> </a:t>
+            </a:r>
+            <a:r>
+              <a:rPr lang="it-IT" dirty="0" err="1">
+                <a:solidFill>
+                  <a:schemeClr val="bg1"/>
+                </a:solidFill>
+                <a:cs typeface="Courier New" panose="02070309020205020404" pitchFamily="49" charset="0"/>
+              </a:rPr>
+              <a:t>also</a:t>
+            </a:r>
+            <a:r>
+              <a:rPr lang="it-IT" dirty="0">
+                <a:solidFill>
+                  <a:schemeClr val="bg1"/>
+                </a:solidFill>
+                <a:cs typeface="Courier New" panose="02070309020205020404" pitchFamily="49" charset="0"/>
+              </a:rPr>
+              <a:t> </a:t>
+            </a:r>
+            <a:r>
+              <a:rPr lang="it-IT" dirty="0" err="1">
+                <a:solidFill>
+                  <a:schemeClr val="bg1"/>
+                </a:solidFill>
+                <a:cs typeface="Courier New" panose="02070309020205020404" pitchFamily="49" charset="0"/>
+              </a:rPr>
+              <a:t>keeps</a:t>
+            </a:r>
+            <a:r>
+              <a:rPr lang="it-IT" dirty="0">
+                <a:solidFill>
+                  <a:schemeClr val="bg1"/>
+                </a:solidFill>
+                <a:cs typeface="Courier New" panose="02070309020205020404" pitchFamily="49" charset="0"/>
+              </a:rPr>
+              <a:t> track of the </a:t>
+            </a:r>
+            <a:r>
+              <a:rPr lang="it-IT" dirty="0" err="1">
+                <a:solidFill>
+                  <a:schemeClr val="bg1"/>
+                </a:solidFill>
+                <a:cs typeface="Courier New" panose="02070309020205020404" pitchFamily="49" charset="0"/>
+              </a:rPr>
+              <a:t>path</a:t>
+            </a:r>
+            <a:r>
+              <a:rPr lang="it-IT" dirty="0">
+                <a:solidFill>
+                  <a:schemeClr val="bg1"/>
+                </a:solidFill>
+                <a:cs typeface="Courier New" panose="02070309020205020404" pitchFamily="49" charset="0"/>
+              </a:rPr>
+              <a:t> in a list.</a:t>
+            </a:r>
+          </a:p>
+          <a:p>
+            <a:r>
+              <a:rPr lang="it-IT" dirty="0">
+                <a:solidFill>
+                  <a:schemeClr val="bg1"/>
+                </a:solidFill>
+                <a:latin typeface="Courier New" panose="02070309020205020404" pitchFamily="49" charset="0"/>
+                <a:cs typeface="Courier New" panose="02070309020205020404" pitchFamily="49" charset="0"/>
+              </a:rPr>
+              <a:t>learn_to_win.pl: </a:t>
+            </a:r>
+            <a:r>
+              <a:rPr lang="it-IT" dirty="0">
+                <a:solidFill>
+                  <a:schemeClr val="bg1"/>
+                </a:solidFill>
+                <a:cs typeface="Courier New" panose="02070309020205020404" pitchFamily="49" charset="0"/>
+              </a:rPr>
+              <a:t>Solving the </a:t>
+            </a:r>
+            <a:r>
+              <a:rPr lang="it-IT" dirty="0" err="1">
+                <a:solidFill>
+                  <a:schemeClr val="bg1"/>
+                </a:solidFill>
+                <a:cs typeface="Courier New" panose="02070309020205020404" pitchFamily="49" charset="0"/>
+              </a:rPr>
+              <a:t>Maze</a:t>
+            </a:r>
+            <a:r>
+              <a:rPr lang="it-IT" dirty="0">
+                <a:solidFill>
+                  <a:schemeClr val="bg1"/>
+                </a:solidFill>
+                <a:cs typeface="Courier New" panose="02070309020205020404" pitchFamily="49" charset="0"/>
+              </a:rPr>
+              <a:t> </a:t>
+            </a:r>
+            <a:r>
+              <a:rPr lang="it-IT" dirty="0" err="1">
+                <a:solidFill>
+                  <a:schemeClr val="bg1"/>
+                </a:solidFill>
+                <a:cs typeface="Courier New" panose="02070309020205020404" pitchFamily="49" charset="0"/>
+              </a:rPr>
+              <a:t>problem</a:t>
+            </a:r>
+            <a:r>
+              <a:rPr lang="it-IT" dirty="0">
+                <a:solidFill>
+                  <a:schemeClr val="bg1"/>
+                </a:solidFill>
+                <a:cs typeface="Courier New" panose="02070309020205020404" pitchFamily="49" charset="0"/>
+              </a:rPr>
+              <a:t> </a:t>
+            </a:r>
+            <a:r>
+              <a:rPr lang="it-IT" dirty="0" err="1">
+                <a:solidFill>
+                  <a:schemeClr val="bg1"/>
+                </a:solidFill>
+                <a:cs typeface="Courier New" panose="02070309020205020404" pitchFamily="49" charset="0"/>
+              </a:rPr>
+              <a:t>directly</a:t>
+            </a:r>
+            <a:r>
+              <a:rPr lang="it-IT" dirty="0">
+                <a:solidFill>
+                  <a:schemeClr val="bg1"/>
+                </a:solidFill>
+                <a:cs typeface="Courier New" panose="02070309020205020404" pitchFamily="49" charset="0"/>
+              </a:rPr>
+              <a:t> </a:t>
+            </a:r>
+            <a:r>
+              <a:rPr lang="it-IT" dirty="0" err="1">
+                <a:solidFill>
+                  <a:schemeClr val="bg1"/>
+                </a:solidFill>
+                <a:cs typeface="Courier New" panose="02070309020205020404" pitchFamily="49" charset="0"/>
+              </a:rPr>
+              <a:t>through</a:t>
+            </a:r>
+            <a:r>
+              <a:rPr lang="it-IT" dirty="0">
+                <a:solidFill>
+                  <a:schemeClr val="bg1"/>
+                </a:solidFill>
+                <a:cs typeface="Courier New" panose="02070309020205020404" pitchFamily="49" charset="0"/>
+              </a:rPr>
+              <a:t> ILP. </a:t>
+            </a:r>
+            <a:r>
+              <a:rPr lang="it-IT" dirty="0" err="1">
+                <a:solidFill>
+                  <a:schemeClr val="bg1"/>
+                </a:solidFill>
+                <a:cs typeface="Courier New" panose="02070309020205020404" pitchFamily="49" charset="0"/>
+              </a:rPr>
+              <a:t>Gives</a:t>
+            </a:r>
+            <a:r>
+              <a:rPr lang="it-IT" dirty="0">
+                <a:solidFill>
+                  <a:schemeClr val="bg1"/>
+                </a:solidFill>
+                <a:cs typeface="Courier New" panose="02070309020205020404" pitchFamily="49" charset="0"/>
+              </a:rPr>
+              <a:t> a </a:t>
+            </a:r>
+            <a:r>
+              <a:rPr lang="it-IT" i="1" dirty="0">
+                <a:solidFill>
+                  <a:schemeClr val="bg1"/>
+                </a:solidFill>
+                <a:cs typeface="Courier New" panose="02070309020205020404" pitchFamily="49" charset="0"/>
+              </a:rPr>
+              <a:t>«</a:t>
+            </a:r>
+            <a:r>
+              <a:rPr lang="it-IT" i="1" dirty="0" err="1">
+                <a:solidFill>
+                  <a:schemeClr val="bg1"/>
+                </a:solidFill>
+                <a:cs typeface="Courier New" panose="02070309020205020404" pitchFamily="49" charset="0"/>
+              </a:rPr>
+              <a:t>sequence</a:t>
+            </a:r>
+            <a:r>
+              <a:rPr lang="it-IT" i="1" dirty="0">
+                <a:solidFill>
+                  <a:schemeClr val="bg1"/>
+                </a:solidFill>
+                <a:cs typeface="Courier New" panose="02070309020205020404" pitchFamily="49" charset="0"/>
+              </a:rPr>
+              <a:t> of </a:t>
+            </a:r>
+            <a:r>
+              <a:rPr lang="it-IT" i="1" dirty="0" err="1">
+                <a:solidFill>
+                  <a:schemeClr val="bg1"/>
+                </a:solidFill>
+                <a:cs typeface="Courier New" panose="02070309020205020404" pitchFamily="49" charset="0"/>
+              </a:rPr>
+              <a:t>predicates</a:t>
+            </a:r>
+            <a:r>
+              <a:rPr lang="it-IT" i="1" dirty="0">
+                <a:solidFill>
+                  <a:schemeClr val="bg1"/>
+                </a:solidFill>
+                <a:cs typeface="Courier New" panose="02070309020205020404" pitchFamily="49" charset="0"/>
+              </a:rPr>
+              <a:t>» </a:t>
+            </a:r>
+            <a:r>
+              <a:rPr lang="it-IT" dirty="0">
+                <a:solidFill>
+                  <a:schemeClr val="bg1"/>
+                </a:solidFill>
+                <a:cs typeface="Courier New" panose="02070309020205020404" pitchFamily="49" charset="0"/>
+              </a:rPr>
+              <a:t>to </a:t>
+            </a:r>
+            <a:r>
+              <a:rPr lang="it-IT" dirty="0" err="1">
+                <a:solidFill>
+                  <a:schemeClr val="bg1"/>
+                </a:solidFill>
+                <a:cs typeface="Courier New" panose="02070309020205020404" pitchFamily="49" charset="0"/>
+              </a:rPr>
+              <a:t>reach</a:t>
+            </a:r>
+            <a:r>
+              <a:rPr lang="it-IT" dirty="0">
+                <a:solidFill>
+                  <a:schemeClr val="bg1"/>
+                </a:solidFill>
+                <a:cs typeface="Courier New" panose="02070309020205020404" pitchFamily="49" charset="0"/>
+              </a:rPr>
+              <a:t> the goal </a:t>
+            </a:r>
+            <a:r>
+              <a:rPr lang="it-IT" dirty="0" err="1">
+                <a:solidFill>
+                  <a:schemeClr val="bg1"/>
+                </a:solidFill>
+                <a:cs typeface="Courier New" panose="02070309020205020404" pitchFamily="49" charset="0"/>
+              </a:rPr>
+              <a:t>cell</a:t>
+            </a:r>
+            <a:r>
+              <a:rPr lang="it-IT" dirty="0">
+                <a:solidFill>
+                  <a:schemeClr val="bg1"/>
+                </a:solidFill>
+                <a:cs typeface="Courier New" panose="02070309020205020404" pitchFamily="49" charset="0"/>
+              </a:rPr>
+              <a:t> from the start </a:t>
+            </a:r>
+            <a:r>
+              <a:rPr lang="it-IT" dirty="0" err="1">
+                <a:solidFill>
+                  <a:schemeClr val="bg1"/>
+                </a:solidFill>
+                <a:cs typeface="Courier New" panose="02070309020205020404" pitchFamily="49" charset="0"/>
+              </a:rPr>
+              <a:t>cell</a:t>
+            </a:r>
+            <a:r>
+              <a:rPr lang="it-IT" dirty="0">
+                <a:solidFill>
+                  <a:schemeClr val="bg1"/>
+                </a:solidFill>
+                <a:cs typeface="Courier New" panose="02070309020205020404" pitchFamily="49" charset="0"/>
+              </a:rPr>
+              <a:t>.</a:t>
+            </a:r>
+            <a:endParaRPr lang="it-IT" dirty="0">
+              <a:solidFill>
+                <a:schemeClr val="bg1"/>
+              </a:solidFill>
+              <a:latin typeface="Courier New" panose="02070309020205020404" pitchFamily="49" charset="0"/>
+              <a:cs typeface="Courier New" panose="02070309020205020404" pitchFamily="49" charset="0"/>
+            </a:endParaRPr>
+          </a:p>
+          <a:p>
+            <a:r>
+              <a:rPr lang="it-IT" dirty="0">
+                <a:solidFill>
+                  <a:schemeClr val="bg1"/>
+                </a:solidFill>
+                <a:latin typeface="Courier New" panose="02070309020205020404" pitchFamily="49" charset="0"/>
+                <a:cs typeface="Courier New" panose="02070309020205020404" pitchFamily="49" charset="0"/>
+              </a:rPr>
+              <a:t>reach_from_scratch.pl: </a:t>
+            </a:r>
+            <a:r>
+              <a:rPr lang="it-IT" dirty="0" err="1">
+                <a:solidFill>
+                  <a:schemeClr val="bg1"/>
+                </a:solidFill>
+                <a:cs typeface="Courier New" panose="02070309020205020404" pitchFamily="49" charset="0"/>
+              </a:rPr>
+              <a:t>Learns</a:t>
+            </a:r>
+            <a:r>
+              <a:rPr lang="it-IT" dirty="0">
+                <a:solidFill>
+                  <a:schemeClr val="bg1"/>
+                </a:solidFill>
+                <a:cs typeface="Courier New" panose="02070309020205020404" pitchFamily="49" charset="0"/>
+              </a:rPr>
+              <a:t> to </a:t>
+            </a:r>
+            <a:r>
+              <a:rPr lang="it-IT" dirty="0" err="1">
+                <a:solidFill>
+                  <a:schemeClr val="bg1"/>
+                </a:solidFill>
+                <a:cs typeface="Courier New" panose="02070309020205020404" pitchFamily="49" charset="0"/>
+              </a:rPr>
+              <a:t>move</a:t>
+            </a:r>
+            <a:r>
+              <a:rPr lang="it-IT" dirty="0">
+                <a:solidFill>
+                  <a:schemeClr val="bg1"/>
+                </a:solidFill>
+                <a:cs typeface="Courier New" panose="02070309020205020404" pitchFamily="49" charset="0"/>
+              </a:rPr>
+              <a:t> </a:t>
+            </a:r>
+            <a:r>
+              <a:rPr lang="it-IT" dirty="0" err="1">
+                <a:solidFill>
+                  <a:schemeClr val="bg1"/>
+                </a:solidFill>
+                <a:cs typeface="Courier New" panose="02070309020205020404" pitchFamily="49" charset="0"/>
+              </a:rPr>
+              <a:t>between</a:t>
+            </a:r>
+            <a:r>
+              <a:rPr lang="it-IT" dirty="0">
+                <a:solidFill>
+                  <a:schemeClr val="bg1"/>
+                </a:solidFill>
+                <a:cs typeface="Courier New" panose="02070309020205020404" pitchFamily="49" charset="0"/>
+              </a:rPr>
+              <a:t> </a:t>
+            </a:r>
+            <a:r>
+              <a:rPr lang="it-IT" dirty="0" err="1">
+                <a:solidFill>
+                  <a:schemeClr val="bg1"/>
+                </a:solidFill>
+                <a:cs typeface="Courier New" panose="02070309020205020404" pitchFamily="49" charset="0"/>
+              </a:rPr>
+              <a:t>distant</a:t>
+            </a:r>
+            <a:r>
+              <a:rPr lang="it-IT" dirty="0">
+                <a:solidFill>
+                  <a:schemeClr val="bg1"/>
+                </a:solidFill>
+                <a:cs typeface="Courier New" panose="02070309020205020404" pitchFamily="49" charset="0"/>
+              </a:rPr>
+              <a:t> </a:t>
+            </a:r>
+            <a:r>
+              <a:rPr lang="it-IT" dirty="0" err="1">
+                <a:solidFill>
+                  <a:schemeClr val="bg1"/>
+                </a:solidFill>
+                <a:cs typeface="Courier New" panose="02070309020205020404" pitchFamily="49" charset="0"/>
+              </a:rPr>
+              <a:t>cells</a:t>
+            </a:r>
+            <a:r>
+              <a:rPr lang="it-IT" dirty="0">
+                <a:solidFill>
+                  <a:schemeClr val="bg1"/>
+                </a:solidFill>
+                <a:cs typeface="Courier New" panose="02070309020205020404" pitchFamily="49" charset="0"/>
+              </a:rPr>
+              <a:t> </a:t>
+            </a:r>
+            <a:r>
+              <a:rPr lang="it-IT" dirty="0" err="1">
+                <a:solidFill>
+                  <a:schemeClr val="bg1"/>
+                </a:solidFill>
+                <a:cs typeface="Courier New" panose="02070309020205020404" pitchFamily="49" charset="0"/>
+              </a:rPr>
+              <a:t>but</a:t>
+            </a:r>
+            <a:r>
+              <a:rPr lang="it-IT" dirty="0">
+                <a:solidFill>
+                  <a:schemeClr val="bg1"/>
+                </a:solidFill>
+                <a:cs typeface="Courier New" panose="02070309020205020404" pitchFamily="49" charset="0"/>
+              </a:rPr>
+              <a:t> </a:t>
+            </a:r>
+            <a:r>
+              <a:rPr lang="it-IT" dirty="0" err="1">
+                <a:solidFill>
+                  <a:schemeClr val="bg1"/>
+                </a:solidFill>
+                <a:cs typeface="Courier New" panose="02070309020205020404" pitchFamily="49" charset="0"/>
+              </a:rPr>
+              <a:t>without</a:t>
+            </a:r>
+            <a:r>
+              <a:rPr lang="it-IT" dirty="0">
+                <a:solidFill>
+                  <a:schemeClr val="bg1"/>
+                </a:solidFill>
+                <a:cs typeface="Courier New" panose="02070309020205020404" pitchFamily="49" charset="0"/>
+              </a:rPr>
+              <a:t> </a:t>
+            </a:r>
+            <a:r>
+              <a:rPr lang="it-IT" dirty="0" err="1">
+                <a:solidFill>
+                  <a:schemeClr val="bg1"/>
+                </a:solidFill>
+                <a:cs typeface="Courier New" panose="02070309020205020404" pitchFamily="49" charset="0"/>
+              </a:rPr>
+              <a:t>knowing</a:t>
+            </a:r>
+            <a:r>
+              <a:rPr lang="it-IT" dirty="0">
+                <a:solidFill>
+                  <a:schemeClr val="bg1"/>
+                </a:solidFill>
+                <a:cs typeface="Courier New" panose="02070309020205020404" pitchFamily="49" charset="0"/>
+              </a:rPr>
+              <a:t> </a:t>
+            </a:r>
+            <a:r>
+              <a:rPr lang="it-IT" dirty="0" err="1">
+                <a:solidFill>
+                  <a:schemeClr val="bg1"/>
+                </a:solidFill>
+                <a:cs typeface="Courier New" panose="02070309020205020404" pitchFamily="49" charset="0"/>
+              </a:rPr>
+              <a:t>how</a:t>
+            </a:r>
+            <a:r>
+              <a:rPr lang="it-IT" dirty="0">
+                <a:solidFill>
+                  <a:schemeClr val="bg1"/>
+                </a:solidFill>
+                <a:cs typeface="Courier New" panose="02070309020205020404" pitchFamily="49" charset="0"/>
+              </a:rPr>
+              <a:t> to </a:t>
+            </a:r>
+            <a:r>
+              <a:rPr lang="it-IT" dirty="0" err="1">
+                <a:solidFill>
+                  <a:schemeClr val="bg1"/>
+                </a:solidFill>
+                <a:cs typeface="Courier New" panose="02070309020205020404" pitchFamily="49" charset="0"/>
+              </a:rPr>
+              <a:t>move</a:t>
+            </a:r>
+            <a:r>
+              <a:rPr lang="it-IT" dirty="0">
+                <a:solidFill>
+                  <a:schemeClr val="bg1"/>
+                </a:solidFill>
+                <a:cs typeface="Courier New" panose="02070309020205020404" pitchFamily="49" charset="0"/>
+              </a:rPr>
+              <a:t> </a:t>
+            </a:r>
+            <a:r>
+              <a:rPr lang="it-IT" dirty="0" err="1">
+                <a:solidFill>
+                  <a:schemeClr val="bg1"/>
+                </a:solidFill>
+                <a:cs typeface="Courier New" panose="02070309020205020404" pitchFamily="49" charset="0"/>
+              </a:rPr>
+              <a:t>between</a:t>
+            </a:r>
+            <a:r>
+              <a:rPr lang="it-IT" dirty="0">
+                <a:solidFill>
+                  <a:schemeClr val="bg1"/>
+                </a:solidFill>
+                <a:cs typeface="Courier New" panose="02070309020205020404" pitchFamily="49" charset="0"/>
+              </a:rPr>
+              <a:t> </a:t>
+            </a:r>
+            <a:r>
+              <a:rPr lang="it-IT" dirty="0" err="1">
+                <a:solidFill>
+                  <a:schemeClr val="bg1"/>
+                </a:solidFill>
+                <a:cs typeface="Courier New" panose="02070309020205020404" pitchFamily="49" charset="0"/>
+              </a:rPr>
+              <a:t>adjacent</a:t>
+            </a:r>
+            <a:r>
+              <a:rPr lang="it-IT" dirty="0">
+                <a:solidFill>
+                  <a:schemeClr val="bg1"/>
+                </a:solidFill>
+                <a:cs typeface="Courier New" panose="02070309020205020404" pitchFamily="49" charset="0"/>
+              </a:rPr>
+              <a:t>, </a:t>
+            </a:r>
+            <a:r>
+              <a:rPr lang="it-IT" dirty="0" err="1">
+                <a:solidFill>
+                  <a:schemeClr val="bg1"/>
+                </a:solidFill>
+                <a:cs typeface="Courier New" panose="02070309020205020404" pitchFamily="49" charset="0"/>
+              </a:rPr>
+              <a:t>legal</a:t>
+            </a:r>
+            <a:r>
+              <a:rPr lang="it-IT" dirty="0">
+                <a:solidFill>
+                  <a:schemeClr val="bg1"/>
+                </a:solidFill>
+                <a:cs typeface="Courier New" panose="02070309020205020404" pitchFamily="49" charset="0"/>
+              </a:rPr>
+              <a:t> </a:t>
+            </a:r>
+            <a:r>
+              <a:rPr lang="it-IT" dirty="0" err="1">
+                <a:solidFill>
+                  <a:schemeClr val="bg1"/>
+                </a:solidFill>
+                <a:cs typeface="Courier New" panose="02070309020205020404" pitchFamily="49" charset="0"/>
+              </a:rPr>
+              <a:t>cells</a:t>
+            </a:r>
+            <a:r>
+              <a:rPr lang="it-IT" dirty="0">
+                <a:solidFill>
+                  <a:schemeClr val="bg1"/>
+                </a:solidFill>
+                <a:cs typeface="Courier New" panose="02070309020205020404" pitchFamily="49" charset="0"/>
+              </a:rPr>
+              <a:t>. </a:t>
+            </a:r>
+            <a:r>
+              <a:rPr lang="it-IT" dirty="0" err="1">
+                <a:solidFill>
+                  <a:schemeClr val="bg1"/>
+                </a:solidFill>
+                <a:cs typeface="Courier New" panose="02070309020205020404" pitchFamily="49" charset="0"/>
+              </a:rPr>
+              <a:t>Examples</a:t>
+            </a:r>
+            <a:r>
+              <a:rPr lang="it-IT" dirty="0">
+                <a:solidFill>
+                  <a:schemeClr val="bg1"/>
+                </a:solidFill>
+                <a:cs typeface="Courier New" panose="02070309020205020404" pitchFamily="49" charset="0"/>
+              </a:rPr>
+              <a:t> are key.</a:t>
+            </a:r>
+          </a:p>
+          <a:p>
+            <a:endParaRPr lang="it-IT" dirty="0">
+              <a:solidFill>
+                <a:schemeClr val="bg1"/>
+              </a:solidFill>
+              <a:latin typeface="Courier New" panose="02070309020205020404" pitchFamily="49" charset="0"/>
+              <a:cs typeface="Courier New" panose="02070309020205020404" pitchFamily="49" charset="0"/>
+            </a:endParaRPr>
+          </a:p>
+        </p:txBody>
+      </p:sp>
+    </p:spTree>
+    <p:extLst>
+      <p:ext uri="{BB962C8B-B14F-4D97-AF65-F5344CB8AC3E}">
+        <p14:creationId xmlns:p14="http://schemas.microsoft.com/office/powerpoint/2010/main" val="2386237977"/>
+      </p:ext>
+    </p:extLst>
+  </p:cSld>
+  <p:clrMapOvr>
+    <a:masterClrMapping/>
+  </p:clrMapOvr>
+</p:sld>
+</file>
+
 <file path=ppt/slides/slide2.xml><?xml version="1.0" encoding="utf-8"?>
 <p:sld xmlns:a="http://schemas.openxmlformats.org/drawingml/2006/main" xmlns:r="http://schemas.openxmlformats.org/officeDocument/2006/relationships" xmlns:p="http://schemas.openxmlformats.org/presentationml/2006/main">
   <p:cSld>
@@ -7485,6 +9118,2228 @@
     <p:extLst>
       <p:ext uri="{BB962C8B-B14F-4D97-AF65-F5344CB8AC3E}">
         <p14:creationId xmlns:p14="http://schemas.microsoft.com/office/powerpoint/2010/main" val="2146634249"/>
+      </p:ext>
+    </p:extLst>
+  </p:cSld>
+  <p:clrMapOvr>
+    <a:masterClrMapping/>
+  </p:clrMapOvr>
+</p:sld>
+</file>
+
+<file path=ppt/slides/slide5.xml><?xml version="1.0" encoding="utf-8"?>
+<p:sld xmlns:a="http://schemas.openxmlformats.org/drawingml/2006/main" xmlns:r="http://schemas.openxmlformats.org/officeDocument/2006/relationships" xmlns:p="http://schemas.openxmlformats.org/presentationml/2006/main">
+  <p:cSld>
+    <p:spTree>
+      <p:nvGrpSpPr>
+        <p:cNvPr id="1" name=""/>
+        <p:cNvGrpSpPr/>
+        <p:nvPr/>
+      </p:nvGrpSpPr>
+      <p:grpSpPr>
+        <a:xfrm>
+          <a:off x="0" y="0"/>
+          <a:ext cx="0" cy="0"/>
+          <a:chOff x="0" y="0"/>
+          <a:chExt cx="0" cy="0"/>
+        </a:xfrm>
+      </p:grpSpPr>
+      <p:sp>
+        <p:nvSpPr>
+          <p:cNvPr id="4" name="Titolo 3">
+            <a:extLst>
+              <a:ext uri="{FF2B5EF4-FFF2-40B4-BE49-F238E27FC236}">
+                <a16:creationId xmlns:a16="http://schemas.microsoft.com/office/drawing/2014/main" id="{C219A1C0-0B46-405B-A2A6-78424FE9EE86}"/>
+              </a:ext>
+            </a:extLst>
+          </p:cNvPr>
+          <p:cNvSpPr>
+            <a:spLocks noGrp="1"/>
+          </p:cNvSpPr>
+          <p:nvPr>
+            <p:ph type="ctrTitle"/>
+          </p:nvPr>
+        </p:nvSpPr>
+        <p:spPr/>
+        <p:txBody>
+          <a:bodyPr/>
+          <a:lstStyle/>
+          <a:p>
+            <a:r>
+              <a:rPr lang="it-IT" sz="6600" dirty="0" err="1"/>
+              <a:t>Metagol</a:t>
+            </a:r>
+            <a:endParaRPr lang="it-IT" dirty="0"/>
+          </a:p>
+        </p:txBody>
+      </p:sp>
+      <p:sp>
+        <p:nvSpPr>
+          <p:cNvPr id="5" name="Sottotitolo 4">
+            <a:extLst>
+              <a:ext uri="{FF2B5EF4-FFF2-40B4-BE49-F238E27FC236}">
+                <a16:creationId xmlns:a16="http://schemas.microsoft.com/office/drawing/2014/main" id="{1B09F84D-3E3B-4CFC-B045-25FEB4890D73}"/>
+              </a:ext>
+            </a:extLst>
+          </p:cNvPr>
+          <p:cNvSpPr>
+            <a:spLocks noGrp="1"/>
+          </p:cNvSpPr>
+          <p:nvPr>
+            <p:ph type="subTitle" idx="1"/>
+          </p:nvPr>
+        </p:nvSpPr>
+        <p:spPr/>
+        <p:txBody>
+          <a:bodyPr/>
+          <a:lstStyle/>
+          <a:p>
+            <a:endParaRPr lang="it-IT" dirty="0"/>
+          </a:p>
+        </p:txBody>
+      </p:sp>
+    </p:spTree>
+    <p:extLst>
+      <p:ext uri="{BB962C8B-B14F-4D97-AF65-F5344CB8AC3E}">
+        <p14:creationId xmlns:p14="http://schemas.microsoft.com/office/powerpoint/2010/main" val="2213073460"/>
+      </p:ext>
+    </p:extLst>
+  </p:cSld>
+  <p:clrMapOvr>
+    <a:masterClrMapping/>
+  </p:clrMapOvr>
+</p:sld>
+</file>
+
+<file path=ppt/slides/slide6.xml><?xml version="1.0" encoding="utf-8"?>
+<p:sld xmlns:a="http://schemas.openxmlformats.org/drawingml/2006/main" xmlns:r="http://schemas.openxmlformats.org/officeDocument/2006/relationships" xmlns:p="http://schemas.openxmlformats.org/presentationml/2006/main">
+  <p:cSld>
+    <p:bg>
+      <p:bgPr>
+        <a:solidFill>
+          <a:schemeClr val="bg1"/>
+        </a:solidFill>
+        <a:effectLst/>
+      </p:bgPr>
+    </p:bg>
+    <p:spTree>
+      <p:nvGrpSpPr>
+        <p:cNvPr id="1" name=""/>
+        <p:cNvGrpSpPr/>
+        <p:nvPr/>
+      </p:nvGrpSpPr>
+      <p:grpSpPr>
+        <a:xfrm>
+          <a:off x="0" y="0"/>
+          <a:ext cx="0" cy="0"/>
+          <a:chOff x="0" y="0"/>
+          <a:chExt cx="0" cy="0"/>
+        </a:xfrm>
+      </p:grpSpPr>
+      <p:sp>
+        <p:nvSpPr>
+          <p:cNvPr id="2" name="Titolo 1">
+            <a:extLst>
+              <a:ext uri="{FF2B5EF4-FFF2-40B4-BE49-F238E27FC236}">
+                <a16:creationId xmlns:a16="http://schemas.microsoft.com/office/drawing/2014/main" id="{961205A0-A20A-460D-BF41-0547177EC004}"/>
+              </a:ext>
+            </a:extLst>
+          </p:cNvPr>
+          <p:cNvSpPr>
+            <a:spLocks noGrp="1"/>
+          </p:cNvSpPr>
+          <p:nvPr>
+            <p:ph type="title"/>
+          </p:nvPr>
+        </p:nvSpPr>
+        <p:spPr>
+          <a:xfrm>
+            <a:off x="4965290" y="365760"/>
+            <a:ext cx="5997678" cy="1325562"/>
+          </a:xfrm>
+        </p:spPr>
+        <p:txBody>
+          <a:bodyPr>
+            <a:normAutofit/>
+          </a:bodyPr>
+          <a:lstStyle/>
+          <a:p>
+            <a:r>
+              <a:rPr lang="it-IT" dirty="0"/>
+              <a:t>Brief </a:t>
+            </a:r>
+            <a:r>
+              <a:rPr lang="it-IT" dirty="0" err="1"/>
+              <a:t>recap</a:t>
+            </a:r>
+            <a:endParaRPr lang="it-IT" dirty="0"/>
+          </a:p>
+        </p:txBody>
+      </p:sp>
+      <p:pic>
+        <p:nvPicPr>
+          <p:cNvPr id="4" name="Picture 4" descr="Maze">
+            <a:extLst>
+              <a:ext uri="{FF2B5EF4-FFF2-40B4-BE49-F238E27FC236}">
+                <a16:creationId xmlns:a16="http://schemas.microsoft.com/office/drawing/2014/main" id="{F5C4AB35-6373-45C6-8803-7349E7B6A6A9}"/>
+              </a:ext>
+            </a:extLst>
+          </p:cNvPr>
+          <p:cNvPicPr>
+            <a:picLocks noChangeAspect="1"/>
+          </p:cNvPicPr>
+          <p:nvPr/>
+        </p:nvPicPr>
+        <p:blipFill rotWithShape="1">
+          <a:blip r:embed="rId2"/>
+          <a:srcRect l="27355" r="27353" b="-1"/>
+          <a:stretch/>
+        </p:blipFill>
+        <p:spPr>
+          <a:xfrm>
+            <a:off x="20" y="10"/>
+            <a:ext cx="4653291" cy="6857990"/>
+          </a:xfrm>
+          <a:prstGeom prst="rect">
+            <a:avLst/>
+          </a:prstGeom>
+        </p:spPr>
+      </p:pic>
+      <p:sp>
+        <p:nvSpPr>
+          <p:cNvPr id="3" name="Segnaposto contenuto 2">
+            <a:extLst>
+              <a:ext uri="{FF2B5EF4-FFF2-40B4-BE49-F238E27FC236}">
+                <a16:creationId xmlns:a16="http://schemas.microsoft.com/office/drawing/2014/main" id="{BCDD5A86-9E2C-47B9-9ED6-667DF1173A9E}"/>
+              </a:ext>
+            </a:extLst>
+          </p:cNvPr>
+          <p:cNvSpPr>
+            <a:spLocks noGrp="1"/>
+          </p:cNvSpPr>
+          <p:nvPr>
+            <p:ph idx="1"/>
+          </p:nvPr>
+        </p:nvSpPr>
+        <p:spPr>
+          <a:xfrm>
+            <a:off x="4965290" y="2005739"/>
+            <a:ext cx="6015571" cy="4174398"/>
+          </a:xfrm>
+        </p:spPr>
+        <p:txBody>
+          <a:bodyPr>
+            <a:normAutofit/>
+          </a:bodyPr>
+          <a:lstStyle/>
+          <a:p>
+            <a:r>
+              <a:rPr lang="it-IT" dirty="0" err="1"/>
+              <a:t>Four</a:t>
+            </a:r>
+            <a:r>
+              <a:rPr lang="it-IT" dirty="0"/>
+              <a:t> key </a:t>
+            </a:r>
+            <a:r>
+              <a:rPr lang="it-IT" dirty="0" err="1"/>
+              <a:t>components</a:t>
+            </a:r>
+            <a:r>
+              <a:rPr lang="it-IT" dirty="0"/>
+              <a:t>:</a:t>
+            </a:r>
+          </a:p>
+          <a:p>
+            <a:pPr lvl="1"/>
+            <a:r>
+              <a:rPr lang="it-IT" b="1" dirty="0" err="1"/>
+              <a:t>Metarules</a:t>
+            </a:r>
+            <a:r>
+              <a:rPr lang="it-IT" b="1" dirty="0"/>
+              <a:t>.</a:t>
+            </a:r>
+            <a:r>
+              <a:rPr lang="it-IT" dirty="0"/>
+              <a:t> (Language </a:t>
+            </a:r>
+            <a:r>
+              <a:rPr lang="it-IT" dirty="0" err="1"/>
+              <a:t>Bias</a:t>
+            </a:r>
+            <a:r>
+              <a:rPr lang="it-IT" dirty="0"/>
+              <a:t>)</a:t>
+            </a:r>
+          </a:p>
+          <a:p>
+            <a:pPr lvl="1"/>
+            <a:r>
+              <a:rPr lang="it-IT" b="1" dirty="0"/>
+              <a:t>Background Knowledge.</a:t>
+            </a:r>
+          </a:p>
+          <a:p>
+            <a:pPr lvl="1"/>
+            <a:r>
+              <a:rPr lang="it-IT" b="1" dirty="0"/>
+              <a:t>Positive </a:t>
+            </a:r>
+            <a:r>
+              <a:rPr lang="it-IT" b="1" dirty="0" err="1"/>
+              <a:t>examples</a:t>
+            </a:r>
+            <a:r>
+              <a:rPr lang="it-IT" b="1" dirty="0"/>
+              <a:t>.</a:t>
+            </a:r>
+          </a:p>
+          <a:p>
+            <a:pPr lvl="1"/>
+            <a:r>
+              <a:rPr lang="it-IT" b="1" dirty="0"/>
+              <a:t>Negative </a:t>
+            </a:r>
+            <a:r>
+              <a:rPr lang="it-IT" b="1" dirty="0" err="1"/>
+              <a:t>examples</a:t>
+            </a:r>
+            <a:r>
+              <a:rPr lang="it-IT" b="1" dirty="0"/>
+              <a:t>.</a:t>
+            </a:r>
+          </a:p>
+          <a:p>
+            <a:r>
+              <a:rPr lang="it-IT" dirty="0"/>
+              <a:t>Learning procedure:</a:t>
+            </a:r>
+          </a:p>
+          <a:p>
+            <a:pPr marL="617220" lvl="1" indent="-342900">
+              <a:buFont typeface="+mj-lt"/>
+              <a:buAutoNum type="arabicPeriod"/>
+            </a:pPr>
+            <a:r>
+              <a:rPr lang="it-IT" dirty="0"/>
+              <a:t>Select a positive </a:t>
+            </a:r>
+            <a:r>
+              <a:rPr lang="it-IT" dirty="0" err="1"/>
+              <a:t>example</a:t>
+            </a:r>
+            <a:r>
+              <a:rPr lang="it-IT" dirty="0"/>
+              <a:t> to be </a:t>
+            </a:r>
+            <a:r>
+              <a:rPr lang="it-IT" dirty="0" err="1"/>
+              <a:t>proven</a:t>
+            </a:r>
+            <a:r>
+              <a:rPr lang="it-IT" dirty="0"/>
+              <a:t>.</a:t>
+            </a:r>
+          </a:p>
+          <a:p>
+            <a:pPr marL="617220" lvl="1" indent="-342900">
+              <a:buFont typeface="+mj-lt"/>
+              <a:buAutoNum type="arabicPeriod"/>
+            </a:pPr>
+            <a:r>
+              <a:rPr lang="it-IT" dirty="0"/>
+              <a:t>Prove </a:t>
+            </a:r>
+            <a:r>
+              <a:rPr lang="it-IT" dirty="0" err="1"/>
+              <a:t>it</a:t>
+            </a:r>
+            <a:r>
+              <a:rPr lang="it-IT" dirty="0"/>
+              <a:t> </a:t>
+            </a:r>
+            <a:r>
+              <a:rPr lang="it-IT" dirty="0" err="1"/>
+              <a:t>through</a:t>
+            </a:r>
+            <a:r>
+              <a:rPr lang="it-IT" dirty="0"/>
+              <a:t> </a:t>
+            </a:r>
+            <a:r>
+              <a:rPr lang="it-IT" dirty="0" err="1"/>
+              <a:t>either</a:t>
+            </a:r>
+            <a:r>
+              <a:rPr lang="it-IT" dirty="0"/>
+              <a:t> the </a:t>
+            </a:r>
+            <a:r>
+              <a:rPr lang="it-IT" dirty="0" err="1"/>
+              <a:t>existing</a:t>
+            </a:r>
+            <a:r>
+              <a:rPr lang="it-IT" dirty="0"/>
+              <a:t> background knowledge or </a:t>
+            </a:r>
+            <a:r>
+              <a:rPr lang="it-IT" dirty="0" err="1"/>
+              <a:t>clauses</a:t>
+            </a:r>
+            <a:r>
+              <a:rPr lang="it-IT" dirty="0"/>
+              <a:t> </a:t>
+            </a:r>
+            <a:r>
+              <a:rPr lang="it-IT" dirty="0" err="1"/>
+              <a:t>previously</a:t>
+            </a:r>
+            <a:r>
+              <a:rPr lang="it-IT" dirty="0"/>
+              <a:t> </a:t>
+            </a:r>
+            <a:r>
+              <a:rPr lang="it-IT" dirty="0" err="1"/>
+              <a:t>induced</a:t>
+            </a:r>
+            <a:r>
+              <a:rPr lang="it-IT" dirty="0"/>
+              <a:t>.</a:t>
+            </a:r>
+          </a:p>
+          <a:p>
+            <a:pPr marL="617220" lvl="1" indent="-342900">
+              <a:buFont typeface="+mj-lt"/>
+              <a:buAutoNum type="arabicPeriod"/>
+            </a:pPr>
+            <a:r>
+              <a:rPr lang="it-IT" dirty="0"/>
+              <a:t>(</a:t>
+            </a:r>
+            <a:r>
+              <a:rPr lang="it-IT" dirty="0" err="1"/>
+              <a:t>If</a:t>
+            </a:r>
+            <a:r>
+              <a:rPr lang="it-IT" dirty="0"/>
+              <a:t> step 2 </a:t>
+            </a:r>
+            <a:r>
+              <a:rPr lang="it-IT" dirty="0" err="1"/>
+              <a:t>did</a:t>
+            </a:r>
+            <a:r>
+              <a:rPr lang="it-IT" dirty="0"/>
+              <a:t> </a:t>
+            </a:r>
+            <a:r>
+              <a:rPr lang="it-IT" dirty="0" err="1"/>
+              <a:t>not</a:t>
+            </a:r>
+            <a:r>
+              <a:rPr lang="it-IT" dirty="0"/>
+              <a:t> work) </a:t>
+            </a:r>
+            <a:r>
+              <a:rPr lang="it-IT" dirty="0" err="1"/>
+              <a:t>Unify</a:t>
+            </a:r>
+            <a:r>
+              <a:rPr lang="it-IT" dirty="0"/>
+              <a:t> the </a:t>
+            </a:r>
+            <a:r>
+              <a:rPr lang="it-IT" dirty="0" err="1"/>
+              <a:t>example</a:t>
+            </a:r>
+            <a:r>
+              <a:rPr lang="it-IT" dirty="0"/>
+              <a:t> with the head of a </a:t>
+            </a:r>
+            <a:r>
+              <a:rPr lang="it-IT" dirty="0" err="1"/>
+              <a:t>metarule</a:t>
+            </a:r>
+            <a:r>
+              <a:rPr lang="it-IT" dirty="0"/>
+              <a:t> and </a:t>
+            </a:r>
+            <a:r>
+              <a:rPr lang="it-IT" dirty="0" err="1"/>
+              <a:t>repeat</a:t>
+            </a:r>
+            <a:r>
+              <a:rPr lang="it-IT" dirty="0"/>
+              <a:t> the </a:t>
+            </a:r>
+            <a:r>
+              <a:rPr lang="it-IT" dirty="0" err="1"/>
+              <a:t>process</a:t>
+            </a:r>
+            <a:r>
+              <a:rPr lang="it-IT" dirty="0"/>
+              <a:t> for </a:t>
+            </a:r>
+            <a:r>
+              <a:rPr lang="it-IT" dirty="0" err="1"/>
+              <a:t>each</a:t>
+            </a:r>
+            <a:r>
+              <a:rPr lang="it-IT" dirty="0"/>
+              <a:t> of the </a:t>
+            </a:r>
+            <a:r>
+              <a:rPr lang="it-IT" dirty="0" err="1"/>
+              <a:t>atoms</a:t>
+            </a:r>
+            <a:r>
+              <a:rPr lang="it-IT" dirty="0"/>
+              <a:t> in the body.</a:t>
+            </a:r>
+          </a:p>
+          <a:p>
+            <a:pPr marL="617220" lvl="1" indent="-342900">
+              <a:buFont typeface="+mj-lt"/>
+              <a:buAutoNum type="arabicPeriod"/>
+            </a:pPr>
+            <a:r>
+              <a:rPr lang="it-IT" dirty="0"/>
+              <a:t>Once the </a:t>
+            </a:r>
+            <a:r>
+              <a:rPr lang="it-IT" dirty="0" err="1"/>
+              <a:t>hypothesis</a:t>
+            </a:r>
+            <a:r>
+              <a:rPr lang="it-IT" dirty="0"/>
+              <a:t> </a:t>
+            </a:r>
+            <a:r>
+              <a:rPr lang="it-IT" dirty="0" err="1"/>
+              <a:t>is</a:t>
+            </a:r>
+            <a:r>
+              <a:rPr lang="it-IT" dirty="0"/>
+              <a:t> complete, check </a:t>
+            </a:r>
+            <a:r>
+              <a:rPr lang="it-IT" dirty="0" err="1"/>
+              <a:t>its</a:t>
+            </a:r>
+            <a:r>
+              <a:rPr lang="it-IT" dirty="0"/>
+              <a:t> </a:t>
+            </a:r>
+            <a:r>
+              <a:rPr lang="it-IT" dirty="0" err="1"/>
+              <a:t>consistency</a:t>
+            </a:r>
+            <a:r>
+              <a:rPr lang="it-IT" dirty="0"/>
+              <a:t>. </a:t>
+            </a:r>
+            <a:r>
+              <a:rPr lang="it-IT" dirty="0" err="1"/>
+              <a:t>If</a:t>
+            </a:r>
+            <a:r>
+              <a:rPr lang="it-IT" dirty="0"/>
+              <a:t> negative </a:t>
+            </a:r>
+            <a:r>
+              <a:rPr lang="it-IT" dirty="0" err="1"/>
+              <a:t>examples</a:t>
+            </a:r>
+            <a:r>
+              <a:rPr lang="it-IT" dirty="0"/>
+              <a:t> are </a:t>
+            </a:r>
+            <a:r>
+              <a:rPr lang="it-IT" dirty="0" err="1"/>
+              <a:t>covered</a:t>
+            </a:r>
+            <a:r>
+              <a:rPr lang="it-IT" dirty="0"/>
+              <a:t> </a:t>
+            </a:r>
+            <a:r>
+              <a:rPr lang="it-IT" dirty="0" err="1"/>
+              <a:t>then</a:t>
+            </a:r>
+            <a:r>
+              <a:rPr lang="it-IT" dirty="0"/>
+              <a:t> </a:t>
+            </a:r>
+            <a:r>
+              <a:rPr lang="it-IT" dirty="0" err="1"/>
+              <a:t>backtrack</a:t>
+            </a:r>
+            <a:r>
+              <a:rPr lang="it-IT" dirty="0"/>
+              <a:t>.</a:t>
+            </a:r>
+          </a:p>
+        </p:txBody>
+      </p:sp>
+    </p:spTree>
+    <p:extLst>
+      <p:ext uri="{BB962C8B-B14F-4D97-AF65-F5344CB8AC3E}">
+        <p14:creationId xmlns:p14="http://schemas.microsoft.com/office/powerpoint/2010/main" val="2664905817"/>
+      </p:ext>
+    </p:extLst>
+  </p:cSld>
+  <p:clrMapOvr>
+    <a:masterClrMapping/>
+  </p:clrMapOvr>
+</p:sld>
+</file>
+
+<file path=ppt/slides/slide7.xml><?xml version="1.0" encoding="utf-8"?>
+<p:sld xmlns:a="http://schemas.openxmlformats.org/drawingml/2006/main" xmlns:r="http://schemas.openxmlformats.org/officeDocument/2006/relationships" xmlns:p="http://schemas.openxmlformats.org/presentationml/2006/main">
+  <p:cSld>
+    <p:bg>
+      <p:bgPr>
+        <a:solidFill>
+          <a:schemeClr val="bg1"/>
+        </a:solidFill>
+        <a:effectLst/>
+      </p:bgPr>
+    </p:bg>
+    <p:spTree>
+      <p:nvGrpSpPr>
+        <p:cNvPr id="1" name=""/>
+        <p:cNvGrpSpPr/>
+        <p:nvPr/>
+      </p:nvGrpSpPr>
+      <p:grpSpPr>
+        <a:xfrm>
+          <a:off x="0" y="0"/>
+          <a:ext cx="0" cy="0"/>
+          <a:chOff x="0" y="0"/>
+          <a:chExt cx="0" cy="0"/>
+        </a:xfrm>
+      </p:grpSpPr>
+      <p:sp>
+        <p:nvSpPr>
+          <p:cNvPr id="9" name="Rectangle 8">
+            <a:extLst>
+              <a:ext uri="{FF2B5EF4-FFF2-40B4-BE49-F238E27FC236}">
+                <a16:creationId xmlns:a16="http://schemas.microsoft.com/office/drawing/2014/main" id="{989683EB-D202-4B4D-B1BD-8BA6965FBEF5}"/>
+              </a:ext>
+              <a:ext uri="{C183D7F6-B498-43B3-948B-1728B52AA6E4}">
+                <adec:decorative xmlns:adec="http://schemas.microsoft.com/office/drawing/2017/decorative" val="1"/>
+              </a:ext>
+            </a:extLst>
+          </p:cNvPr>
+          <p:cNvSpPr>
+            <a:spLocks noGrp="1" noRot="1" noChangeAspect="1" noMove="1" noResize="1" noEditPoints="1" noAdjustHandles="1" noChangeArrowheads="1" noChangeShapeType="1" noTextEdit="1"/>
+          </p:cNvSpPr>
+          <p:nvPr>
+            <p:extLst>
+              <p:ext uri="{386F3935-93C4-4BCD-93E2-E3B085C9AB24}">
+                <p16:designElem xmlns:p16="http://schemas.microsoft.com/office/powerpoint/2015/main" val="1"/>
+              </p:ext>
+            </p:extLst>
+          </p:nvPr>
+        </p:nvSpPr>
+        <p:spPr>
+          <a:xfrm>
+            <a:off x="0" y="-1"/>
+            <a:ext cx="11292840" cy="6858001"/>
+          </a:xfrm>
+          <a:prstGeom prst="rect">
+            <a:avLst/>
+          </a:prstGeom>
+          <a:solidFill>
+            <a:schemeClr val="tx1"/>
+          </a:solidFill>
+          <a:ln>
+            <a:noFill/>
+          </a:ln>
+        </p:spPr>
+        <p:style>
+          <a:lnRef idx="2">
+            <a:schemeClr val="accent1">
+              <a:shade val="50000"/>
+            </a:schemeClr>
+          </a:lnRef>
+          <a:fillRef idx="1">
+            <a:schemeClr val="accent1"/>
+          </a:fillRef>
+          <a:effectRef idx="0">
+            <a:schemeClr val="accent1"/>
+          </a:effectRef>
+          <a:fontRef idx="minor">
+            <a:schemeClr val="lt1"/>
+          </a:fontRef>
+        </p:style>
+        <p:txBody>
+          <a:bodyPr rtlCol="0" anchor="ctr"/>
+          <a:lstStyle/>
+          <a:p>
+            <a:pPr algn="ctr"/>
+            <a:endParaRPr lang="en-US"/>
+          </a:p>
+        </p:txBody>
+      </p:sp>
+      <p:pic>
+        <p:nvPicPr>
+          <p:cNvPr id="4" name="Picture 4" descr="Maze">
+            <a:extLst>
+              <a:ext uri="{FF2B5EF4-FFF2-40B4-BE49-F238E27FC236}">
+                <a16:creationId xmlns:a16="http://schemas.microsoft.com/office/drawing/2014/main" id="{15FFD1B1-AEEE-4EE4-9047-6C67FEA2BDA9}"/>
+              </a:ext>
+            </a:extLst>
+          </p:cNvPr>
+          <p:cNvPicPr>
+            <a:picLocks noChangeAspect="1"/>
+          </p:cNvPicPr>
+          <p:nvPr/>
+        </p:nvPicPr>
+        <p:blipFill rotWithShape="1">
+          <a:blip r:embed="rId2">
+            <a:alphaModFix amt="35000"/>
+          </a:blip>
+          <a:srcRect t="9021"/>
+          <a:stretch/>
+        </p:blipFill>
+        <p:spPr>
+          <a:xfrm>
+            <a:off x="20" y="10"/>
+            <a:ext cx="11292820" cy="6857990"/>
+          </a:xfrm>
+          <a:prstGeom prst="rect">
+            <a:avLst/>
+          </a:prstGeom>
+        </p:spPr>
+      </p:pic>
+      <p:sp>
+        <p:nvSpPr>
+          <p:cNvPr id="2" name="Titolo 1">
+            <a:extLst>
+              <a:ext uri="{FF2B5EF4-FFF2-40B4-BE49-F238E27FC236}">
+                <a16:creationId xmlns:a16="http://schemas.microsoft.com/office/drawing/2014/main" id="{0A12707C-3206-4993-9DBE-17D9EACB1C00}"/>
+              </a:ext>
+            </a:extLst>
+          </p:cNvPr>
+          <p:cNvSpPr>
+            <a:spLocks noGrp="1"/>
+          </p:cNvSpPr>
+          <p:nvPr>
+            <p:ph type="title"/>
+          </p:nvPr>
+        </p:nvSpPr>
+        <p:spPr>
+          <a:xfrm>
+            <a:off x="1261872" y="365760"/>
+            <a:ext cx="9692640" cy="1325562"/>
+          </a:xfrm>
+        </p:spPr>
+        <p:txBody>
+          <a:bodyPr>
+            <a:normAutofit/>
+          </a:bodyPr>
+          <a:lstStyle/>
+          <a:p>
+            <a:r>
+              <a:rPr lang="it-IT">
+                <a:solidFill>
+                  <a:schemeClr val="bg1"/>
+                </a:solidFill>
+              </a:rPr>
+              <a:t>Learning to walk</a:t>
+            </a:r>
+          </a:p>
+        </p:txBody>
+      </p:sp>
+      <p:sp>
+        <p:nvSpPr>
+          <p:cNvPr id="3" name="Segnaposto contenuto 2">
+            <a:extLst>
+              <a:ext uri="{FF2B5EF4-FFF2-40B4-BE49-F238E27FC236}">
+                <a16:creationId xmlns:a16="http://schemas.microsoft.com/office/drawing/2014/main" id="{D879B614-B7EF-4C41-B525-645B6994B712}"/>
+              </a:ext>
+            </a:extLst>
+          </p:cNvPr>
+          <p:cNvSpPr>
+            <a:spLocks noGrp="1"/>
+          </p:cNvSpPr>
+          <p:nvPr>
+            <p:ph idx="1"/>
+          </p:nvPr>
+        </p:nvSpPr>
+        <p:spPr>
+          <a:xfrm>
+            <a:off x="1261872" y="2005739"/>
+            <a:ext cx="8595360" cy="4174398"/>
+          </a:xfrm>
+        </p:spPr>
+        <p:txBody>
+          <a:bodyPr>
+            <a:normAutofit fontScale="92500"/>
+          </a:bodyPr>
+          <a:lstStyle/>
+          <a:p>
+            <a:r>
+              <a:rPr lang="it-IT" sz="1700" b="1">
+                <a:solidFill>
+                  <a:schemeClr val="bg1"/>
+                </a:solidFill>
+              </a:rPr>
+              <a:t>Goal: </a:t>
+            </a:r>
+            <a:r>
+              <a:rPr lang="it-IT" sz="1700">
+                <a:solidFill>
+                  <a:schemeClr val="bg1"/>
+                </a:solidFill>
+              </a:rPr>
+              <a:t>Learn to move to an </a:t>
+            </a:r>
+            <a:r>
+              <a:rPr lang="it-IT" sz="1700" b="1">
+                <a:solidFill>
+                  <a:schemeClr val="bg1"/>
+                </a:solidFill>
+              </a:rPr>
+              <a:t>adjacent</a:t>
+            </a:r>
+            <a:r>
+              <a:rPr lang="it-IT" sz="1700">
+                <a:solidFill>
+                  <a:schemeClr val="bg1"/>
+                </a:solidFill>
+              </a:rPr>
+              <a:t>, legal cell. (Predicate </a:t>
+            </a:r>
+            <a:r>
+              <a:rPr lang="it-IT" sz="1700">
+                <a:solidFill>
+                  <a:schemeClr val="bg1"/>
+                </a:solidFill>
+                <a:latin typeface="Courier New" panose="02070309020205020404" pitchFamily="49" charset="0"/>
+                <a:cs typeface="Courier New" panose="02070309020205020404" pitchFamily="49" charset="0"/>
+              </a:rPr>
+              <a:t>move/2</a:t>
+            </a:r>
+            <a:r>
+              <a:rPr lang="it-IT" sz="1700">
+                <a:solidFill>
+                  <a:schemeClr val="bg1"/>
+                </a:solidFill>
+              </a:rPr>
+              <a:t>).</a:t>
+            </a:r>
+            <a:endParaRPr lang="it-IT" sz="1700" b="1">
+              <a:solidFill>
+                <a:schemeClr val="bg1"/>
+              </a:solidFill>
+            </a:endParaRPr>
+          </a:p>
+          <a:p>
+            <a:r>
+              <a:rPr lang="it-IT" sz="1700" b="1">
+                <a:solidFill>
+                  <a:schemeClr val="bg1"/>
+                </a:solidFill>
+              </a:rPr>
+              <a:t>Background Knowledge:</a:t>
+            </a:r>
+          </a:p>
+          <a:p>
+            <a:pPr lvl="1"/>
+            <a:r>
+              <a:rPr lang="it-IT" sz="1700">
+                <a:solidFill>
+                  <a:schemeClr val="bg1"/>
+                </a:solidFill>
+                <a:latin typeface="Courier New" panose="02070309020205020404" pitchFamily="49" charset="0"/>
+                <a:cs typeface="Courier New" panose="02070309020205020404" pitchFamily="49" charset="0"/>
+              </a:rPr>
+              <a:t>inc_x/2; dec_x/2; inc_y/2; dec_y/2;</a:t>
+            </a:r>
+          </a:p>
+          <a:p>
+            <a:pPr lvl="1"/>
+            <a:r>
+              <a:rPr lang="it-IT" sz="1700">
+                <a:solidFill>
+                  <a:schemeClr val="bg1"/>
+                </a:solidFill>
+                <a:latin typeface="Courier New" panose="02070309020205020404" pitchFamily="49" charset="0"/>
+                <a:cs typeface="Courier New" panose="02070309020205020404" pitchFamily="49" charset="0"/>
+              </a:rPr>
+              <a:t>Legal_position/1: </a:t>
+            </a:r>
+            <a:r>
+              <a:rPr lang="it-IT" sz="1700">
+                <a:solidFill>
+                  <a:schemeClr val="bg1"/>
+                </a:solidFill>
+                <a:cs typeface="Courier New" panose="02070309020205020404" pitchFamily="49" charset="0"/>
+              </a:rPr>
+              <a:t>Checks whether a cell is in bounds and free from obstacles.</a:t>
+            </a:r>
+            <a:endParaRPr lang="it-IT" sz="1700">
+              <a:solidFill>
+                <a:schemeClr val="bg1"/>
+              </a:solidFill>
+              <a:latin typeface="Courier New" panose="02070309020205020404" pitchFamily="49" charset="0"/>
+              <a:cs typeface="Courier New" panose="02070309020205020404" pitchFamily="49" charset="0"/>
+            </a:endParaRPr>
+          </a:p>
+          <a:p>
+            <a:r>
+              <a:rPr lang="it-IT" sz="1700" b="1">
+                <a:solidFill>
+                  <a:schemeClr val="bg1"/>
+                </a:solidFill>
+                <a:cs typeface="Courier New" panose="02070309020205020404" pitchFamily="49" charset="0"/>
+              </a:rPr>
+              <a:t>Metarules:</a:t>
+            </a:r>
+          </a:p>
+          <a:p>
+            <a:pPr lvl="1"/>
+            <a:r>
+              <a:rPr lang="it-IT" sz="1700">
+                <a:solidFill>
+                  <a:schemeClr val="bg1"/>
+                </a:solidFill>
+                <a:latin typeface="Courier New" panose="02070309020205020404" pitchFamily="49" charset="0"/>
+                <a:cs typeface="Courier New" panose="02070309020205020404" pitchFamily="49" charset="0"/>
+              </a:rPr>
+              <a:t>metarule(ident,[P,Q],[P,A,B],[[Q,A,B]]).</a:t>
+            </a:r>
+          </a:p>
+          <a:p>
+            <a:pPr lvl="1"/>
+            <a:r>
+              <a:rPr lang="it-IT" sz="1700">
+                <a:solidFill>
+                  <a:schemeClr val="bg1"/>
+                </a:solidFill>
+                <a:latin typeface="Courier New" panose="02070309020205020404" pitchFamily="49" charset="0"/>
+                <a:cs typeface="Courier New" panose="02070309020205020404" pitchFamily="49" charset="0"/>
+              </a:rPr>
+              <a:t>metarule(postcon,[P,Q,R],[P,A,B],[[Q,A,B],[R,B]]).</a:t>
+            </a:r>
+          </a:p>
+          <a:p>
+            <a:pPr lvl="1"/>
+            <a:r>
+              <a:rPr lang="it-IT" sz="1700">
+                <a:solidFill>
+                  <a:schemeClr val="bg1"/>
+                </a:solidFill>
+                <a:latin typeface="Courier New" panose="02070309020205020404" pitchFamily="49" charset="0"/>
+                <a:cs typeface="Courier New" panose="02070309020205020404" pitchFamily="49" charset="0"/>
+              </a:rPr>
+              <a:t>metarule(i_postcon,[P,Q,R],[P,A,B],[[R,B],[Q,A,B]]).</a:t>
+            </a:r>
+          </a:p>
+          <a:p>
+            <a:r>
+              <a:rPr lang="it-IT" sz="1700" b="1">
+                <a:solidFill>
+                  <a:schemeClr val="bg1"/>
+                </a:solidFill>
+                <a:cs typeface="Courier New" panose="02070309020205020404" pitchFamily="49" charset="0"/>
+              </a:rPr>
+              <a:t>Positive examples:</a:t>
+            </a:r>
+          </a:p>
+          <a:p>
+            <a:pPr lvl="1"/>
+            <a:r>
+              <a:rPr lang="it-IT" sz="1700">
+                <a:solidFill>
+                  <a:schemeClr val="bg1"/>
+                </a:solidFill>
+                <a:cs typeface="Courier New" panose="02070309020205020404" pitchFamily="49" charset="0"/>
+              </a:rPr>
+              <a:t>One legal move for each direction (up, down, left, right).</a:t>
+            </a:r>
+          </a:p>
+          <a:p>
+            <a:r>
+              <a:rPr lang="it-IT" sz="1700" b="1">
+                <a:solidFill>
+                  <a:schemeClr val="bg1"/>
+                </a:solidFill>
+                <a:cs typeface="Courier New" panose="02070309020205020404" pitchFamily="49" charset="0"/>
+              </a:rPr>
+              <a:t>Negative examples:</a:t>
+            </a:r>
+          </a:p>
+          <a:p>
+            <a:pPr lvl="1"/>
+            <a:r>
+              <a:rPr lang="it-IT" sz="1700">
+                <a:solidFill>
+                  <a:schemeClr val="bg1"/>
+                </a:solidFill>
+                <a:cs typeface="Courier New" panose="02070309020205020404" pitchFamily="49" charset="0"/>
+              </a:rPr>
+              <a:t>One illegal move for each direction.</a:t>
+            </a:r>
+          </a:p>
+        </p:txBody>
+      </p:sp>
+    </p:spTree>
+    <p:extLst>
+      <p:ext uri="{BB962C8B-B14F-4D97-AF65-F5344CB8AC3E}">
+        <p14:creationId xmlns:p14="http://schemas.microsoft.com/office/powerpoint/2010/main" val="4194125777"/>
+      </p:ext>
+    </p:extLst>
+  </p:cSld>
+  <p:clrMapOvr>
+    <a:masterClrMapping/>
+  </p:clrMapOvr>
+</p:sld>
+</file>
+
+<file path=ppt/slides/slide8.xml><?xml version="1.0" encoding="utf-8"?>
+<p:sld xmlns:a="http://schemas.openxmlformats.org/drawingml/2006/main" xmlns:r="http://schemas.openxmlformats.org/officeDocument/2006/relationships" xmlns:p="http://schemas.openxmlformats.org/presentationml/2006/main">
+  <p:cSld>
+    <p:bg>
+      <p:bgPr>
+        <a:solidFill>
+          <a:schemeClr val="bg1"/>
+        </a:solidFill>
+        <a:effectLst/>
+      </p:bgPr>
+    </p:bg>
+    <p:spTree>
+      <p:nvGrpSpPr>
+        <p:cNvPr id="1" name=""/>
+        <p:cNvGrpSpPr/>
+        <p:nvPr/>
+      </p:nvGrpSpPr>
+      <p:grpSpPr>
+        <a:xfrm>
+          <a:off x="0" y="0"/>
+          <a:ext cx="0" cy="0"/>
+          <a:chOff x="0" y="0"/>
+          <a:chExt cx="0" cy="0"/>
+        </a:xfrm>
+      </p:grpSpPr>
+      <p:sp>
+        <p:nvSpPr>
+          <p:cNvPr id="9" name="Rectangle 8">
+            <a:extLst>
+              <a:ext uri="{FF2B5EF4-FFF2-40B4-BE49-F238E27FC236}">
+                <a16:creationId xmlns:a16="http://schemas.microsoft.com/office/drawing/2014/main" id="{989683EB-D202-4B4D-B1BD-8BA6965FBEF5}"/>
+              </a:ext>
+              <a:ext uri="{C183D7F6-B498-43B3-948B-1728B52AA6E4}">
+                <adec:decorative xmlns:adec="http://schemas.microsoft.com/office/drawing/2017/decorative" val="1"/>
+              </a:ext>
+            </a:extLst>
+          </p:cNvPr>
+          <p:cNvSpPr>
+            <a:spLocks noGrp="1" noRot="1" noChangeAspect="1" noMove="1" noResize="1" noEditPoints="1" noAdjustHandles="1" noChangeArrowheads="1" noChangeShapeType="1" noTextEdit="1"/>
+          </p:cNvSpPr>
+          <p:nvPr>
+            <p:extLst>
+              <p:ext uri="{386F3935-93C4-4BCD-93E2-E3B085C9AB24}">
+                <p16:designElem xmlns:p16="http://schemas.microsoft.com/office/powerpoint/2015/main" val="1"/>
+              </p:ext>
+            </p:extLst>
+          </p:nvPr>
+        </p:nvSpPr>
+        <p:spPr>
+          <a:xfrm>
+            <a:off x="0" y="-1"/>
+            <a:ext cx="11292840" cy="6858001"/>
+          </a:xfrm>
+          <a:prstGeom prst="rect">
+            <a:avLst/>
+          </a:prstGeom>
+          <a:solidFill>
+            <a:schemeClr val="tx1"/>
+          </a:solidFill>
+          <a:ln>
+            <a:noFill/>
+          </a:ln>
+        </p:spPr>
+        <p:style>
+          <a:lnRef idx="2">
+            <a:schemeClr val="accent1">
+              <a:shade val="50000"/>
+            </a:schemeClr>
+          </a:lnRef>
+          <a:fillRef idx="1">
+            <a:schemeClr val="accent1"/>
+          </a:fillRef>
+          <a:effectRef idx="0">
+            <a:schemeClr val="accent1"/>
+          </a:effectRef>
+          <a:fontRef idx="minor">
+            <a:schemeClr val="lt1"/>
+          </a:fontRef>
+        </p:style>
+        <p:txBody>
+          <a:bodyPr rtlCol="0" anchor="ctr"/>
+          <a:lstStyle/>
+          <a:p>
+            <a:pPr algn="ctr"/>
+            <a:endParaRPr lang="en-US"/>
+          </a:p>
+        </p:txBody>
+      </p:sp>
+      <p:pic>
+        <p:nvPicPr>
+          <p:cNvPr id="4" name="Picture 4" descr="Maze">
+            <a:extLst>
+              <a:ext uri="{FF2B5EF4-FFF2-40B4-BE49-F238E27FC236}">
+                <a16:creationId xmlns:a16="http://schemas.microsoft.com/office/drawing/2014/main" id="{5511DBA9-FF92-407F-A794-61FC31C5161F}"/>
+              </a:ext>
+            </a:extLst>
+          </p:cNvPr>
+          <p:cNvPicPr>
+            <a:picLocks noChangeAspect="1"/>
+          </p:cNvPicPr>
+          <p:nvPr/>
+        </p:nvPicPr>
+        <p:blipFill rotWithShape="1">
+          <a:blip r:embed="rId2">
+            <a:alphaModFix amt="35000"/>
+          </a:blip>
+          <a:srcRect t="9021"/>
+          <a:stretch/>
+        </p:blipFill>
+        <p:spPr>
+          <a:xfrm>
+            <a:off x="20" y="10"/>
+            <a:ext cx="11292820" cy="6857990"/>
+          </a:xfrm>
+          <a:prstGeom prst="rect">
+            <a:avLst/>
+          </a:prstGeom>
+        </p:spPr>
+      </p:pic>
+      <p:sp>
+        <p:nvSpPr>
+          <p:cNvPr id="2" name="Titolo 1">
+            <a:extLst>
+              <a:ext uri="{FF2B5EF4-FFF2-40B4-BE49-F238E27FC236}">
+                <a16:creationId xmlns:a16="http://schemas.microsoft.com/office/drawing/2014/main" id="{77994A76-64F1-4AEE-BC4F-FB664D9A36F7}"/>
+              </a:ext>
+            </a:extLst>
+          </p:cNvPr>
+          <p:cNvSpPr>
+            <a:spLocks noGrp="1"/>
+          </p:cNvSpPr>
+          <p:nvPr>
+            <p:ph type="title"/>
+          </p:nvPr>
+        </p:nvSpPr>
+        <p:spPr>
+          <a:xfrm>
+            <a:off x="1261872" y="365760"/>
+            <a:ext cx="9692640" cy="1325562"/>
+          </a:xfrm>
+        </p:spPr>
+        <p:txBody>
+          <a:bodyPr>
+            <a:normAutofit/>
+          </a:bodyPr>
+          <a:lstStyle/>
+          <a:p>
+            <a:r>
+              <a:rPr lang="it-IT">
+                <a:solidFill>
+                  <a:schemeClr val="bg1"/>
+                </a:solidFill>
+              </a:rPr>
+              <a:t>Interesting points</a:t>
+            </a:r>
+          </a:p>
+        </p:txBody>
+      </p:sp>
+      <p:sp>
+        <p:nvSpPr>
+          <p:cNvPr id="3" name="Segnaposto contenuto 2">
+            <a:extLst>
+              <a:ext uri="{FF2B5EF4-FFF2-40B4-BE49-F238E27FC236}">
+                <a16:creationId xmlns:a16="http://schemas.microsoft.com/office/drawing/2014/main" id="{C7D1522B-DD16-4ED0-B890-B3427CE8EB23}"/>
+              </a:ext>
+            </a:extLst>
+          </p:cNvPr>
+          <p:cNvSpPr>
+            <a:spLocks noGrp="1"/>
+          </p:cNvSpPr>
+          <p:nvPr>
+            <p:ph idx="1"/>
+          </p:nvPr>
+        </p:nvSpPr>
+        <p:spPr>
+          <a:xfrm>
+            <a:off x="1261872" y="2005739"/>
+            <a:ext cx="8595360" cy="4174398"/>
+          </a:xfrm>
+        </p:spPr>
+        <p:txBody>
+          <a:bodyPr>
+            <a:normAutofit/>
+          </a:bodyPr>
+          <a:lstStyle/>
+          <a:p>
+            <a:r>
+              <a:rPr lang="it-IT">
+                <a:solidFill>
+                  <a:schemeClr val="bg1"/>
+                </a:solidFill>
+              </a:rPr>
+              <a:t>The power of metarules:</a:t>
+            </a:r>
+          </a:p>
+          <a:p>
+            <a:pPr lvl="1"/>
+            <a:r>
+              <a:rPr lang="it-IT">
+                <a:solidFill>
+                  <a:schemeClr val="bg1"/>
+                </a:solidFill>
+              </a:rPr>
+              <a:t>Using </a:t>
+            </a:r>
+            <a:r>
+              <a:rPr lang="it-IT">
+                <a:solidFill>
+                  <a:schemeClr val="bg1"/>
+                </a:solidFill>
+                <a:latin typeface="Courier New" panose="02070309020205020404" pitchFamily="49" charset="0"/>
+                <a:cs typeface="Courier New" panose="02070309020205020404" pitchFamily="49" charset="0"/>
+              </a:rPr>
+              <a:t>postcon</a:t>
+            </a:r>
+            <a:r>
+              <a:rPr lang="it-IT">
+                <a:solidFill>
+                  <a:schemeClr val="bg1"/>
+                </a:solidFill>
+              </a:rPr>
+              <a:t>:</a:t>
+            </a:r>
+          </a:p>
+          <a:p>
+            <a:pPr marL="548640" lvl="2" indent="0">
+              <a:buNone/>
+            </a:pPr>
+            <a:r>
+              <a:rPr lang="en-US">
+                <a:solidFill>
+                  <a:schemeClr val="bg1"/>
+                </a:solidFill>
+                <a:latin typeface="Courier New" panose="02070309020205020404" pitchFamily="49" charset="0"/>
+                <a:cs typeface="Courier New" panose="02070309020205020404" pitchFamily="49" charset="0"/>
+              </a:rPr>
+              <a:t>move(A,B):-inc_x(A,B),legal_position(B).</a:t>
+            </a:r>
+          </a:p>
+          <a:p>
+            <a:pPr marL="548640" lvl="2" indent="0">
+              <a:buNone/>
+            </a:pPr>
+            <a:r>
+              <a:rPr lang="en-US">
+                <a:solidFill>
+                  <a:schemeClr val="bg1"/>
+                </a:solidFill>
+                <a:latin typeface="Courier New" panose="02070309020205020404" pitchFamily="49" charset="0"/>
+                <a:cs typeface="Courier New" panose="02070309020205020404" pitchFamily="49" charset="0"/>
+              </a:rPr>
+              <a:t>move(A,B):-inc_y(A,B),legal_position(B).</a:t>
+            </a:r>
+          </a:p>
+          <a:p>
+            <a:pPr marL="548640" lvl="2" indent="0">
+              <a:buNone/>
+            </a:pPr>
+            <a:r>
+              <a:rPr lang="en-US">
+                <a:solidFill>
+                  <a:schemeClr val="bg1"/>
+                </a:solidFill>
+                <a:latin typeface="Courier New" panose="02070309020205020404" pitchFamily="49" charset="0"/>
+                <a:cs typeface="Courier New" panose="02070309020205020404" pitchFamily="49" charset="0"/>
+              </a:rPr>
+              <a:t>move(A,B):-dec_x(A,B),legal_position(B).</a:t>
+            </a:r>
+          </a:p>
+          <a:p>
+            <a:pPr marL="548640" lvl="2" indent="0">
+              <a:buNone/>
+            </a:pPr>
+            <a:r>
+              <a:rPr lang="en-US">
+                <a:solidFill>
+                  <a:schemeClr val="bg1"/>
+                </a:solidFill>
+                <a:latin typeface="Courier New" panose="02070309020205020404" pitchFamily="49" charset="0"/>
+                <a:cs typeface="Courier New" panose="02070309020205020404" pitchFamily="49" charset="0"/>
+              </a:rPr>
+              <a:t>move(A,B):-dec_y(A,B),legal_position(B).</a:t>
+            </a:r>
+          </a:p>
+          <a:p>
+            <a:pPr lvl="1"/>
+            <a:r>
+              <a:rPr lang="en-US">
+                <a:solidFill>
+                  <a:schemeClr val="bg1"/>
+                </a:solidFill>
+                <a:cs typeface="Courier New" panose="02070309020205020404" pitchFamily="49" charset="0"/>
+              </a:rPr>
+              <a:t>Using </a:t>
+            </a:r>
+            <a:r>
+              <a:rPr lang="en-US">
+                <a:solidFill>
+                  <a:schemeClr val="bg1"/>
+                </a:solidFill>
+                <a:latin typeface="Courier New" panose="02070309020205020404" pitchFamily="49" charset="0"/>
+                <a:cs typeface="Courier New" panose="02070309020205020404" pitchFamily="49" charset="0"/>
+              </a:rPr>
+              <a:t>i_postcon:</a:t>
+            </a:r>
+          </a:p>
+          <a:p>
+            <a:pPr marL="548640" lvl="2" indent="0">
+              <a:buNone/>
+            </a:pPr>
+            <a:r>
+              <a:rPr lang="en-US">
+                <a:solidFill>
+                  <a:schemeClr val="bg1"/>
+                </a:solidFill>
+                <a:latin typeface="Courier New" panose="02070309020205020404" pitchFamily="49" charset="0"/>
+                <a:cs typeface="Courier New" panose="02070309020205020404" pitchFamily="49" charset="0"/>
+              </a:rPr>
+              <a:t>move(A,B):-legal_position(B),move_1(A,B).</a:t>
+            </a:r>
+          </a:p>
+          <a:p>
+            <a:pPr marL="548640" lvl="2" indent="0">
+              <a:buNone/>
+            </a:pPr>
+            <a:r>
+              <a:rPr lang="en-US">
+                <a:solidFill>
+                  <a:schemeClr val="bg1"/>
+                </a:solidFill>
+                <a:latin typeface="Courier New" panose="02070309020205020404" pitchFamily="49" charset="0"/>
+                <a:cs typeface="Courier New" panose="02070309020205020404" pitchFamily="49" charset="0"/>
+              </a:rPr>
+              <a:t>move_1(A,B):-inc_x(A,B).</a:t>
+            </a:r>
+          </a:p>
+          <a:p>
+            <a:pPr marL="548640" lvl="2" indent="0">
+              <a:buNone/>
+            </a:pPr>
+            <a:r>
+              <a:rPr lang="en-US">
+                <a:solidFill>
+                  <a:schemeClr val="bg1"/>
+                </a:solidFill>
+                <a:latin typeface="Courier New" panose="02070309020205020404" pitchFamily="49" charset="0"/>
+                <a:cs typeface="Courier New" panose="02070309020205020404" pitchFamily="49" charset="0"/>
+              </a:rPr>
+              <a:t>move_1(A,B):-inc_y(A,B).</a:t>
+            </a:r>
+          </a:p>
+          <a:p>
+            <a:pPr marL="548640" lvl="2" indent="0">
+              <a:buNone/>
+            </a:pPr>
+            <a:r>
+              <a:rPr lang="en-US">
+                <a:solidFill>
+                  <a:schemeClr val="bg1"/>
+                </a:solidFill>
+                <a:latin typeface="Courier New" panose="02070309020205020404" pitchFamily="49" charset="0"/>
+                <a:cs typeface="Courier New" panose="02070309020205020404" pitchFamily="49" charset="0"/>
+              </a:rPr>
+              <a:t>move_1(A,B):-dec_x(A,B).</a:t>
+            </a:r>
+          </a:p>
+          <a:p>
+            <a:pPr marL="548640" lvl="2" indent="0">
+              <a:buNone/>
+            </a:pPr>
+            <a:r>
+              <a:rPr lang="en-US">
+                <a:solidFill>
+                  <a:schemeClr val="bg1"/>
+                </a:solidFill>
+                <a:latin typeface="Courier New" panose="02070309020205020404" pitchFamily="49" charset="0"/>
+                <a:cs typeface="Courier New" panose="02070309020205020404" pitchFamily="49" charset="0"/>
+              </a:rPr>
+              <a:t>move_1(A,B):-dec_y(A,B).</a:t>
+            </a:r>
+            <a:endParaRPr lang="it-IT">
+              <a:solidFill>
+                <a:schemeClr val="bg1"/>
+              </a:solidFill>
+              <a:latin typeface="Courier New" panose="02070309020205020404" pitchFamily="49" charset="0"/>
+              <a:cs typeface="Courier New" panose="02070309020205020404" pitchFamily="49" charset="0"/>
+            </a:endParaRPr>
+          </a:p>
+          <a:p>
+            <a:r>
+              <a:rPr lang="it-IT">
+                <a:solidFill>
+                  <a:schemeClr val="bg1"/>
+                </a:solidFill>
+                <a:latin typeface="Courier New" panose="02070309020205020404" pitchFamily="49" charset="0"/>
+                <a:cs typeface="Courier New" panose="02070309020205020404" pitchFamily="49" charset="0"/>
+              </a:rPr>
+              <a:t>i_postcon </a:t>
+            </a:r>
+            <a:r>
+              <a:rPr lang="it-IT">
+                <a:solidFill>
+                  <a:schemeClr val="bg1"/>
+                </a:solidFill>
+                <a:cs typeface="Courier New" panose="02070309020205020404" pitchFamily="49" charset="0"/>
+              </a:rPr>
+              <a:t>is able to «</a:t>
+            </a:r>
+            <a:r>
+              <a:rPr lang="it-IT" b="1">
+                <a:solidFill>
+                  <a:schemeClr val="bg1"/>
+                </a:solidFill>
+                <a:cs typeface="Courier New" panose="02070309020205020404" pitchFamily="49" charset="0"/>
+              </a:rPr>
+              <a:t>invent</a:t>
+            </a:r>
+            <a:r>
+              <a:rPr lang="it-IT">
+                <a:solidFill>
+                  <a:schemeClr val="bg1"/>
+                </a:solidFill>
+                <a:cs typeface="Courier New" panose="02070309020205020404" pitchFamily="49" charset="0"/>
+              </a:rPr>
+              <a:t>» the predicate </a:t>
+            </a:r>
+            <a:r>
+              <a:rPr lang="it-IT">
+                <a:solidFill>
+                  <a:schemeClr val="bg1"/>
+                </a:solidFill>
+                <a:latin typeface="Courier New" panose="02070309020205020404" pitchFamily="49" charset="0"/>
+                <a:cs typeface="Courier New" panose="02070309020205020404" pitchFamily="49" charset="0"/>
+              </a:rPr>
+              <a:t>adjacent/2.</a:t>
+            </a:r>
+            <a:endParaRPr lang="en-US">
+              <a:solidFill>
+                <a:schemeClr val="bg1"/>
+              </a:solidFill>
+              <a:latin typeface="Courier New" panose="02070309020205020404" pitchFamily="49" charset="0"/>
+              <a:cs typeface="Courier New" panose="02070309020205020404" pitchFamily="49" charset="0"/>
+            </a:endParaRPr>
+          </a:p>
+        </p:txBody>
+      </p:sp>
+    </p:spTree>
+    <p:extLst>
+      <p:ext uri="{BB962C8B-B14F-4D97-AF65-F5344CB8AC3E}">
+        <p14:creationId xmlns:p14="http://schemas.microsoft.com/office/powerpoint/2010/main" val="986449292"/>
+      </p:ext>
+    </p:extLst>
+  </p:cSld>
+  <p:clrMapOvr>
+    <a:masterClrMapping/>
+  </p:clrMapOvr>
+</p:sld>
+</file>
+
+<file path=ppt/slides/slide9.xml><?xml version="1.0" encoding="utf-8"?>
+<p:sld xmlns:a="http://schemas.openxmlformats.org/drawingml/2006/main" xmlns:r="http://schemas.openxmlformats.org/officeDocument/2006/relationships" xmlns:p="http://schemas.openxmlformats.org/presentationml/2006/main">
+  <p:cSld>
+    <p:bg>
+      <p:bgPr>
+        <a:solidFill>
+          <a:schemeClr val="bg1"/>
+        </a:solidFill>
+        <a:effectLst/>
+      </p:bgPr>
+    </p:bg>
+    <p:spTree>
+      <p:nvGrpSpPr>
+        <p:cNvPr id="1" name=""/>
+        <p:cNvGrpSpPr/>
+        <p:nvPr/>
+      </p:nvGrpSpPr>
+      <p:grpSpPr>
+        <a:xfrm>
+          <a:off x="0" y="0"/>
+          <a:ext cx="0" cy="0"/>
+          <a:chOff x="0" y="0"/>
+          <a:chExt cx="0" cy="0"/>
+        </a:xfrm>
+      </p:grpSpPr>
+      <p:sp>
+        <p:nvSpPr>
+          <p:cNvPr id="9" name="Rectangle 8">
+            <a:extLst>
+              <a:ext uri="{FF2B5EF4-FFF2-40B4-BE49-F238E27FC236}">
+                <a16:creationId xmlns:a16="http://schemas.microsoft.com/office/drawing/2014/main" id="{989683EB-D202-4B4D-B1BD-8BA6965FBEF5}"/>
+              </a:ext>
+              <a:ext uri="{C183D7F6-B498-43B3-948B-1728B52AA6E4}">
+                <adec:decorative xmlns:adec="http://schemas.microsoft.com/office/drawing/2017/decorative" val="1"/>
+              </a:ext>
+            </a:extLst>
+          </p:cNvPr>
+          <p:cNvSpPr>
+            <a:spLocks noGrp="1" noRot="1" noChangeAspect="1" noMove="1" noResize="1" noEditPoints="1" noAdjustHandles="1" noChangeArrowheads="1" noChangeShapeType="1" noTextEdit="1"/>
+          </p:cNvSpPr>
+          <p:nvPr>
+            <p:extLst>
+              <p:ext uri="{386F3935-93C4-4BCD-93E2-E3B085C9AB24}">
+                <p16:designElem xmlns:p16="http://schemas.microsoft.com/office/powerpoint/2015/main" val="1"/>
+              </p:ext>
+            </p:extLst>
+          </p:nvPr>
+        </p:nvSpPr>
+        <p:spPr>
+          <a:xfrm>
+            <a:off x="0" y="-1"/>
+            <a:ext cx="11292840" cy="6858001"/>
+          </a:xfrm>
+          <a:prstGeom prst="rect">
+            <a:avLst/>
+          </a:prstGeom>
+          <a:solidFill>
+            <a:schemeClr val="tx1"/>
+          </a:solidFill>
+          <a:ln>
+            <a:noFill/>
+          </a:ln>
+        </p:spPr>
+        <p:style>
+          <a:lnRef idx="2">
+            <a:schemeClr val="accent1">
+              <a:shade val="50000"/>
+            </a:schemeClr>
+          </a:lnRef>
+          <a:fillRef idx="1">
+            <a:schemeClr val="accent1"/>
+          </a:fillRef>
+          <a:effectRef idx="0">
+            <a:schemeClr val="accent1"/>
+          </a:effectRef>
+          <a:fontRef idx="minor">
+            <a:schemeClr val="lt1"/>
+          </a:fontRef>
+        </p:style>
+        <p:txBody>
+          <a:bodyPr rtlCol="0" anchor="ctr"/>
+          <a:lstStyle/>
+          <a:p>
+            <a:pPr algn="ctr"/>
+            <a:endParaRPr lang="en-US"/>
+          </a:p>
+        </p:txBody>
+      </p:sp>
+      <p:pic>
+        <p:nvPicPr>
+          <p:cNvPr id="4" name="Picture 4" descr="Maze">
+            <a:extLst>
+              <a:ext uri="{FF2B5EF4-FFF2-40B4-BE49-F238E27FC236}">
+                <a16:creationId xmlns:a16="http://schemas.microsoft.com/office/drawing/2014/main" id="{C8005455-DE52-4166-891D-E22990B7B159}"/>
+              </a:ext>
+            </a:extLst>
+          </p:cNvPr>
+          <p:cNvPicPr>
+            <a:picLocks noChangeAspect="1"/>
+          </p:cNvPicPr>
+          <p:nvPr/>
+        </p:nvPicPr>
+        <p:blipFill rotWithShape="1">
+          <a:blip r:embed="rId2">
+            <a:alphaModFix amt="35000"/>
+          </a:blip>
+          <a:srcRect t="9021"/>
+          <a:stretch/>
+        </p:blipFill>
+        <p:spPr>
+          <a:xfrm>
+            <a:off x="20" y="10"/>
+            <a:ext cx="11292820" cy="6857990"/>
+          </a:xfrm>
+          <a:prstGeom prst="rect">
+            <a:avLst/>
+          </a:prstGeom>
+        </p:spPr>
+      </p:pic>
+      <p:sp>
+        <p:nvSpPr>
+          <p:cNvPr id="2" name="Titolo 1">
+            <a:extLst>
+              <a:ext uri="{FF2B5EF4-FFF2-40B4-BE49-F238E27FC236}">
+                <a16:creationId xmlns:a16="http://schemas.microsoft.com/office/drawing/2014/main" id="{D02D210C-DC25-442C-A0DC-2021B3ABC932}"/>
+              </a:ext>
+            </a:extLst>
+          </p:cNvPr>
+          <p:cNvSpPr>
+            <a:spLocks noGrp="1"/>
+          </p:cNvSpPr>
+          <p:nvPr>
+            <p:ph type="title"/>
+          </p:nvPr>
+        </p:nvSpPr>
+        <p:spPr>
+          <a:xfrm>
+            <a:off x="1261872" y="365760"/>
+            <a:ext cx="9692640" cy="1325562"/>
+          </a:xfrm>
+        </p:spPr>
+        <p:txBody>
+          <a:bodyPr>
+            <a:normAutofit/>
+          </a:bodyPr>
+          <a:lstStyle/>
+          <a:p>
+            <a:r>
+              <a:rPr lang="it-IT">
+                <a:solidFill>
+                  <a:schemeClr val="bg1"/>
+                </a:solidFill>
+              </a:rPr>
+              <a:t>Learning to travel</a:t>
+            </a:r>
+          </a:p>
+        </p:txBody>
+      </p:sp>
+      <p:sp>
+        <p:nvSpPr>
+          <p:cNvPr id="3" name="Segnaposto contenuto 2">
+            <a:extLst>
+              <a:ext uri="{FF2B5EF4-FFF2-40B4-BE49-F238E27FC236}">
+                <a16:creationId xmlns:a16="http://schemas.microsoft.com/office/drawing/2014/main" id="{C6D47933-B121-49D1-9D84-21CF203209CD}"/>
+              </a:ext>
+            </a:extLst>
+          </p:cNvPr>
+          <p:cNvSpPr>
+            <a:spLocks noGrp="1"/>
+          </p:cNvSpPr>
+          <p:nvPr>
+            <p:ph idx="1"/>
+          </p:nvPr>
+        </p:nvSpPr>
+        <p:spPr>
+          <a:xfrm>
+            <a:off x="1261872" y="2005739"/>
+            <a:ext cx="8595360" cy="4174398"/>
+          </a:xfrm>
+        </p:spPr>
+        <p:txBody>
+          <a:bodyPr>
+            <a:normAutofit lnSpcReduction="10000"/>
+          </a:bodyPr>
+          <a:lstStyle/>
+          <a:p>
+            <a:r>
+              <a:rPr lang="it-IT" sz="1700" b="1" dirty="0">
+                <a:solidFill>
+                  <a:schemeClr val="bg1"/>
+                </a:solidFill>
+              </a:rPr>
+              <a:t>Goal: </a:t>
+            </a:r>
+            <a:r>
+              <a:rPr lang="it-IT" sz="1700" dirty="0" err="1">
+                <a:solidFill>
+                  <a:schemeClr val="bg1"/>
+                </a:solidFill>
+              </a:rPr>
+              <a:t>Learn</a:t>
+            </a:r>
+            <a:r>
+              <a:rPr lang="it-IT" sz="1700" dirty="0">
+                <a:solidFill>
+                  <a:schemeClr val="bg1"/>
+                </a:solidFill>
+              </a:rPr>
+              <a:t> to </a:t>
+            </a:r>
+            <a:r>
+              <a:rPr lang="it-IT" sz="1700" dirty="0" err="1">
+                <a:solidFill>
+                  <a:schemeClr val="bg1"/>
+                </a:solidFill>
+              </a:rPr>
+              <a:t>move</a:t>
+            </a:r>
+            <a:r>
+              <a:rPr lang="it-IT" sz="1700" dirty="0">
+                <a:solidFill>
+                  <a:schemeClr val="bg1"/>
+                </a:solidFill>
+              </a:rPr>
+              <a:t> from </a:t>
+            </a:r>
+            <a:r>
+              <a:rPr lang="it-IT" sz="1700" dirty="0" err="1">
+                <a:solidFill>
+                  <a:schemeClr val="bg1"/>
+                </a:solidFill>
+              </a:rPr>
+              <a:t>two</a:t>
+            </a:r>
+            <a:r>
+              <a:rPr lang="it-IT" sz="1700" dirty="0">
+                <a:solidFill>
+                  <a:schemeClr val="bg1"/>
+                </a:solidFill>
+              </a:rPr>
+              <a:t> </a:t>
+            </a:r>
+            <a:r>
+              <a:rPr lang="it-IT" sz="1700" dirty="0" err="1">
+                <a:solidFill>
+                  <a:schemeClr val="bg1"/>
+                </a:solidFill>
+              </a:rPr>
+              <a:t>distant</a:t>
+            </a:r>
+            <a:r>
+              <a:rPr lang="it-IT" sz="1700" dirty="0">
+                <a:solidFill>
+                  <a:schemeClr val="bg1"/>
+                </a:solidFill>
+              </a:rPr>
+              <a:t> </a:t>
+            </a:r>
+            <a:r>
+              <a:rPr lang="it-IT" sz="1700" dirty="0" err="1">
+                <a:solidFill>
+                  <a:schemeClr val="bg1"/>
+                </a:solidFill>
+              </a:rPr>
+              <a:t>cells</a:t>
+            </a:r>
+            <a:r>
+              <a:rPr lang="it-IT" sz="1700" dirty="0">
+                <a:solidFill>
+                  <a:schemeClr val="bg1"/>
+                </a:solidFill>
+              </a:rPr>
+              <a:t> in the </a:t>
+            </a:r>
+            <a:r>
+              <a:rPr lang="it-IT" sz="1700" dirty="0" err="1">
+                <a:solidFill>
+                  <a:schemeClr val="bg1"/>
+                </a:solidFill>
+              </a:rPr>
+              <a:t>Maze</a:t>
+            </a:r>
+            <a:r>
+              <a:rPr lang="it-IT" sz="1700" dirty="0">
+                <a:solidFill>
+                  <a:schemeClr val="bg1"/>
+                </a:solidFill>
+              </a:rPr>
+              <a:t> </a:t>
+            </a:r>
+            <a:r>
+              <a:rPr lang="it-IT" sz="1700" dirty="0" err="1">
+                <a:solidFill>
+                  <a:schemeClr val="bg1"/>
+                </a:solidFill>
+              </a:rPr>
+              <a:t>without</a:t>
+            </a:r>
+            <a:r>
+              <a:rPr lang="it-IT" sz="1700" dirty="0">
+                <a:solidFill>
+                  <a:schemeClr val="bg1"/>
+                </a:solidFill>
+              </a:rPr>
+              <a:t> </a:t>
+            </a:r>
+            <a:r>
+              <a:rPr lang="it-IT" sz="1700" dirty="0" err="1">
+                <a:solidFill>
+                  <a:schemeClr val="bg1"/>
+                </a:solidFill>
+              </a:rPr>
+              <a:t>going</a:t>
+            </a:r>
+            <a:r>
+              <a:rPr lang="it-IT" sz="1700" dirty="0">
+                <a:solidFill>
+                  <a:schemeClr val="bg1"/>
+                </a:solidFill>
+              </a:rPr>
+              <a:t> </a:t>
+            </a:r>
+            <a:r>
+              <a:rPr lang="it-IT" sz="1700" dirty="0" err="1">
+                <a:solidFill>
+                  <a:schemeClr val="bg1"/>
+                </a:solidFill>
+              </a:rPr>
+              <a:t>through</a:t>
+            </a:r>
+            <a:r>
+              <a:rPr lang="it-IT" sz="1700" dirty="0">
+                <a:solidFill>
+                  <a:schemeClr val="bg1"/>
+                </a:solidFill>
+              </a:rPr>
+              <a:t> </a:t>
+            </a:r>
+            <a:r>
+              <a:rPr lang="it-IT" sz="1700" dirty="0" err="1">
+                <a:solidFill>
+                  <a:schemeClr val="bg1"/>
+                </a:solidFill>
+              </a:rPr>
+              <a:t>illegal</a:t>
+            </a:r>
+            <a:r>
+              <a:rPr lang="it-IT" sz="1700" dirty="0">
+                <a:solidFill>
+                  <a:schemeClr val="bg1"/>
+                </a:solidFill>
+              </a:rPr>
+              <a:t> </a:t>
+            </a:r>
+            <a:r>
+              <a:rPr lang="it-IT" sz="1700" dirty="0" err="1">
+                <a:solidFill>
+                  <a:schemeClr val="bg1"/>
+                </a:solidFill>
+              </a:rPr>
+              <a:t>cells</a:t>
+            </a:r>
+            <a:r>
+              <a:rPr lang="it-IT" sz="1700" dirty="0">
+                <a:solidFill>
+                  <a:schemeClr val="bg1"/>
+                </a:solidFill>
+              </a:rPr>
+              <a:t>. (Predicate </a:t>
+            </a:r>
+            <a:r>
+              <a:rPr lang="it-IT" sz="1700" dirty="0" err="1">
+                <a:solidFill>
+                  <a:schemeClr val="bg1"/>
+                </a:solidFill>
+                <a:latin typeface="Courier New" panose="02070309020205020404" pitchFamily="49" charset="0"/>
+                <a:cs typeface="Courier New" panose="02070309020205020404" pitchFamily="49" charset="0"/>
+              </a:rPr>
+              <a:t>reach</a:t>
+            </a:r>
+            <a:r>
+              <a:rPr lang="it-IT" sz="1700" dirty="0">
+                <a:solidFill>
+                  <a:schemeClr val="bg1"/>
+                </a:solidFill>
+                <a:latin typeface="Courier New" panose="02070309020205020404" pitchFamily="49" charset="0"/>
+                <a:cs typeface="Courier New" panose="02070309020205020404" pitchFamily="49" charset="0"/>
+              </a:rPr>
+              <a:t>/2</a:t>
+            </a:r>
+            <a:r>
+              <a:rPr lang="it-IT" sz="1700" dirty="0">
+                <a:solidFill>
+                  <a:schemeClr val="bg1"/>
+                </a:solidFill>
+              </a:rPr>
+              <a:t>).</a:t>
+            </a:r>
+          </a:p>
+          <a:p>
+            <a:r>
+              <a:rPr lang="it-IT" sz="1700" b="1" dirty="0">
+                <a:solidFill>
+                  <a:schemeClr val="bg1"/>
+                </a:solidFill>
+              </a:rPr>
+              <a:t>Background Knowledge:</a:t>
+            </a:r>
+          </a:p>
+          <a:p>
+            <a:pPr lvl="1"/>
+            <a:r>
+              <a:rPr lang="it-IT" sz="1700" dirty="0" err="1">
+                <a:solidFill>
+                  <a:schemeClr val="bg1"/>
+                </a:solidFill>
+                <a:latin typeface="Courier New" panose="02070309020205020404" pitchFamily="49" charset="0"/>
+                <a:cs typeface="Courier New" panose="02070309020205020404" pitchFamily="49" charset="0"/>
+              </a:rPr>
+              <a:t>move</a:t>
+            </a:r>
+            <a:r>
+              <a:rPr lang="it-IT" sz="1700" dirty="0">
+                <a:solidFill>
+                  <a:schemeClr val="bg1"/>
+                </a:solidFill>
+                <a:latin typeface="Courier New" panose="02070309020205020404" pitchFamily="49" charset="0"/>
+                <a:cs typeface="Courier New" panose="02070309020205020404" pitchFamily="49" charset="0"/>
+              </a:rPr>
+              <a:t>/2 </a:t>
+            </a:r>
+            <a:r>
+              <a:rPr lang="it-IT" sz="1700" dirty="0">
+                <a:solidFill>
+                  <a:schemeClr val="bg1"/>
+                </a:solidFill>
+                <a:cs typeface="Courier New" panose="02070309020205020404" pitchFamily="49" charset="0"/>
+              </a:rPr>
+              <a:t>(</a:t>
+            </a:r>
+            <a:r>
+              <a:rPr lang="it-IT" sz="1700" dirty="0" err="1">
+                <a:solidFill>
+                  <a:schemeClr val="bg1"/>
+                </a:solidFill>
+                <a:cs typeface="Courier New" panose="02070309020205020404" pitchFamily="49" charset="0"/>
+              </a:rPr>
+              <a:t>Learned</a:t>
+            </a:r>
+            <a:r>
+              <a:rPr lang="it-IT" sz="1700" dirty="0">
+                <a:solidFill>
+                  <a:schemeClr val="bg1"/>
+                </a:solidFill>
+                <a:cs typeface="Courier New" panose="02070309020205020404" pitchFamily="49" charset="0"/>
+              </a:rPr>
+              <a:t> from </a:t>
+            </a:r>
+            <a:r>
+              <a:rPr lang="it-IT" sz="1700" i="1" dirty="0">
+                <a:solidFill>
+                  <a:schemeClr val="bg1"/>
+                </a:solidFill>
+                <a:cs typeface="Courier New" panose="02070309020205020404" pitchFamily="49" charset="0"/>
+              </a:rPr>
+              <a:t>«</a:t>
+            </a:r>
+            <a:r>
+              <a:rPr lang="it-IT" sz="1700" i="1" dirty="0" err="1">
+                <a:solidFill>
+                  <a:schemeClr val="bg1"/>
+                </a:solidFill>
+                <a:cs typeface="Courier New" panose="02070309020205020404" pitchFamily="49" charset="0"/>
+              </a:rPr>
+              <a:t>learning_to_walk</a:t>
+            </a:r>
+            <a:r>
+              <a:rPr lang="it-IT" sz="1700" i="1" dirty="0">
+                <a:solidFill>
+                  <a:schemeClr val="bg1"/>
+                </a:solidFill>
+                <a:cs typeface="Courier New" panose="02070309020205020404" pitchFamily="49" charset="0"/>
+              </a:rPr>
+              <a:t>»).</a:t>
+            </a:r>
+          </a:p>
+          <a:p>
+            <a:r>
+              <a:rPr lang="it-IT" sz="1700" b="1" dirty="0" err="1">
+                <a:solidFill>
+                  <a:schemeClr val="bg1"/>
+                </a:solidFill>
+                <a:cs typeface="Courier New" panose="02070309020205020404" pitchFamily="49" charset="0"/>
+              </a:rPr>
+              <a:t>Metarules</a:t>
+            </a:r>
+            <a:r>
+              <a:rPr lang="it-IT" sz="1700" b="1" dirty="0">
+                <a:solidFill>
+                  <a:schemeClr val="bg1"/>
+                </a:solidFill>
+                <a:cs typeface="Courier New" panose="02070309020205020404" pitchFamily="49" charset="0"/>
+              </a:rPr>
+              <a:t>:</a:t>
+            </a:r>
+          </a:p>
+          <a:p>
+            <a:pPr lvl="1"/>
+            <a:r>
+              <a:rPr lang="it-IT" sz="1700" dirty="0" err="1">
+                <a:solidFill>
+                  <a:schemeClr val="bg1"/>
+                </a:solidFill>
+                <a:latin typeface="Courier New" panose="02070309020205020404" pitchFamily="49" charset="0"/>
+                <a:cs typeface="Courier New" panose="02070309020205020404" pitchFamily="49" charset="0"/>
+              </a:rPr>
+              <a:t>metarule</a:t>
+            </a:r>
+            <a:r>
+              <a:rPr lang="it-IT" sz="1700" dirty="0">
+                <a:solidFill>
+                  <a:schemeClr val="bg1"/>
+                </a:solidFill>
+                <a:latin typeface="Courier New" panose="02070309020205020404" pitchFamily="49" charset="0"/>
+                <a:cs typeface="Courier New" panose="02070309020205020404" pitchFamily="49" charset="0"/>
+              </a:rPr>
+              <a:t>(</a:t>
+            </a:r>
+            <a:r>
+              <a:rPr lang="it-IT" sz="1700" dirty="0" err="1">
+                <a:solidFill>
+                  <a:schemeClr val="bg1"/>
+                </a:solidFill>
+                <a:latin typeface="Courier New" panose="02070309020205020404" pitchFamily="49" charset="0"/>
+                <a:cs typeface="Courier New" panose="02070309020205020404" pitchFamily="49" charset="0"/>
+              </a:rPr>
+              <a:t>recursion</a:t>
+            </a:r>
+            <a:r>
+              <a:rPr lang="it-IT" sz="1700" dirty="0">
+                <a:solidFill>
+                  <a:schemeClr val="bg1"/>
+                </a:solidFill>
+                <a:latin typeface="Courier New" panose="02070309020205020404" pitchFamily="49" charset="0"/>
+                <a:cs typeface="Courier New" panose="02070309020205020404" pitchFamily="49" charset="0"/>
+              </a:rPr>
+              <a:t>, [P,Q], [P,A,B], [[Q,A,C], [P,C,B]]).</a:t>
+            </a:r>
+          </a:p>
+          <a:p>
+            <a:pPr lvl="1"/>
+            <a:r>
+              <a:rPr lang="it-IT" sz="1700" dirty="0" err="1">
+                <a:solidFill>
+                  <a:schemeClr val="bg1"/>
+                </a:solidFill>
+                <a:latin typeface="Courier New" panose="02070309020205020404" pitchFamily="49" charset="0"/>
+                <a:cs typeface="Courier New" panose="02070309020205020404" pitchFamily="49" charset="0"/>
+              </a:rPr>
+              <a:t>metarule</a:t>
+            </a:r>
+            <a:r>
+              <a:rPr lang="it-IT" sz="1700" dirty="0">
+                <a:solidFill>
+                  <a:schemeClr val="bg1"/>
+                </a:solidFill>
+                <a:latin typeface="Courier New" panose="02070309020205020404" pitchFamily="49" charset="0"/>
+                <a:cs typeface="Courier New" panose="02070309020205020404" pitchFamily="49" charset="0"/>
+              </a:rPr>
+              <a:t>(</a:t>
+            </a:r>
+            <a:r>
+              <a:rPr lang="it-IT" sz="1700" dirty="0" err="1">
+                <a:solidFill>
+                  <a:schemeClr val="bg1"/>
+                </a:solidFill>
+                <a:latin typeface="Courier New" panose="02070309020205020404" pitchFamily="49" charset="0"/>
+                <a:cs typeface="Courier New" panose="02070309020205020404" pitchFamily="49" charset="0"/>
+              </a:rPr>
+              <a:t>ident</a:t>
+            </a:r>
+            <a:r>
+              <a:rPr lang="it-IT" sz="1700" dirty="0">
+                <a:solidFill>
+                  <a:schemeClr val="bg1"/>
+                </a:solidFill>
+                <a:latin typeface="Courier New" panose="02070309020205020404" pitchFamily="49" charset="0"/>
+                <a:cs typeface="Courier New" panose="02070309020205020404" pitchFamily="49" charset="0"/>
+              </a:rPr>
+              <a:t>, [P,Q], [P,A,B], [[Q,A,B]]).</a:t>
+            </a:r>
+          </a:p>
+          <a:p>
+            <a:r>
+              <a:rPr lang="it-IT" sz="1700" b="1" dirty="0">
+                <a:solidFill>
+                  <a:schemeClr val="bg1"/>
+                </a:solidFill>
+                <a:cs typeface="Courier New" panose="02070309020205020404" pitchFamily="49" charset="0"/>
+              </a:rPr>
+              <a:t>Positive </a:t>
+            </a:r>
+            <a:r>
+              <a:rPr lang="it-IT" sz="1700" b="1" dirty="0" err="1">
+                <a:solidFill>
+                  <a:schemeClr val="bg1"/>
+                </a:solidFill>
+                <a:cs typeface="Courier New" panose="02070309020205020404" pitchFamily="49" charset="0"/>
+              </a:rPr>
+              <a:t>examples</a:t>
+            </a:r>
+            <a:r>
+              <a:rPr lang="it-IT" sz="1700" b="1" dirty="0">
+                <a:solidFill>
+                  <a:schemeClr val="bg1"/>
+                </a:solidFill>
+                <a:cs typeface="Courier New" panose="02070309020205020404" pitchFamily="49" charset="0"/>
+              </a:rPr>
+              <a:t>:</a:t>
+            </a:r>
+          </a:p>
+          <a:p>
+            <a:pPr lvl="1"/>
+            <a:r>
+              <a:rPr lang="en-US" sz="1700" dirty="0">
+                <a:solidFill>
+                  <a:schemeClr val="bg1"/>
+                </a:solidFill>
+                <a:latin typeface="Courier New" panose="02070309020205020404" pitchFamily="49" charset="0"/>
+                <a:cs typeface="Courier New" panose="02070309020205020404" pitchFamily="49" charset="0"/>
+              </a:rPr>
+              <a:t>reach((1,1), (2,1)).</a:t>
+            </a:r>
+          </a:p>
+          <a:p>
+            <a:pPr lvl="1"/>
+            <a:r>
+              <a:rPr lang="en-US" sz="1700" dirty="0">
+                <a:solidFill>
+                  <a:schemeClr val="bg1"/>
+                </a:solidFill>
+                <a:latin typeface="Courier New" panose="02070309020205020404" pitchFamily="49" charset="0"/>
+                <a:cs typeface="Courier New" panose="02070309020205020404" pitchFamily="49" charset="0"/>
+              </a:rPr>
+              <a:t>reach((1,1), (2,5)).</a:t>
+            </a:r>
+          </a:p>
+          <a:p>
+            <a:r>
+              <a:rPr lang="en-US" sz="1700" b="1" dirty="0">
+                <a:solidFill>
+                  <a:schemeClr val="bg1"/>
+                </a:solidFill>
+                <a:cs typeface="Courier New" panose="02070309020205020404" pitchFamily="49" charset="0"/>
+              </a:rPr>
+              <a:t>Negative examples:</a:t>
+            </a:r>
+          </a:p>
+          <a:p>
+            <a:pPr lvl="1"/>
+            <a:r>
+              <a:rPr lang="it-IT" sz="1700" u="sng" dirty="0">
+                <a:solidFill>
+                  <a:schemeClr val="bg1"/>
+                </a:solidFill>
+                <a:effectLst/>
+              </a:rPr>
+              <a:t>NONE</a:t>
+            </a:r>
+            <a:r>
+              <a:rPr lang="it-IT" sz="1700" dirty="0">
+                <a:solidFill>
+                  <a:schemeClr val="bg1"/>
+                </a:solidFill>
+                <a:effectLst/>
+              </a:rPr>
+              <a:t>: </a:t>
+            </a:r>
+            <a:r>
+              <a:rPr lang="it-IT" sz="1700" dirty="0" err="1">
+                <a:solidFill>
+                  <a:schemeClr val="bg1"/>
+                </a:solidFill>
+                <a:effectLst/>
+              </a:rPr>
+              <a:t>Illegal</a:t>
+            </a:r>
+            <a:r>
+              <a:rPr lang="it-IT" sz="1700" dirty="0">
+                <a:solidFill>
+                  <a:schemeClr val="bg1"/>
+                </a:solidFill>
+                <a:effectLst/>
+              </a:rPr>
+              <a:t> </a:t>
+            </a:r>
+            <a:r>
+              <a:rPr lang="it-IT" sz="1700" dirty="0" err="1">
+                <a:solidFill>
+                  <a:schemeClr val="bg1"/>
+                </a:solidFill>
+                <a:effectLst/>
+              </a:rPr>
+              <a:t>behaviour</a:t>
+            </a:r>
+            <a:r>
+              <a:rPr lang="it-IT" sz="1700" dirty="0">
+                <a:solidFill>
+                  <a:schemeClr val="bg1"/>
+                </a:solidFill>
+                <a:effectLst/>
+              </a:rPr>
+              <a:t> </a:t>
+            </a:r>
+            <a:r>
+              <a:rPr lang="it-IT" sz="1700" dirty="0" err="1">
+                <a:solidFill>
+                  <a:schemeClr val="bg1"/>
+                </a:solidFill>
+                <a:effectLst/>
+              </a:rPr>
+              <a:t>is</a:t>
+            </a:r>
+            <a:r>
+              <a:rPr lang="it-IT" sz="1700" dirty="0">
+                <a:solidFill>
+                  <a:schemeClr val="bg1"/>
+                </a:solidFill>
+                <a:effectLst/>
+              </a:rPr>
+              <a:t> </a:t>
+            </a:r>
+            <a:r>
+              <a:rPr lang="it-IT" sz="1700" dirty="0" err="1">
+                <a:solidFill>
+                  <a:schemeClr val="bg1"/>
+                </a:solidFill>
+                <a:effectLst/>
+              </a:rPr>
+              <a:t>already</a:t>
+            </a:r>
+            <a:r>
+              <a:rPr lang="it-IT" sz="1700" dirty="0">
+                <a:solidFill>
+                  <a:schemeClr val="bg1"/>
+                </a:solidFill>
+                <a:effectLst/>
+              </a:rPr>
+              <a:t> </a:t>
+            </a:r>
+            <a:r>
+              <a:rPr lang="it-IT" sz="1700" dirty="0" err="1">
+                <a:solidFill>
+                  <a:schemeClr val="bg1"/>
+                </a:solidFill>
+                <a:effectLst/>
+              </a:rPr>
+              <a:t>forbidden</a:t>
+            </a:r>
+            <a:r>
+              <a:rPr lang="it-IT" sz="1700" dirty="0">
+                <a:solidFill>
+                  <a:schemeClr val="bg1"/>
+                </a:solidFill>
+                <a:effectLst/>
+              </a:rPr>
+              <a:t> by the background knowledge.</a:t>
+            </a:r>
+            <a:endParaRPr lang="it-IT" sz="1700" b="1" u="sng" dirty="0">
+              <a:solidFill>
+                <a:schemeClr val="bg1"/>
+              </a:solidFill>
+              <a:cs typeface="Courier New" panose="02070309020205020404" pitchFamily="49" charset="0"/>
+            </a:endParaRPr>
+          </a:p>
+        </p:txBody>
+      </p:sp>
+    </p:spTree>
+    <p:extLst>
+      <p:ext uri="{BB962C8B-B14F-4D97-AF65-F5344CB8AC3E}">
+        <p14:creationId xmlns:p14="http://schemas.microsoft.com/office/powerpoint/2010/main" val="257936271"/>
       </p:ext>
     </p:extLst>
   </p:cSld>

</xml_diff>

<commit_message>
Final works on Metagol
</commit_message>
<xml_diff>
--- a/ATAI_Presentation.pptx
+++ b/ATAI_Presentation.pptx
@@ -4,6 +4,9 @@
   <p:sldMasterIdLst>
     <p:sldMasterId id="2147483660" r:id="rId1"/>
   </p:sldMasterIdLst>
+  <p:notesMasterIdLst>
+    <p:notesMasterId r:id="rId15"/>
+  </p:notesMasterIdLst>
   <p:sldIdLst>
     <p:sldId id="256" r:id="rId2"/>
     <p:sldId id="260" r:id="rId3"/>
@@ -15,8 +18,9 @@
     <p:sldId id="264" r:id="rId9"/>
     <p:sldId id="269" r:id="rId10"/>
     <p:sldId id="265" r:id="rId11"/>
-    <p:sldId id="266" r:id="rId12"/>
-    <p:sldId id="267" r:id="rId13"/>
+    <p:sldId id="270" r:id="rId12"/>
+    <p:sldId id="266" r:id="rId13"/>
+    <p:sldId id="267" r:id="rId14"/>
   </p:sldIdLst>
   <p:sldSz cx="12192000" cy="6858000"/>
   <p:notesSz cx="6858000" cy="9144000"/>
@@ -126,7 +130,7 @@
 <file path=ppt/revisionInfo.xml><?xml version="1.0" encoding="utf-8"?>
 <p1510:revInfo xmlns:a="http://schemas.openxmlformats.org/drawingml/2006/main" xmlns:r="http://schemas.openxmlformats.org/officeDocument/2006/relationships" xmlns:p1510="http://schemas.microsoft.com/office/powerpoint/2015/10/main">
   <p1510:revLst>
-    <p1510:client id="{82F5C372-4CFF-44C5-9E84-8FD24BAA211C}" v="7" dt="2021-07-03T12:25:34.649"/>
+    <p1510:client id="{82F5C372-4CFF-44C5-9E84-8FD24BAA211C}" v="34" dt="2021-07-03T14:49:35.928"/>
     <p1510:client id="{AB8C1610-9B0F-4A3A-96F9-A0FB1F9855A7}" v="156" dt="2021-07-02T15:39:33.245"/>
   </p1510:revLst>
 </p1510:revInfo>
@@ -898,19 +902,19 @@
   </pc:docChgLst>
   <pc:docChgLst>
     <pc:chgData name="Al ex" userId="1d73023b5acb93cf" providerId="LiveId" clId="{82F5C372-4CFF-44C5-9E84-8FD24BAA211C}"/>
-    <pc:docChg chg="undo custSel addSld delSld modSld">
-      <pc:chgData name="Al ex" userId="1d73023b5acb93cf" providerId="LiveId" clId="{82F5C372-4CFF-44C5-9E84-8FD24BAA211C}" dt="2021-07-03T12:48:55.627" v="818" actId="20577"/>
+    <pc:docChg chg="undo redo custSel addSld delSld modSld">
+      <pc:chgData name="Al ex" userId="1d73023b5acb93cf" providerId="LiveId" clId="{82F5C372-4CFF-44C5-9E84-8FD24BAA211C}" dt="2021-07-03T14:56:22.497" v="1589" actId="20577"/>
       <pc:docMkLst>
         <pc:docMk/>
       </pc:docMkLst>
       <pc:sldChg chg="addSp modSp mod setBg addAnim">
-        <pc:chgData name="Al ex" userId="1d73023b5acb93cf" providerId="LiveId" clId="{82F5C372-4CFF-44C5-9E84-8FD24BAA211C}" dt="2021-07-03T08:41:07.600" v="3"/>
+        <pc:chgData name="Al ex" userId="1d73023b5acb93cf" providerId="LiveId" clId="{82F5C372-4CFF-44C5-9E84-8FD24BAA211C}" dt="2021-07-03T14:44:40.474" v="1323" actId="404"/>
         <pc:sldMkLst>
           <pc:docMk/>
           <pc:sldMk cId="1537395873" sldId="256"/>
         </pc:sldMkLst>
         <pc:spChg chg="mod">
-          <ac:chgData name="Al ex" userId="1d73023b5acb93cf" providerId="LiveId" clId="{82F5C372-4CFF-44C5-9E84-8FD24BAA211C}" dt="2021-07-03T08:41:07.588" v="1" actId="26606"/>
+          <ac:chgData name="Al ex" userId="1d73023b5acb93cf" providerId="LiveId" clId="{82F5C372-4CFF-44C5-9E84-8FD24BAA211C}" dt="2021-07-03T14:44:40.474" v="1323" actId="404"/>
           <ac:spMkLst>
             <pc:docMk/>
             <pc:sldMk cId="1537395873" sldId="256"/>
@@ -1122,8 +1126,8 @@
           </ac:picMkLst>
         </pc:picChg>
       </pc:sldChg>
-      <pc:sldChg chg="addSp delSp modSp mod">
-        <pc:chgData name="Al ex" userId="1d73023b5acb93cf" providerId="LiveId" clId="{82F5C372-4CFF-44C5-9E84-8FD24BAA211C}" dt="2021-07-03T12:48:42.906" v="812" actId="20577"/>
+      <pc:sldChg chg="addSp delSp modSp mod modAnim">
+        <pc:chgData name="Al ex" userId="1d73023b5acb93cf" providerId="LiveId" clId="{82F5C372-4CFF-44C5-9E84-8FD24BAA211C}" dt="2021-07-03T14:49:45.551" v="1407" actId="1036"/>
         <pc:sldMkLst>
           <pc:docMk/>
           <pc:sldMk cId="257936271" sldId="265"/>
@@ -1137,11 +1141,19 @@
           </ac:spMkLst>
         </pc:spChg>
         <pc:spChg chg="mod">
-          <ac:chgData name="Al ex" userId="1d73023b5acb93cf" providerId="LiveId" clId="{82F5C372-4CFF-44C5-9E84-8FD24BAA211C}" dt="2021-07-03T12:48:42.906" v="812" actId="20577"/>
+          <ac:chgData name="Al ex" userId="1d73023b5acb93cf" providerId="LiveId" clId="{82F5C372-4CFF-44C5-9E84-8FD24BAA211C}" dt="2021-07-03T14:47:49.194" v="1359" actId="20577"/>
           <ac:spMkLst>
             <pc:docMk/>
             <pc:sldMk cId="257936271" sldId="265"/>
             <ac:spMk id="3" creationId="{C6D47933-B121-49D1-9D84-21CF203209CD}"/>
+          </ac:spMkLst>
+        </pc:spChg>
+        <pc:spChg chg="add mod">
+          <ac:chgData name="Al ex" userId="1d73023b5acb93cf" providerId="LiveId" clId="{82F5C372-4CFF-44C5-9E84-8FD24BAA211C}" dt="2021-07-03T14:49:45.551" v="1407" actId="1036"/>
+          <ac:spMkLst>
+            <pc:docMk/>
+            <pc:sldMk cId="257936271" sldId="265"/>
+            <ac:spMk id="5" creationId="{01B90FCF-2DEC-4277-A69C-67F0AD636F3E}"/>
           </ac:spMkLst>
         </pc:spChg>
         <pc:spChg chg="del">
@@ -1170,13 +1182,13 @@
         </pc:picChg>
       </pc:sldChg>
       <pc:sldChg chg="addSp delSp modSp mod">
-        <pc:chgData name="Al ex" userId="1d73023b5acb93cf" providerId="LiveId" clId="{82F5C372-4CFF-44C5-9E84-8FD24BAA211C}" dt="2021-07-03T12:48:55.627" v="818" actId="20577"/>
+        <pc:chgData name="Al ex" userId="1d73023b5acb93cf" providerId="LiveId" clId="{82F5C372-4CFF-44C5-9E84-8FD24BAA211C}" dt="2021-07-03T14:56:22.497" v="1589" actId="20577"/>
         <pc:sldMkLst>
           <pc:docMk/>
           <pc:sldMk cId="1716667692" sldId="266"/>
         </pc:sldMkLst>
         <pc:spChg chg="mod">
-          <ac:chgData name="Al ex" userId="1d73023b5acb93cf" providerId="LiveId" clId="{82F5C372-4CFF-44C5-9E84-8FD24BAA211C}" dt="2021-07-03T12:24:53.004" v="636" actId="26606"/>
+          <ac:chgData name="Al ex" userId="1d73023b5acb93cf" providerId="LiveId" clId="{82F5C372-4CFF-44C5-9E84-8FD24BAA211C}" dt="2021-07-03T14:51:11.386" v="1419" actId="20577"/>
           <ac:spMkLst>
             <pc:docMk/>
             <pc:sldMk cId="1716667692" sldId="266"/>
@@ -1184,7 +1196,7 @@
           </ac:spMkLst>
         </pc:spChg>
         <pc:spChg chg="mod">
-          <ac:chgData name="Al ex" userId="1d73023b5acb93cf" providerId="LiveId" clId="{82F5C372-4CFF-44C5-9E84-8FD24BAA211C}" dt="2021-07-03T12:48:55.627" v="818" actId="20577"/>
+          <ac:chgData name="Al ex" userId="1d73023b5acb93cf" providerId="LiveId" clId="{82F5C372-4CFF-44C5-9E84-8FD24BAA211C}" dt="2021-07-03T14:56:22.497" v="1589" actId="20577"/>
           <ac:spMkLst>
             <pc:docMk/>
             <pc:sldMk cId="1716667692" sldId="266"/>
@@ -1217,7 +1229,7 @@
         </pc:picChg>
       </pc:sldChg>
       <pc:sldChg chg="addSp delSp modSp mod">
-        <pc:chgData name="Al ex" userId="1d73023b5acb93cf" providerId="LiveId" clId="{82F5C372-4CFF-44C5-9E84-8FD24BAA211C}" dt="2021-07-03T12:24:57.468" v="637" actId="26606"/>
+        <pc:chgData name="Al ex" userId="1d73023b5acb93cf" providerId="LiveId" clId="{82F5C372-4CFF-44C5-9E84-8FD24BAA211C}" dt="2021-07-03T14:42:31.908" v="1318" actId="20577"/>
         <pc:sldMkLst>
           <pc:docMk/>
           <pc:sldMk cId="2386237977" sldId="267"/>
@@ -1231,7 +1243,7 @@
           </ac:spMkLst>
         </pc:spChg>
         <pc:spChg chg="mod">
-          <ac:chgData name="Al ex" userId="1d73023b5acb93cf" providerId="LiveId" clId="{82F5C372-4CFF-44C5-9E84-8FD24BAA211C}" dt="2021-07-03T12:24:57.468" v="637" actId="26606"/>
+          <ac:chgData name="Al ex" userId="1d73023b5acb93cf" providerId="LiveId" clId="{82F5C372-4CFF-44C5-9E84-8FD24BAA211C}" dt="2021-07-03T14:42:31.908" v="1318" actId="20577"/>
           <ac:spMkLst>
             <pc:docMk/>
             <pc:sldMk cId="2386237977" sldId="267"/>
@@ -1327,13 +1339,13 @@
         </pc:picChg>
       </pc:sldChg>
       <pc:sldChg chg="addSp modSp add mod">
-        <pc:chgData name="Al ex" userId="1d73023b5acb93cf" providerId="LiveId" clId="{82F5C372-4CFF-44C5-9E84-8FD24BAA211C}" dt="2021-07-03T12:48:20.302" v="803" actId="20577"/>
+        <pc:chgData name="Al ex" userId="1d73023b5acb93cf" providerId="LiveId" clId="{82F5C372-4CFF-44C5-9E84-8FD24BAA211C}" dt="2021-07-03T14:42:03.015" v="1315" actId="20577"/>
         <pc:sldMkLst>
           <pc:docMk/>
           <pc:sldMk cId="1509270444" sldId="269"/>
         </pc:sldMkLst>
         <pc:spChg chg="mod">
-          <ac:chgData name="Al ex" userId="1d73023b5acb93cf" providerId="LiveId" clId="{82F5C372-4CFF-44C5-9E84-8FD24BAA211C}" dt="2021-07-03T12:48:20.302" v="803" actId="20577"/>
+          <ac:chgData name="Al ex" userId="1d73023b5acb93cf" providerId="LiveId" clId="{82F5C372-4CFF-44C5-9E84-8FD24BAA211C}" dt="2021-07-03T14:42:03.015" v="1315" actId="20577"/>
           <ac:spMkLst>
             <pc:docMk/>
             <pc:sldMk cId="1509270444" sldId="269"/>
@@ -1348,6 +1360,100 @@
             <ac:graphicFrameMk id="6" creationId="{231DC50B-A6C9-4779-ADC1-E2083AECF97E}"/>
           </ac:graphicFrameMkLst>
         </pc:graphicFrameChg>
+      </pc:sldChg>
+      <pc:sldChg chg="addSp delSp modSp new del mod setBg">
+        <pc:chgData name="Al ex" userId="1d73023b5acb93cf" providerId="LiveId" clId="{82F5C372-4CFF-44C5-9E84-8FD24BAA211C}" dt="2021-07-03T14:34:50.099" v="887" actId="680"/>
+        <pc:sldMkLst>
+          <pc:docMk/>
+          <pc:sldMk cId="2712231547" sldId="270"/>
+        </pc:sldMkLst>
+        <pc:spChg chg="mod">
+          <ac:chgData name="Al ex" userId="1d73023b5acb93cf" providerId="LiveId" clId="{82F5C372-4CFF-44C5-9E84-8FD24BAA211C}" dt="2021-07-03T14:34:49.028" v="885" actId="26606"/>
+          <ac:spMkLst>
+            <pc:docMk/>
+            <pc:sldMk cId="2712231547" sldId="270"/>
+            <ac:spMk id="2" creationId="{4542AD98-D468-4714-9C1C-D0CC5409C674}"/>
+          </ac:spMkLst>
+        </pc:spChg>
+        <pc:spChg chg="mod">
+          <ac:chgData name="Al ex" userId="1d73023b5acb93cf" providerId="LiveId" clId="{82F5C372-4CFF-44C5-9E84-8FD24BAA211C}" dt="2021-07-03T14:34:49.028" v="885" actId="26606"/>
+          <ac:spMkLst>
+            <pc:docMk/>
+            <pc:sldMk cId="2712231547" sldId="270"/>
+            <ac:spMk id="3" creationId="{C38D16AF-AB03-4353-B0C5-F91A47FF4745}"/>
+          </ac:spMkLst>
+        </pc:spChg>
+        <pc:spChg chg="add del">
+          <ac:chgData name="Al ex" userId="1d73023b5acb93cf" providerId="LiveId" clId="{82F5C372-4CFF-44C5-9E84-8FD24BAA211C}" dt="2021-07-03T14:32:50.939" v="833" actId="26606"/>
+          <ac:spMkLst>
+            <pc:docMk/>
+            <pc:sldMk cId="2712231547" sldId="270"/>
+            <ac:spMk id="9" creationId="{9163A971-857A-4D4D-B458-BADAF926FFCC}"/>
+          </ac:spMkLst>
+        </pc:spChg>
+        <pc:spChg chg="add del">
+          <ac:chgData name="Al ex" userId="1d73023b5acb93cf" providerId="LiveId" clId="{82F5C372-4CFF-44C5-9E84-8FD24BAA211C}" dt="2021-07-03T14:34:49.028" v="885" actId="26606"/>
+          <ac:spMkLst>
+            <pc:docMk/>
+            <pc:sldMk cId="2712231547" sldId="270"/>
+            <ac:spMk id="11" creationId="{AB1CEEAD-825F-41AD-B0DB-77CE90932D00}"/>
+          </ac:spMkLst>
+        </pc:spChg>
+        <pc:spChg chg="add del">
+          <ac:chgData name="Al ex" userId="1d73023b5acb93cf" providerId="LiveId" clId="{82F5C372-4CFF-44C5-9E84-8FD24BAA211C}" dt="2021-07-03T14:34:48.891" v="884" actId="26606"/>
+          <ac:spMkLst>
+            <pc:docMk/>
+            <pc:sldMk cId="2712231547" sldId="270"/>
+            <ac:spMk id="16" creationId="{9163A971-857A-4D4D-B458-BADAF926FFCC}"/>
+          </ac:spMkLst>
+        </pc:spChg>
+        <pc:picChg chg="add del mod ord">
+          <ac:chgData name="Al ex" userId="1d73023b5acb93cf" providerId="LiveId" clId="{82F5C372-4CFF-44C5-9E84-8FD24BAA211C}" dt="2021-07-03T14:34:49.666" v="886"/>
+          <ac:picMkLst>
+            <pc:docMk/>
+            <pc:sldMk cId="2712231547" sldId="270"/>
+            <ac:picMk id="4" creationId="{8E49CB68-25EE-4DAC-A023-CBC229051A7E}"/>
+          </ac:picMkLst>
+        </pc:picChg>
+      </pc:sldChg>
+      <pc:sldChg chg="addSp modSp new mod setBg">
+        <pc:chgData name="Al ex" userId="1d73023b5acb93cf" providerId="LiveId" clId="{82F5C372-4CFF-44C5-9E84-8FD24BAA211C}" dt="2021-07-03T14:40:48.382" v="1294" actId="20577"/>
+        <pc:sldMkLst>
+          <pc:docMk/>
+          <pc:sldMk cId="2777569243" sldId="270"/>
+        </pc:sldMkLst>
+        <pc:spChg chg="mod">
+          <ac:chgData name="Al ex" userId="1d73023b5acb93cf" providerId="LiveId" clId="{82F5C372-4CFF-44C5-9E84-8FD24BAA211C}" dt="2021-07-03T14:35:27.311" v="955" actId="20577"/>
+          <ac:spMkLst>
+            <pc:docMk/>
+            <pc:sldMk cId="2777569243" sldId="270"/>
+            <ac:spMk id="2" creationId="{58E0E44F-EF9E-40B5-9B76-DF4FED4F2B4C}"/>
+          </ac:spMkLst>
+        </pc:spChg>
+        <pc:spChg chg="mod">
+          <ac:chgData name="Al ex" userId="1d73023b5acb93cf" providerId="LiveId" clId="{82F5C372-4CFF-44C5-9E84-8FD24BAA211C}" dt="2021-07-03T14:40:48.382" v="1294" actId="20577"/>
+          <ac:spMkLst>
+            <pc:docMk/>
+            <pc:sldMk cId="2777569243" sldId="270"/>
+            <ac:spMk id="3" creationId="{17B7C98C-91C5-42A6-AE60-10548043DE9E}"/>
+          </ac:spMkLst>
+        </pc:spChg>
+        <pc:spChg chg="add">
+          <ac:chgData name="Al ex" userId="1d73023b5acb93cf" providerId="LiveId" clId="{82F5C372-4CFF-44C5-9E84-8FD24BAA211C}" dt="2021-07-03T14:35:16.078" v="922" actId="26606"/>
+          <ac:spMkLst>
+            <pc:docMk/>
+            <pc:sldMk cId="2777569243" sldId="270"/>
+            <ac:spMk id="9" creationId="{9163A971-857A-4D4D-B458-BADAF926FFCC}"/>
+          </ac:spMkLst>
+        </pc:spChg>
+        <pc:picChg chg="add mod ord">
+          <ac:chgData name="Al ex" userId="1d73023b5acb93cf" providerId="LiveId" clId="{82F5C372-4CFF-44C5-9E84-8FD24BAA211C}" dt="2021-07-03T14:35:16.078" v="922" actId="26606"/>
+          <ac:picMkLst>
+            <pc:docMk/>
+            <pc:sldMk cId="2777569243" sldId="270"/>
+            <ac:picMk id="4" creationId="{D809EADF-C4D7-4EB7-AD80-F9F543370A6C}"/>
+          </ac:picMkLst>
+        </pc:picChg>
       </pc:sldChg>
     </pc:docChg>
   </pc:docChgLst>
@@ -4028,6 +4134,439 @@
 </dgm:styleDef>
 </file>
 
+<file path=ppt/notesMasters/notesMaster1.xml><?xml version="1.0" encoding="utf-8"?>
+<p:notesMaster xmlns:a="http://schemas.openxmlformats.org/drawingml/2006/main" xmlns:r="http://schemas.openxmlformats.org/officeDocument/2006/relationships" xmlns:p="http://schemas.openxmlformats.org/presentationml/2006/main">
+  <p:cSld>
+    <p:bg>
+      <p:bgRef idx="1001">
+        <a:schemeClr val="bg1"/>
+      </p:bgRef>
+    </p:bg>
+    <p:spTree>
+      <p:nvGrpSpPr>
+        <p:cNvPr id="1" name=""/>
+        <p:cNvGrpSpPr/>
+        <p:nvPr/>
+      </p:nvGrpSpPr>
+      <p:grpSpPr>
+        <a:xfrm>
+          <a:off x="0" y="0"/>
+          <a:ext cx="0" cy="0"/>
+          <a:chOff x="0" y="0"/>
+          <a:chExt cx="0" cy="0"/>
+        </a:xfrm>
+      </p:grpSpPr>
+      <p:sp>
+        <p:nvSpPr>
+          <p:cNvPr id="2" name="Segnaposto intestazione 1"/>
+          <p:cNvSpPr>
+            <a:spLocks noGrp="1"/>
+          </p:cNvSpPr>
+          <p:nvPr>
+            <p:ph type="hdr" sz="quarter"/>
+          </p:nvPr>
+        </p:nvSpPr>
+        <p:spPr>
+          <a:xfrm>
+            <a:off x="0" y="0"/>
+            <a:ext cx="2971800" cy="458788"/>
+          </a:xfrm>
+          <a:prstGeom prst="rect">
+            <a:avLst/>
+          </a:prstGeom>
+        </p:spPr>
+        <p:txBody>
+          <a:bodyPr vert="horz" lIns="91440" tIns="45720" rIns="91440" bIns="45720" rtlCol="0"/>
+          <a:lstStyle>
+            <a:lvl1pPr algn="l">
+              <a:defRPr sz="1200"/>
+            </a:lvl1pPr>
+          </a:lstStyle>
+          <a:p>
+            <a:endParaRPr lang="it-IT"/>
+          </a:p>
+        </p:txBody>
+      </p:sp>
+      <p:sp>
+        <p:nvSpPr>
+          <p:cNvPr id="3" name="Segnaposto data 2"/>
+          <p:cNvSpPr>
+            <a:spLocks noGrp="1"/>
+          </p:cNvSpPr>
+          <p:nvPr>
+            <p:ph type="dt" idx="1"/>
+          </p:nvPr>
+        </p:nvSpPr>
+        <p:spPr>
+          <a:xfrm>
+            <a:off x="3884613" y="0"/>
+            <a:ext cx="2971800" cy="458788"/>
+          </a:xfrm>
+          <a:prstGeom prst="rect">
+            <a:avLst/>
+          </a:prstGeom>
+        </p:spPr>
+        <p:txBody>
+          <a:bodyPr vert="horz" lIns="91440" tIns="45720" rIns="91440" bIns="45720" rtlCol="0"/>
+          <a:lstStyle>
+            <a:lvl1pPr algn="r">
+              <a:defRPr sz="1200"/>
+            </a:lvl1pPr>
+          </a:lstStyle>
+          <a:p>
+            <a:fld id="{37F5DA0F-3F27-463C-BADD-4A602C312453}" type="datetimeFigureOut">
+              <a:rPr lang="it-IT" smtClean="0"/>
+              <a:t>03/07/2021</a:t>
+            </a:fld>
+            <a:endParaRPr lang="it-IT"/>
+          </a:p>
+        </p:txBody>
+      </p:sp>
+      <p:sp>
+        <p:nvSpPr>
+          <p:cNvPr id="4" name="Segnaposto immagine diapositiva 3"/>
+          <p:cNvSpPr>
+            <a:spLocks noGrp="1" noRot="1" noChangeAspect="1"/>
+          </p:cNvSpPr>
+          <p:nvPr>
+            <p:ph type="sldImg" idx="2"/>
+          </p:nvPr>
+        </p:nvSpPr>
+        <p:spPr>
+          <a:xfrm>
+            <a:off x="685800" y="1143000"/>
+            <a:ext cx="5486400" cy="3086100"/>
+          </a:xfrm>
+          <a:prstGeom prst="rect">
+            <a:avLst/>
+          </a:prstGeom>
+          <a:noFill/>
+          <a:ln w="12700">
+            <a:solidFill>
+              <a:prstClr val="black"/>
+            </a:solidFill>
+          </a:ln>
+        </p:spPr>
+        <p:txBody>
+          <a:bodyPr vert="horz" lIns="91440" tIns="45720" rIns="91440" bIns="45720" rtlCol="0" anchor="ctr"/>
+          <a:lstStyle/>
+          <a:p>
+            <a:endParaRPr lang="it-IT"/>
+          </a:p>
+        </p:txBody>
+      </p:sp>
+      <p:sp>
+        <p:nvSpPr>
+          <p:cNvPr id="5" name="Segnaposto note 4"/>
+          <p:cNvSpPr>
+            <a:spLocks noGrp="1"/>
+          </p:cNvSpPr>
+          <p:nvPr>
+            <p:ph type="body" sz="quarter" idx="3"/>
+          </p:nvPr>
+        </p:nvSpPr>
+        <p:spPr>
+          <a:xfrm>
+            <a:off x="685800" y="4400550"/>
+            <a:ext cx="5486400" cy="3600450"/>
+          </a:xfrm>
+          <a:prstGeom prst="rect">
+            <a:avLst/>
+          </a:prstGeom>
+        </p:spPr>
+        <p:txBody>
+          <a:bodyPr vert="horz" lIns="91440" tIns="45720" rIns="91440" bIns="45720" rtlCol="0"/>
+          <a:lstStyle/>
+          <a:p>
+            <a:pPr lvl="0"/>
+            <a:r>
+              <a:rPr lang="it-IT"/>
+              <a:t>Fare clic per modificare gli stili del testo dello schema</a:t>
+            </a:r>
+          </a:p>
+          <a:p>
+            <a:pPr lvl="1"/>
+            <a:r>
+              <a:rPr lang="it-IT"/>
+              <a:t>Secondo livello</a:t>
+            </a:r>
+          </a:p>
+          <a:p>
+            <a:pPr lvl="2"/>
+            <a:r>
+              <a:rPr lang="it-IT"/>
+              <a:t>Terzo livello</a:t>
+            </a:r>
+          </a:p>
+          <a:p>
+            <a:pPr lvl="3"/>
+            <a:r>
+              <a:rPr lang="it-IT"/>
+              <a:t>Quarto livello</a:t>
+            </a:r>
+          </a:p>
+          <a:p>
+            <a:pPr lvl="4"/>
+            <a:r>
+              <a:rPr lang="it-IT"/>
+              <a:t>Quinto livello</a:t>
+            </a:r>
+          </a:p>
+        </p:txBody>
+      </p:sp>
+      <p:sp>
+        <p:nvSpPr>
+          <p:cNvPr id="6" name="Segnaposto piè di pagina 5"/>
+          <p:cNvSpPr>
+            <a:spLocks noGrp="1"/>
+          </p:cNvSpPr>
+          <p:nvPr>
+            <p:ph type="ftr" sz="quarter" idx="4"/>
+          </p:nvPr>
+        </p:nvSpPr>
+        <p:spPr>
+          <a:xfrm>
+            <a:off x="0" y="8685213"/>
+            <a:ext cx="2971800" cy="458787"/>
+          </a:xfrm>
+          <a:prstGeom prst="rect">
+            <a:avLst/>
+          </a:prstGeom>
+        </p:spPr>
+        <p:txBody>
+          <a:bodyPr vert="horz" lIns="91440" tIns="45720" rIns="91440" bIns="45720" rtlCol="0" anchor="b"/>
+          <a:lstStyle>
+            <a:lvl1pPr algn="l">
+              <a:defRPr sz="1200"/>
+            </a:lvl1pPr>
+          </a:lstStyle>
+          <a:p>
+            <a:endParaRPr lang="it-IT"/>
+          </a:p>
+        </p:txBody>
+      </p:sp>
+      <p:sp>
+        <p:nvSpPr>
+          <p:cNvPr id="7" name="Segnaposto numero diapositiva 6"/>
+          <p:cNvSpPr>
+            <a:spLocks noGrp="1"/>
+          </p:cNvSpPr>
+          <p:nvPr>
+            <p:ph type="sldNum" sz="quarter" idx="5"/>
+          </p:nvPr>
+        </p:nvSpPr>
+        <p:spPr>
+          <a:xfrm>
+            <a:off x="3884613" y="8685213"/>
+            <a:ext cx="2971800" cy="458787"/>
+          </a:xfrm>
+          <a:prstGeom prst="rect">
+            <a:avLst/>
+          </a:prstGeom>
+        </p:spPr>
+        <p:txBody>
+          <a:bodyPr vert="horz" lIns="91440" tIns="45720" rIns="91440" bIns="45720" rtlCol="0" anchor="b"/>
+          <a:lstStyle>
+            <a:lvl1pPr algn="r">
+              <a:defRPr sz="1200"/>
+            </a:lvl1pPr>
+          </a:lstStyle>
+          <a:p>
+            <a:fld id="{E1391FC2-2B4E-4A7E-8BBB-15E72A9EB064}" type="slidenum">
+              <a:rPr lang="it-IT" smtClean="0"/>
+              <a:t>‹N›</a:t>
+            </a:fld>
+            <a:endParaRPr lang="it-IT"/>
+          </a:p>
+        </p:txBody>
+      </p:sp>
+    </p:spTree>
+    <p:extLst>
+      <p:ext uri="{BB962C8B-B14F-4D97-AF65-F5344CB8AC3E}">
+        <p14:creationId xmlns:p14="http://schemas.microsoft.com/office/powerpoint/2010/main" val="707127740"/>
+      </p:ext>
+    </p:extLst>
+  </p:cSld>
+  <p:clrMap bg1="lt1" tx1="dk1" bg2="lt2" tx2="dk2" accent1="accent1" accent2="accent2" accent3="accent3" accent4="accent4" accent5="accent5" accent6="accent6" hlink="hlink" folHlink="folHlink"/>
+  <p:notesStyle>
+    <a:lvl1pPr marL="0" algn="l" defTabSz="914400" rtl="0" eaLnBrk="1" latinLnBrk="0" hangingPunct="1">
+      <a:defRPr sz="1200" kern="1200">
+        <a:solidFill>
+          <a:schemeClr val="tx1"/>
+        </a:solidFill>
+        <a:latin typeface="+mn-lt"/>
+        <a:ea typeface="+mn-ea"/>
+        <a:cs typeface="+mn-cs"/>
+      </a:defRPr>
+    </a:lvl1pPr>
+    <a:lvl2pPr marL="457200" algn="l" defTabSz="914400" rtl="0" eaLnBrk="1" latinLnBrk="0" hangingPunct="1">
+      <a:defRPr sz="1200" kern="1200">
+        <a:solidFill>
+          <a:schemeClr val="tx1"/>
+        </a:solidFill>
+        <a:latin typeface="+mn-lt"/>
+        <a:ea typeface="+mn-ea"/>
+        <a:cs typeface="+mn-cs"/>
+      </a:defRPr>
+    </a:lvl2pPr>
+    <a:lvl3pPr marL="914400" algn="l" defTabSz="914400" rtl="0" eaLnBrk="1" latinLnBrk="0" hangingPunct="1">
+      <a:defRPr sz="1200" kern="1200">
+        <a:solidFill>
+          <a:schemeClr val="tx1"/>
+        </a:solidFill>
+        <a:latin typeface="+mn-lt"/>
+        <a:ea typeface="+mn-ea"/>
+        <a:cs typeface="+mn-cs"/>
+      </a:defRPr>
+    </a:lvl3pPr>
+    <a:lvl4pPr marL="1371600" algn="l" defTabSz="914400" rtl="0" eaLnBrk="1" latinLnBrk="0" hangingPunct="1">
+      <a:defRPr sz="1200" kern="1200">
+        <a:solidFill>
+          <a:schemeClr val="tx1"/>
+        </a:solidFill>
+        <a:latin typeface="+mn-lt"/>
+        <a:ea typeface="+mn-ea"/>
+        <a:cs typeface="+mn-cs"/>
+      </a:defRPr>
+    </a:lvl4pPr>
+    <a:lvl5pPr marL="1828800" algn="l" defTabSz="914400" rtl="0" eaLnBrk="1" latinLnBrk="0" hangingPunct="1">
+      <a:defRPr sz="1200" kern="1200">
+        <a:solidFill>
+          <a:schemeClr val="tx1"/>
+        </a:solidFill>
+        <a:latin typeface="+mn-lt"/>
+        <a:ea typeface="+mn-ea"/>
+        <a:cs typeface="+mn-cs"/>
+      </a:defRPr>
+    </a:lvl5pPr>
+    <a:lvl6pPr marL="2286000" algn="l" defTabSz="914400" rtl="0" eaLnBrk="1" latinLnBrk="0" hangingPunct="1">
+      <a:defRPr sz="1200" kern="1200">
+        <a:solidFill>
+          <a:schemeClr val="tx1"/>
+        </a:solidFill>
+        <a:latin typeface="+mn-lt"/>
+        <a:ea typeface="+mn-ea"/>
+        <a:cs typeface="+mn-cs"/>
+      </a:defRPr>
+    </a:lvl6pPr>
+    <a:lvl7pPr marL="2743200" algn="l" defTabSz="914400" rtl="0" eaLnBrk="1" latinLnBrk="0" hangingPunct="1">
+      <a:defRPr sz="1200" kern="1200">
+        <a:solidFill>
+          <a:schemeClr val="tx1"/>
+        </a:solidFill>
+        <a:latin typeface="+mn-lt"/>
+        <a:ea typeface="+mn-ea"/>
+        <a:cs typeface="+mn-cs"/>
+      </a:defRPr>
+    </a:lvl7pPr>
+    <a:lvl8pPr marL="3200400" algn="l" defTabSz="914400" rtl="0" eaLnBrk="1" latinLnBrk="0" hangingPunct="1">
+      <a:defRPr sz="1200" kern="1200">
+        <a:solidFill>
+          <a:schemeClr val="tx1"/>
+        </a:solidFill>
+        <a:latin typeface="+mn-lt"/>
+        <a:ea typeface="+mn-ea"/>
+        <a:cs typeface="+mn-cs"/>
+      </a:defRPr>
+    </a:lvl8pPr>
+    <a:lvl9pPr marL="3657600" algn="l" defTabSz="914400" rtl="0" eaLnBrk="1" latinLnBrk="0" hangingPunct="1">
+      <a:defRPr sz="1200" kern="1200">
+        <a:solidFill>
+          <a:schemeClr val="tx1"/>
+        </a:solidFill>
+        <a:latin typeface="+mn-lt"/>
+        <a:ea typeface="+mn-ea"/>
+        <a:cs typeface="+mn-cs"/>
+      </a:defRPr>
+    </a:lvl9pPr>
+  </p:notesStyle>
+</p:notesMaster>
+</file>
+
+<file path=ppt/notesSlides/notesSlide1.xml><?xml version="1.0" encoding="utf-8"?>
+<p:notes xmlns:a="http://schemas.openxmlformats.org/drawingml/2006/main" xmlns:r="http://schemas.openxmlformats.org/officeDocument/2006/relationships" xmlns:p="http://schemas.openxmlformats.org/presentationml/2006/main">
+  <p:cSld>
+    <p:spTree>
+      <p:nvGrpSpPr>
+        <p:cNvPr id="1" name=""/>
+        <p:cNvGrpSpPr/>
+        <p:nvPr/>
+      </p:nvGrpSpPr>
+      <p:grpSpPr>
+        <a:xfrm>
+          <a:off x="0" y="0"/>
+          <a:ext cx="0" cy="0"/>
+          <a:chOff x="0" y="0"/>
+          <a:chExt cx="0" cy="0"/>
+        </a:xfrm>
+      </p:grpSpPr>
+      <p:sp>
+        <p:nvSpPr>
+          <p:cNvPr id="2" name="Segnaposto immagine diapositiva 1"/>
+          <p:cNvSpPr>
+            <a:spLocks noGrp="1" noRot="1" noChangeAspect="1"/>
+          </p:cNvSpPr>
+          <p:nvPr>
+            <p:ph type="sldImg"/>
+          </p:nvPr>
+        </p:nvSpPr>
+        <p:spPr/>
+      </p:sp>
+      <p:sp>
+        <p:nvSpPr>
+          <p:cNvPr id="3" name="Segnaposto note 2"/>
+          <p:cNvSpPr>
+            <a:spLocks noGrp="1"/>
+          </p:cNvSpPr>
+          <p:nvPr>
+            <p:ph type="body" idx="1"/>
+          </p:nvPr>
+        </p:nvSpPr>
+        <p:spPr/>
+        <p:txBody>
+          <a:bodyPr/>
+          <a:lstStyle/>
+          <a:p>
+            <a:endParaRPr lang="it-IT" dirty="0"/>
+          </a:p>
+        </p:txBody>
+      </p:sp>
+      <p:sp>
+        <p:nvSpPr>
+          <p:cNvPr id="4" name="Segnaposto numero diapositiva 3"/>
+          <p:cNvSpPr>
+            <a:spLocks noGrp="1"/>
+          </p:cNvSpPr>
+          <p:nvPr>
+            <p:ph type="sldNum" sz="quarter" idx="5"/>
+          </p:nvPr>
+        </p:nvSpPr>
+        <p:spPr/>
+        <p:txBody>
+          <a:bodyPr/>
+          <a:lstStyle/>
+          <a:p>
+            <a:fld id="{E1391FC2-2B4E-4A7E-8BBB-15E72A9EB064}" type="slidenum">
+              <a:rPr lang="it-IT" smtClean="0"/>
+              <a:t>12</a:t>
+            </a:fld>
+            <a:endParaRPr lang="it-IT"/>
+          </a:p>
+        </p:txBody>
+      </p:sp>
+    </p:spTree>
+    <p:extLst>
+      <p:ext uri="{BB962C8B-B14F-4D97-AF65-F5344CB8AC3E}">
+        <p14:creationId xmlns:p14="http://schemas.microsoft.com/office/powerpoint/2010/main" val="3501957516"/>
+      </p:ext>
+    </p:extLst>
+  </p:cSld>
+  <p:clrMapOvr>
+    <a:masterClrMapping/>
+  </p:clrMapOvr>
+</p:notes>
+</file>
+
 <file path=ppt/slideLayouts/slideLayout1.xml><?xml version="1.0" encoding="utf-8"?>
 <p:sldLayout xmlns:a="http://schemas.openxmlformats.org/drawingml/2006/main" xmlns:r="http://schemas.openxmlformats.org/officeDocument/2006/relationships" xmlns:p="http://schemas.openxmlformats.org/presentationml/2006/main" showMasterSp="0" type="title" preserve="1">
   <p:cSld name="Diapositiva titolo">
@@ -7497,23 +8036,23 @@
           <a:lstStyle/>
           <a:p>
             <a:r>
-              <a:rPr lang="it-IT" dirty="0"/>
+              <a:rPr lang="it-IT" sz="4400" dirty="0"/>
               <a:t>Solving the </a:t>
             </a:r>
             <a:r>
-              <a:rPr lang="it-IT" dirty="0" err="1"/>
+              <a:rPr lang="it-IT" sz="4400" dirty="0" err="1"/>
               <a:t>Maze</a:t>
             </a:r>
             <a:r>
-              <a:rPr lang="it-IT" dirty="0"/>
+              <a:rPr lang="it-IT" sz="4400" dirty="0"/>
               <a:t> </a:t>
             </a:r>
             <a:r>
-              <a:rPr lang="it-IT" dirty="0" err="1"/>
+              <a:rPr lang="it-IT" sz="4400" dirty="0" err="1"/>
               <a:t>problem</a:t>
             </a:r>
             <a:r>
-              <a:rPr lang="it-IT" dirty="0"/>
+              <a:rPr lang="it-IT" sz="4400" dirty="0"/>
               <a:t> with ILP</a:t>
             </a:r>
           </a:p>
@@ -7887,7 +8426,7 @@
           <a:lstStyle/>
           <a:p>
             <a:r>
-              <a:rPr lang="it-IT"/>
+              <a:rPr lang="it-IT" dirty="0"/>
               <a:t>Learning to travel</a:t>
             </a:r>
           </a:p>
@@ -8194,7 +8733,7 @@
                 <a:latin typeface="Courier New" panose="02070309020205020404" pitchFamily="49" charset="0"/>
                 <a:cs typeface="Courier New" panose="02070309020205020404" pitchFamily="49" charset="0"/>
               </a:rPr>
-              <a:t>reach((1,1), (2,1)).</a:t>
+              <a:t>reach((1,1), (2,1)). </a:t>
             </a:r>
           </a:p>
           <a:p>
@@ -8292,6 +8831,77 @@
             <a:endParaRPr lang="it-IT" sz="1400" b="1" u="sng" dirty="0">
               <a:cs typeface="Courier New" panose="02070309020205020404" pitchFamily="49" charset="0"/>
             </a:endParaRPr>
+          </a:p>
+        </p:txBody>
+      </p:sp>
+      <p:sp>
+        <p:nvSpPr>
+          <p:cNvPr id="5" name="CasellaDiTesto 4">
+            <a:extLst>
+              <a:ext uri="{FF2B5EF4-FFF2-40B4-BE49-F238E27FC236}">
+                <a16:creationId xmlns:a16="http://schemas.microsoft.com/office/drawing/2014/main" id="{01B90FCF-2DEC-4277-A69C-67F0AD636F3E}"/>
+              </a:ext>
+            </a:extLst>
+          </p:cNvPr>
+          <p:cNvSpPr txBox="1"/>
+          <p:nvPr/>
+        </p:nvSpPr>
+        <p:spPr>
+          <a:xfrm>
+            <a:off x="6874563" y="4810400"/>
+            <a:ext cx="2628901" cy="276999"/>
+          </a:xfrm>
+          <a:prstGeom prst="rect">
+            <a:avLst/>
+          </a:prstGeom>
+          <a:noFill/>
+        </p:spPr>
+        <p:txBody>
+          <a:bodyPr wrap="square" rtlCol="0">
+            <a:spAutoFit/>
+          </a:bodyPr>
+          <a:lstStyle/>
+          <a:p>
+            <a:r>
+              <a:rPr lang="it-IT" sz="1200" dirty="0" err="1"/>
+              <a:t>What</a:t>
+            </a:r>
+            <a:r>
+              <a:rPr lang="it-IT" sz="1200" dirty="0"/>
+              <a:t> </a:t>
+            </a:r>
+            <a:r>
+              <a:rPr lang="it-IT" sz="1200" dirty="0" err="1"/>
+              <a:t>if</a:t>
+            </a:r>
+            <a:r>
+              <a:rPr lang="it-IT" sz="1200" dirty="0"/>
+              <a:t> </a:t>
+            </a:r>
+            <a:r>
+              <a:rPr lang="it-IT" sz="1200" dirty="0" err="1"/>
+              <a:t>we</a:t>
+            </a:r>
+            <a:r>
+              <a:rPr lang="it-IT" sz="1200" dirty="0"/>
+              <a:t> </a:t>
+            </a:r>
+            <a:r>
+              <a:rPr lang="it-IT" sz="1200" dirty="0" err="1"/>
+              <a:t>remove</a:t>
+            </a:r>
+            <a:r>
+              <a:rPr lang="it-IT" sz="1200" dirty="0"/>
+              <a:t> </a:t>
+            </a:r>
+            <a:r>
+              <a:rPr lang="it-IT" sz="1200" dirty="0" err="1"/>
+              <a:t>this</a:t>
+            </a:r>
+            <a:r>
+              <a:rPr lang="it-IT" sz="1200" dirty="0"/>
+              <a:t>?</a:t>
+            </a:r>
           </a:p>
         </p:txBody>
       </p:sp>
@@ -8305,10 +8915,882 @@
   <p:clrMapOvr>
     <a:masterClrMapping/>
   </p:clrMapOvr>
+  <p:timing>
+    <p:tnLst>
+      <p:par>
+        <p:cTn id="1" dur="indefinite" restart="never" nodeType="tmRoot">
+          <p:childTnLst>
+            <p:seq concurrent="1" nextAc="seek">
+              <p:cTn id="2" dur="indefinite" nodeType="mainSeq">
+                <p:childTnLst>
+                  <p:par>
+                    <p:cTn id="3" fill="hold">
+                      <p:stCondLst>
+                        <p:cond delay="indefinite"/>
+                      </p:stCondLst>
+                      <p:childTnLst>
+                        <p:par>
+                          <p:cTn id="4" fill="hold">
+                            <p:stCondLst>
+                              <p:cond delay="0"/>
+                            </p:stCondLst>
+                            <p:childTnLst>
+                              <p:par>
+                                <p:cTn id="5" presetID="10" presetClass="entr" presetSubtype="0" fill="hold" grpId="0" nodeType="clickEffect">
+                                  <p:stCondLst>
+                                    <p:cond delay="0"/>
+                                  </p:stCondLst>
+                                  <p:childTnLst>
+                                    <p:set>
+                                      <p:cBhvr>
+                                        <p:cTn id="6" dur="1" fill="hold">
+                                          <p:stCondLst>
+                                            <p:cond delay="0"/>
+                                          </p:stCondLst>
+                                        </p:cTn>
+                                        <p:tgtEl>
+                                          <p:spTgt spid="5"/>
+                                        </p:tgtEl>
+                                        <p:attrNameLst>
+                                          <p:attrName>style.visibility</p:attrName>
+                                        </p:attrNameLst>
+                                      </p:cBhvr>
+                                      <p:to>
+                                        <p:strVal val="visible"/>
+                                      </p:to>
+                                    </p:set>
+                                    <p:animEffect transition="in" filter="fade">
+                                      <p:cBhvr>
+                                        <p:cTn id="7" dur="500"/>
+                                        <p:tgtEl>
+                                          <p:spTgt spid="5"/>
+                                        </p:tgtEl>
+                                      </p:cBhvr>
+                                    </p:animEffect>
+                                  </p:childTnLst>
+                                </p:cTn>
+                              </p:par>
+                            </p:childTnLst>
+                          </p:cTn>
+                        </p:par>
+                      </p:childTnLst>
+                    </p:cTn>
+                  </p:par>
+                </p:childTnLst>
+              </p:cTn>
+              <p:prevCondLst>
+                <p:cond evt="onPrev" delay="0">
+                  <p:tgtEl>
+                    <p:sldTgt/>
+                  </p:tgtEl>
+                </p:cond>
+              </p:prevCondLst>
+              <p:nextCondLst>
+                <p:cond evt="onNext" delay="0">
+                  <p:tgtEl>
+                    <p:sldTgt/>
+                  </p:tgtEl>
+                </p:cond>
+              </p:nextCondLst>
+            </p:seq>
+          </p:childTnLst>
+        </p:cTn>
+      </p:par>
+    </p:tnLst>
+    <p:bldLst>
+      <p:bldP spid="5" grpId="0"/>
+    </p:bldLst>
+  </p:timing>
 </p:sld>
 </file>
 
 <file path=ppt/slides/slide11.xml><?xml version="1.0" encoding="utf-8"?>
+<p:sld xmlns:a="http://schemas.openxmlformats.org/drawingml/2006/main" xmlns:r="http://schemas.openxmlformats.org/officeDocument/2006/relationships" xmlns:p="http://schemas.openxmlformats.org/presentationml/2006/main">
+  <p:cSld>
+    <p:bg>
+      <p:bgPr>
+        <a:solidFill>
+          <a:schemeClr val="bg1"/>
+        </a:solidFill>
+        <a:effectLst/>
+      </p:bgPr>
+    </p:bg>
+    <p:spTree>
+      <p:nvGrpSpPr>
+        <p:cNvPr id="1" name=""/>
+        <p:cNvGrpSpPr/>
+        <p:nvPr/>
+      </p:nvGrpSpPr>
+      <p:grpSpPr>
+        <a:xfrm>
+          <a:off x="0" y="0"/>
+          <a:ext cx="0" cy="0"/>
+          <a:chOff x="0" y="0"/>
+          <a:chExt cx="0" cy="0"/>
+        </a:xfrm>
+      </p:grpSpPr>
+      <p:pic>
+        <p:nvPicPr>
+          <p:cNvPr id="4" name="Picture 4" descr="Maze">
+            <a:extLst>
+              <a:ext uri="{FF2B5EF4-FFF2-40B4-BE49-F238E27FC236}">
+                <a16:creationId xmlns:a16="http://schemas.microsoft.com/office/drawing/2014/main" id="{D809EADF-C4D7-4EB7-AD80-F9F543370A6C}"/>
+              </a:ext>
+            </a:extLst>
+          </p:cNvPr>
+          <p:cNvPicPr>
+            <a:picLocks noChangeAspect="1"/>
+          </p:cNvPicPr>
+          <p:nvPr/>
+        </p:nvPicPr>
+        <p:blipFill rotWithShape="1">
+          <a:blip r:embed="rId2"/>
+          <a:srcRect t="9021"/>
+          <a:stretch/>
+        </p:blipFill>
+        <p:spPr>
+          <a:xfrm>
+            <a:off x="20" y="10"/>
+            <a:ext cx="11292820" cy="6857990"/>
+          </a:xfrm>
+          <a:prstGeom prst="rect">
+            <a:avLst/>
+          </a:prstGeom>
+        </p:spPr>
+      </p:pic>
+      <p:sp>
+        <p:nvSpPr>
+          <p:cNvPr id="9" name="Rectangle 8">
+            <a:extLst>
+              <a:ext uri="{FF2B5EF4-FFF2-40B4-BE49-F238E27FC236}">
+                <a16:creationId xmlns:a16="http://schemas.microsoft.com/office/drawing/2014/main" id="{9163A971-857A-4D4D-B458-BADAF926FFCC}"/>
+              </a:ext>
+              <a:ext uri="{C183D7F6-B498-43B3-948B-1728B52AA6E4}">
+                <adec:decorative xmlns:adec="http://schemas.microsoft.com/office/drawing/2017/decorative" val="1"/>
+              </a:ext>
+            </a:extLst>
+          </p:cNvPr>
+          <p:cNvSpPr>
+            <a:spLocks noGrp="1" noRot="1" noChangeAspect="1" noMove="1" noResize="1" noEditPoints="1" noAdjustHandles="1" noChangeArrowheads="1" noChangeShapeType="1" noTextEdit="1"/>
+          </p:cNvSpPr>
+          <p:nvPr>
+            <p:extLst>
+              <p:ext uri="{386F3935-93C4-4BCD-93E2-E3B085C9AB24}">
+                <p16:designElem xmlns:p16="http://schemas.microsoft.com/office/powerpoint/2015/main" val="1"/>
+              </p:ext>
+            </p:extLst>
+          </p:nvPr>
+        </p:nvSpPr>
+        <p:spPr>
+          <a:xfrm>
+            <a:off x="3559481" y="0"/>
+            <a:ext cx="7737169" cy="6858000"/>
+          </a:xfrm>
+          <a:prstGeom prst="rect">
+            <a:avLst/>
+          </a:prstGeom>
+          <a:solidFill>
+            <a:schemeClr val="bg1">
+              <a:alpha val="91000"/>
+            </a:schemeClr>
+          </a:solidFill>
+          <a:ln>
+            <a:noFill/>
+          </a:ln>
+        </p:spPr>
+        <p:style>
+          <a:lnRef idx="2">
+            <a:schemeClr val="accent1">
+              <a:shade val="50000"/>
+            </a:schemeClr>
+          </a:lnRef>
+          <a:fillRef idx="1">
+            <a:schemeClr val="accent1"/>
+          </a:fillRef>
+          <a:effectRef idx="0">
+            <a:schemeClr val="accent1"/>
+          </a:effectRef>
+          <a:fontRef idx="minor">
+            <a:schemeClr val="lt1"/>
+          </a:fontRef>
+        </p:style>
+        <p:txBody>
+          <a:bodyPr rtlCol="0" anchor="ctr"/>
+          <a:lstStyle/>
+          <a:p>
+            <a:pPr marL="0" marR="0" lvl="0" indent="0" algn="ctr" defTabSz="914400" rtl="0" eaLnBrk="1" fontAlgn="auto" latinLnBrk="0" hangingPunct="1">
+              <a:lnSpc>
+                <a:spcPct val="100000"/>
+              </a:lnSpc>
+              <a:spcBef>
+                <a:spcPts val="0"/>
+              </a:spcBef>
+              <a:spcAft>
+                <a:spcPts val="0"/>
+              </a:spcAft>
+              <a:buClrTx/>
+              <a:buSzTx/>
+              <a:buFontTx/>
+              <a:buNone/>
+              <a:tabLst/>
+              <a:defRPr/>
+            </a:pPr>
+            <a:endParaRPr kumimoji="0" lang="en-US" sz="1800" b="0" i="0" u="none" strike="noStrike" kern="1200" cap="none" spc="0" normalizeH="0" baseline="0" noProof="0">
+              <a:ln>
+                <a:noFill/>
+              </a:ln>
+              <a:solidFill>
+                <a:srgbClr val="FFFFFF"/>
+              </a:solidFill>
+              <a:effectLst/>
+              <a:uLnTx/>
+              <a:uFillTx/>
+              <a:latin typeface="Century Schoolbook" panose="02040604050505020304"/>
+              <a:ea typeface="+mn-ea"/>
+              <a:cs typeface="+mn-cs"/>
+            </a:endParaRPr>
+          </a:p>
+        </p:txBody>
+      </p:sp>
+      <p:sp>
+        <p:nvSpPr>
+          <p:cNvPr id="2" name="Titolo 1">
+            <a:extLst>
+              <a:ext uri="{FF2B5EF4-FFF2-40B4-BE49-F238E27FC236}">
+                <a16:creationId xmlns:a16="http://schemas.microsoft.com/office/drawing/2014/main" id="{58E0E44F-EF9E-40B5-9B76-DF4FED4F2B4C}"/>
+              </a:ext>
+            </a:extLst>
+          </p:cNvPr>
+          <p:cNvSpPr>
+            <a:spLocks noGrp="1"/>
+          </p:cNvSpPr>
+          <p:nvPr>
+            <p:ph type="title"/>
+          </p:nvPr>
+        </p:nvSpPr>
+        <p:spPr>
+          <a:xfrm>
+            <a:off x="4050889" y="365758"/>
+            <a:ext cx="6784259" cy="1828800"/>
+          </a:xfrm>
+        </p:spPr>
+        <p:txBody>
+          <a:bodyPr>
+            <a:normAutofit/>
+          </a:bodyPr>
+          <a:lstStyle/>
+          <a:p>
+            <a:r>
+              <a:rPr lang="it-IT" dirty="0"/>
+              <a:t>Learning to travel (from scratch)</a:t>
+            </a:r>
+          </a:p>
+        </p:txBody>
+      </p:sp>
+      <p:sp>
+        <p:nvSpPr>
+          <p:cNvPr id="3" name="Segnaposto contenuto 2">
+            <a:extLst>
+              <a:ext uri="{FF2B5EF4-FFF2-40B4-BE49-F238E27FC236}">
+                <a16:creationId xmlns:a16="http://schemas.microsoft.com/office/drawing/2014/main" id="{17B7C98C-91C5-42A6-AE60-10548043DE9E}"/>
+              </a:ext>
+            </a:extLst>
+          </p:cNvPr>
+          <p:cNvSpPr>
+            <a:spLocks noGrp="1"/>
+          </p:cNvSpPr>
+          <p:nvPr>
+            <p:ph idx="1"/>
+          </p:nvPr>
+        </p:nvSpPr>
+        <p:spPr>
+          <a:xfrm>
+            <a:off x="4050889" y="2516291"/>
+            <a:ext cx="6784259" cy="3682896"/>
+          </a:xfrm>
+        </p:spPr>
+        <p:txBody>
+          <a:bodyPr>
+            <a:normAutofit fontScale="92500" lnSpcReduction="20000"/>
+          </a:bodyPr>
+          <a:lstStyle/>
+          <a:p>
+            <a:r>
+              <a:rPr lang="it-IT" sz="1400" b="1" dirty="0"/>
+              <a:t>Goal: </a:t>
+            </a:r>
+            <a:r>
+              <a:rPr lang="it-IT" sz="1400" dirty="0" err="1"/>
+              <a:t>Learn</a:t>
+            </a:r>
+            <a:r>
+              <a:rPr lang="it-IT" sz="1400" dirty="0"/>
+              <a:t> to </a:t>
+            </a:r>
+            <a:r>
+              <a:rPr lang="it-IT" sz="1400" dirty="0" err="1"/>
+              <a:t>move</a:t>
+            </a:r>
+            <a:r>
+              <a:rPr lang="it-IT" sz="1400" dirty="0"/>
+              <a:t> from </a:t>
+            </a:r>
+            <a:r>
+              <a:rPr lang="it-IT" sz="1400" dirty="0" err="1"/>
+              <a:t>two</a:t>
+            </a:r>
+            <a:r>
+              <a:rPr lang="it-IT" sz="1400" dirty="0"/>
+              <a:t> </a:t>
+            </a:r>
+            <a:r>
+              <a:rPr lang="it-IT" sz="1400" dirty="0" err="1"/>
+              <a:t>distant</a:t>
+            </a:r>
+            <a:r>
+              <a:rPr lang="it-IT" sz="1400" dirty="0"/>
+              <a:t> </a:t>
+            </a:r>
+            <a:r>
+              <a:rPr lang="it-IT" sz="1400" dirty="0" err="1"/>
+              <a:t>cells</a:t>
+            </a:r>
+            <a:r>
+              <a:rPr lang="it-IT" sz="1400" dirty="0"/>
+              <a:t> in the </a:t>
+            </a:r>
+            <a:r>
+              <a:rPr lang="it-IT" sz="1400" dirty="0" err="1"/>
+              <a:t>Maze</a:t>
+            </a:r>
+            <a:r>
+              <a:rPr lang="it-IT" sz="1400" dirty="0"/>
+              <a:t> </a:t>
+            </a:r>
+            <a:r>
+              <a:rPr lang="it-IT" sz="1400" dirty="0" err="1"/>
+              <a:t>without</a:t>
+            </a:r>
+            <a:r>
+              <a:rPr lang="it-IT" sz="1400" dirty="0"/>
+              <a:t> </a:t>
+            </a:r>
+            <a:r>
+              <a:rPr lang="it-IT" sz="1400" dirty="0" err="1"/>
+              <a:t>going</a:t>
+            </a:r>
+            <a:r>
+              <a:rPr lang="it-IT" sz="1400" dirty="0"/>
+              <a:t> </a:t>
+            </a:r>
+            <a:r>
+              <a:rPr lang="it-IT" sz="1400" dirty="0" err="1"/>
+              <a:t>through</a:t>
+            </a:r>
+            <a:r>
+              <a:rPr lang="it-IT" sz="1400" dirty="0"/>
+              <a:t> </a:t>
+            </a:r>
+            <a:r>
+              <a:rPr lang="it-IT" sz="1400" dirty="0" err="1"/>
+              <a:t>illegal</a:t>
+            </a:r>
+            <a:r>
+              <a:rPr lang="it-IT" sz="1400" dirty="0"/>
+              <a:t> </a:t>
+            </a:r>
+            <a:r>
+              <a:rPr lang="it-IT" sz="1400" dirty="0" err="1"/>
+              <a:t>cells</a:t>
+            </a:r>
+            <a:r>
+              <a:rPr lang="it-IT" sz="1400" dirty="0"/>
+              <a:t>. (Predicate </a:t>
+            </a:r>
+            <a:r>
+              <a:rPr lang="it-IT" sz="1400" dirty="0" err="1">
+                <a:latin typeface="Courier New" panose="02070309020205020404" pitchFamily="49" charset="0"/>
+                <a:cs typeface="Courier New" panose="02070309020205020404" pitchFamily="49" charset="0"/>
+              </a:rPr>
+              <a:t>reach</a:t>
+            </a:r>
+            <a:r>
+              <a:rPr lang="it-IT" sz="1400" dirty="0">
+                <a:latin typeface="Courier New" panose="02070309020205020404" pitchFamily="49" charset="0"/>
+                <a:cs typeface="Courier New" panose="02070309020205020404" pitchFamily="49" charset="0"/>
+              </a:rPr>
+              <a:t>/2</a:t>
+            </a:r>
+            <a:r>
+              <a:rPr lang="it-IT" sz="1400" dirty="0"/>
+              <a:t>).</a:t>
+            </a:r>
+          </a:p>
+          <a:p>
+            <a:r>
+              <a:rPr lang="it-IT" sz="1400" b="1" dirty="0"/>
+              <a:t>Background Knowledge:</a:t>
+            </a:r>
+          </a:p>
+          <a:p>
+            <a:pPr lvl="1"/>
+            <a:r>
+              <a:rPr lang="it-IT" sz="1400" dirty="0" err="1">
+                <a:latin typeface="Courier New" panose="02070309020205020404" pitchFamily="49" charset="0"/>
+                <a:cs typeface="Courier New" panose="02070309020205020404" pitchFamily="49" charset="0"/>
+              </a:rPr>
+              <a:t>inc_x</a:t>
+            </a:r>
+            <a:r>
+              <a:rPr lang="it-IT" sz="1400" dirty="0">
+                <a:latin typeface="Courier New" panose="02070309020205020404" pitchFamily="49" charset="0"/>
+                <a:cs typeface="Courier New" panose="02070309020205020404" pitchFamily="49" charset="0"/>
+              </a:rPr>
+              <a:t>/2; </a:t>
+            </a:r>
+            <a:r>
+              <a:rPr lang="it-IT" sz="1400" dirty="0" err="1">
+                <a:latin typeface="Courier New" panose="02070309020205020404" pitchFamily="49" charset="0"/>
+                <a:cs typeface="Courier New" panose="02070309020205020404" pitchFamily="49" charset="0"/>
+              </a:rPr>
+              <a:t>dec_x</a:t>
+            </a:r>
+            <a:r>
+              <a:rPr lang="it-IT" sz="1400" dirty="0">
+                <a:latin typeface="Courier New" panose="02070309020205020404" pitchFamily="49" charset="0"/>
+                <a:cs typeface="Courier New" panose="02070309020205020404" pitchFamily="49" charset="0"/>
+              </a:rPr>
+              <a:t>/2; </a:t>
+            </a:r>
+            <a:r>
+              <a:rPr lang="it-IT" sz="1400" dirty="0" err="1">
+                <a:latin typeface="Courier New" panose="02070309020205020404" pitchFamily="49" charset="0"/>
+                <a:cs typeface="Courier New" panose="02070309020205020404" pitchFamily="49" charset="0"/>
+              </a:rPr>
+              <a:t>inc_y</a:t>
+            </a:r>
+            <a:r>
+              <a:rPr lang="it-IT" sz="1400" dirty="0">
+                <a:latin typeface="Courier New" panose="02070309020205020404" pitchFamily="49" charset="0"/>
+                <a:cs typeface="Courier New" panose="02070309020205020404" pitchFamily="49" charset="0"/>
+              </a:rPr>
+              <a:t>/2; </a:t>
+            </a:r>
+            <a:r>
+              <a:rPr lang="it-IT" sz="1400" dirty="0" err="1">
+                <a:latin typeface="Courier New" panose="02070309020205020404" pitchFamily="49" charset="0"/>
+                <a:cs typeface="Courier New" panose="02070309020205020404" pitchFamily="49" charset="0"/>
+              </a:rPr>
+              <a:t>dec_y</a:t>
+            </a:r>
+            <a:r>
+              <a:rPr lang="it-IT" sz="1400" dirty="0">
+                <a:latin typeface="Courier New" panose="02070309020205020404" pitchFamily="49" charset="0"/>
+                <a:cs typeface="Courier New" panose="02070309020205020404" pitchFamily="49" charset="0"/>
+              </a:rPr>
+              <a:t>/2;</a:t>
+            </a:r>
+          </a:p>
+          <a:p>
+            <a:pPr lvl="1"/>
+            <a:r>
+              <a:rPr lang="it-IT" sz="1400" dirty="0" err="1">
+                <a:latin typeface="Courier New" panose="02070309020205020404" pitchFamily="49" charset="0"/>
+                <a:cs typeface="Courier New" panose="02070309020205020404" pitchFamily="49" charset="0"/>
+              </a:rPr>
+              <a:t>legal_position</a:t>
+            </a:r>
+            <a:r>
+              <a:rPr lang="it-IT" sz="1400" dirty="0">
+                <a:latin typeface="Courier New" panose="02070309020205020404" pitchFamily="49" charset="0"/>
+                <a:cs typeface="Courier New" panose="02070309020205020404" pitchFamily="49" charset="0"/>
+              </a:rPr>
+              <a:t>/1.</a:t>
+            </a:r>
+          </a:p>
+          <a:p>
+            <a:r>
+              <a:rPr lang="it-IT" sz="1600" b="1" dirty="0" err="1">
+                <a:cs typeface="Courier New" panose="02070309020205020404" pitchFamily="49" charset="0"/>
+              </a:rPr>
+              <a:t>Metarules</a:t>
+            </a:r>
+            <a:r>
+              <a:rPr lang="it-IT" sz="1600" b="1" dirty="0">
+                <a:cs typeface="Courier New" panose="02070309020205020404" pitchFamily="49" charset="0"/>
+              </a:rPr>
+              <a:t>:</a:t>
+            </a:r>
+          </a:p>
+          <a:p>
+            <a:pPr lvl="1"/>
+            <a:r>
+              <a:rPr lang="it-IT" sz="1400" dirty="0" err="1">
+                <a:latin typeface="Courier New" panose="02070309020205020404" pitchFamily="49" charset="0"/>
+                <a:cs typeface="Courier New" panose="02070309020205020404" pitchFamily="49" charset="0"/>
+              </a:rPr>
+              <a:t>metarule</a:t>
+            </a:r>
+            <a:r>
+              <a:rPr lang="it-IT" sz="1400" dirty="0">
+                <a:latin typeface="Courier New" panose="02070309020205020404" pitchFamily="49" charset="0"/>
+                <a:cs typeface="Courier New" panose="02070309020205020404" pitchFamily="49" charset="0"/>
+              </a:rPr>
+              <a:t>(</a:t>
+            </a:r>
+            <a:r>
+              <a:rPr lang="it-IT" sz="1400" dirty="0" err="1">
+                <a:latin typeface="Courier New" panose="02070309020205020404" pitchFamily="49" charset="0"/>
+                <a:cs typeface="Courier New" panose="02070309020205020404" pitchFamily="49" charset="0"/>
+              </a:rPr>
+              <a:t>recursion</a:t>
+            </a:r>
+            <a:r>
+              <a:rPr lang="it-IT" sz="1400" dirty="0">
+                <a:latin typeface="Courier New" panose="02070309020205020404" pitchFamily="49" charset="0"/>
+                <a:cs typeface="Courier New" panose="02070309020205020404" pitchFamily="49" charset="0"/>
+              </a:rPr>
+              <a:t>,[P,Q],[P,A,B],[[Q,A,C],[P,C,B]]).</a:t>
+            </a:r>
+          </a:p>
+          <a:p>
+            <a:pPr lvl="1"/>
+            <a:r>
+              <a:rPr lang="it-IT" sz="1400" dirty="0" err="1">
+                <a:latin typeface="Courier New" panose="02070309020205020404" pitchFamily="49" charset="0"/>
+                <a:cs typeface="Courier New" panose="02070309020205020404" pitchFamily="49" charset="0"/>
+              </a:rPr>
+              <a:t>metarule</a:t>
+            </a:r>
+            <a:r>
+              <a:rPr lang="it-IT" sz="1400" dirty="0">
+                <a:latin typeface="Courier New" panose="02070309020205020404" pitchFamily="49" charset="0"/>
+                <a:cs typeface="Courier New" panose="02070309020205020404" pitchFamily="49" charset="0"/>
+              </a:rPr>
+              <a:t>(</a:t>
+            </a:r>
+            <a:r>
+              <a:rPr lang="it-IT" sz="1400" dirty="0" err="1">
+                <a:latin typeface="Courier New" panose="02070309020205020404" pitchFamily="49" charset="0"/>
+                <a:cs typeface="Courier New" panose="02070309020205020404" pitchFamily="49" charset="0"/>
+              </a:rPr>
+              <a:t>ident</a:t>
+            </a:r>
+            <a:r>
+              <a:rPr lang="it-IT" sz="1400" dirty="0">
+                <a:latin typeface="Courier New" panose="02070309020205020404" pitchFamily="49" charset="0"/>
+                <a:cs typeface="Courier New" panose="02070309020205020404" pitchFamily="49" charset="0"/>
+              </a:rPr>
+              <a:t>,[P,Q],[P,A,B],[[Q,A,B]]).</a:t>
+            </a:r>
+          </a:p>
+          <a:p>
+            <a:r>
+              <a:rPr lang="it-IT" sz="1400" b="1" dirty="0">
+                <a:cs typeface="Courier New" panose="02070309020205020404" pitchFamily="49" charset="0"/>
+              </a:rPr>
+              <a:t>Positive </a:t>
+            </a:r>
+            <a:r>
+              <a:rPr lang="it-IT" sz="1400" b="1" dirty="0" err="1">
+                <a:cs typeface="Courier New" panose="02070309020205020404" pitchFamily="49" charset="0"/>
+              </a:rPr>
+              <a:t>examples</a:t>
+            </a:r>
+            <a:r>
+              <a:rPr lang="it-IT" sz="1400" b="1" dirty="0">
+                <a:cs typeface="Courier New" panose="02070309020205020404" pitchFamily="49" charset="0"/>
+              </a:rPr>
+              <a:t>:</a:t>
+            </a:r>
+          </a:p>
+          <a:p>
+            <a:pPr lvl="1"/>
+            <a:r>
+              <a:rPr lang="it-IT" sz="1200" dirty="0">
+                <a:cs typeface="Courier New" panose="02070309020205020404" pitchFamily="49" charset="0"/>
+              </a:rPr>
+              <a:t>4 </a:t>
+            </a:r>
+            <a:r>
+              <a:rPr lang="it-IT" sz="1200" dirty="0" err="1">
+                <a:cs typeface="Courier New" panose="02070309020205020404" pitchFamily="49" charset="0"/>
+              </a:rPr>
+              <a:t>examples</a:t>
+            </a:r>
+            <a:r>
+              <a:rPr lang="it-IT" sz="1200" dirty="0">
+                <a:cs typeface="Courier New" panose="02070309020205020404" pitchFamily="49" charset="0"/>
+              </a:rPr>
+              <a:t> </a:t>
+            </a:r>
+            <a:r>
+              <a:rPr lang="it-IT" sz="1200" dirty="0" err="1">
+                <a:cs typeface="Courier New" panose="02070309020205020404" pitchFamily="49" charset="0"/>
+              </a:rPr>
+              <a:t>representing</a:t>
+            </a:r>
+            <a:r>
+              <a:rPr lang="it-IT" sz="1200" dirty="0">
+                <a:cs typeface="Courier New" panose="02070309020205020404" pitchFamily="49" charset="0"/>
+              </a:rPr>
+              <a:t> a single step (one for </a:t>
+            </a:r>
+            <a:r>
+              <a:rPr lang="it-IT" sz="1200" dirty="0" err="1">
+                <a:cs typeface="Courier New" panose="02070309020205020404" pitchFamily="49" charset="0"/>
+              </a:rPr>
+              <a:t>each</a:t>
+            </a:r>
+            <a:r>
+              <a:rPr lang="it-IT" sz="1200" dirty="0">
+                <a:cs typeface="Courier New" panose="02070309020205020404" pitchFamily="49" charset="0"/>
+              </a:rPr>
+              <a:t> </a:t>
+            </a:r>
+            <a:r>
+              <a:rPr lang="it-IT" sz="1200" dirty="0" err="1">
+                <a:cs typeface="Courier New" panose="02070309020205020404" pitchFamily="49" charset="0"/>
+              </a:rPr>
+              <a:t>direction</a:t>
+            </a:r>
+            <a:r>
+              <a:rPr lang="it-IT" sz="1200" dirty="0">
+                <a:cs typeface="Courier New" panose="02070309020205020404" pitchFamily="49" charset="0"/>
+              </a:rPr>
+              <a:t>).</a:t>
+            </a:r>
+          </a:p>
+          <a:p>
+            <a:pPr lvl="1"/>
+            <a:r>
+              <a:rPr lang="it-IT" sz="1200" dirty="0">
+                <a:cs typeface="Courier New" panose="02070309020205020404" pitchFamily="49" charset="0"/>
+              </a:rPr>
+              <a:t>1 </a:t>
+            </a:r>
+            <a:r>
+              <a:rPr lang="it-IT" sz="1200" dirty="0" err="1">
+                <a:cs typeface="Courier New" panose="02070309020205020404" pitchFamily="49" charset="0"/>
+              </a:rPr>
+              <a:t>example</a:t>
+            </a:r>
+            <a:r>
+              <a:rPr lang="it-IT" sz="1200" dirty="0">
+                <a:cs typeface="Courier New" panose="02070309020205020404" pitchFamily="49" charset="0"/>
+              </a:rPr>
+              <a:t> </a:t>
+            </a:r>
+            <a:r>
+              <a:rPr lang="it-IT" sz="1200" dirty="0" err="1">
+                <a:cs typeface="Courier New" panose="02070309020205020404" pitchFamily="49" charset="0"/>
+              </a:rPr>
+              <a:t>representing</a:t>
+            </a:r>
+            <a:r>
+              <a:rPr lang="it-IT" sz="1200" dirty="0">
+                <a:cs typeface="Courier New" panose="02070309020205020404" pitchFamily="49" charset="0"/>
+              </a:rPr>
+              <a:t> a </a:t>
+            </a:r>
+            <a:r>
+              <a:rPr lang="it-IT" sz="1200" dirty="0" err="1">
+                <a:cs typeface="Courier New" panose="02070309020205020404" pitchFamily="49" charset="0"/>
+              </a:rPr>
+              <a:t>path</a:t>
+            </a:r>
+            <a:r>
+              <a:rPr lang="it-IT" sz="1200" dirty="0">
+                <a:cs typeface="Courier New" panose="02070309020205020404" pitchFamily="49" charset="0"/>
+              </a:rPr>
+              <a:t> </a:t>
+            </a:r>
+            <a:r>
+              <a:rPr lang="it-IT" sz="1200" dirty="0" err="1">
+                <a:cs typeface="Courier New" panose="02070309020205020404" pitchFamily="49" charset="0"/>
+              </a:rPr>
+              <a:t>which</a:t>
+            </a:r>
+            <a:r>
+              <a:rPr lang="it-IT" sz="1200" dirty="0">
+                <a:cs typeface="Courier New" panose="02070309020205020404" pitchFamily="49" charset="0"/>
+              </a:rPr>
+              <a:t> </a:t>
+            </a:r>
+            <a:r>
+              <a:rPr lang="it-IT" sz="1200" dirty="0" err="1">
+                <a:cs typeface="Courier New" panose="02070309020205020404" pitchFamily="49" charset="0"/>
+              </a:rPr>
+              <a:t>uses</a:t>
+            </a:r>
+            <a:r>
+              <a:rPr lang="it-IT" sz="1200" dirty="0">
+                <a:cs typeface="Courier New" panose="02070309020205020404" pitchFamily="49" charset="0"/>
+              </a:rPr>
+              <a:t> </a:t>
+            </a:r>
+            <a:r>
+              <a:rPr lang="it-IT" sz="1200" dirty="0" err="1">
+                <a:cs typeface="Courier New" panose="02070309020205020404" pitchFamily="49" charset="0"/>
+              </a:rPr>
+              <a:t>all</a:t>
+            </a:r>
+            <a:r>
+              <a:rPr lang="it-IT" sz="1200" dirty="0">
+                <a:cs typeface="Courier New" panose="02070309020205020404" pitchFamily="49" charset="0"/>
+              </a:rPr>
+              <a:t> 4 </a:t>
+            </a:r>
+            <a:r>
+              <a:rPr lang="it-IT" sz="1200" dirty="0" err="1">
+                <a:cs typeface="Courier New" panose="02070309020205020404" pitchFamily="49" charset="0"/>
+              </a:rPr>
+              <a:t>moves</a:t>
+            </a:r>
+            <a:r>
+              <a:rPr lang="it-IT" sz="1200" dirty="0">
+                <a:cs typeface="Courier New" panose="02070309020205020404" pitchFamily="49" charset="0"/>
+              </a:rPr>
+              <a:t> (</a:t>
+            </a:r>
+            <a:r>
+              <a:rPr lang="it-IT" sz="1200" dirty="0" err="1">
+                <a:latin typeface="Courier New" panose="02070309020205020404" pitchFamily="49" charset="0"/>
+                <a:cs typeface="Courier New" panose="02070309020205020404" pitchFamily="49" charset="0"/>
+              </a:rPr>
+              <a:t>reach</a:t>
+            </a:r>
+            <a:r>
+              <a:rPr lang="it-IT" sz="1200" dirty="0">
+                <a:latin typeface="Courier New" panose="02070309020205020404" pitchFamily="49" charset="0"/>
+                <a:cs typeface="Courier New" panose="02070309020205020404" pitchFamily="49" charset="0"/>
+              </a:rPr>
+              <a:t>((3,1),(4,5))</a:t>
+            </a:r>
+            <a:r>
+              <a:rPr lang="it-IT" sz="1200" dirty="0">
+                <a:cs typeface="Courier New" panose="02070309020205020404" pitchFamily="49" charset="0"/>
+              </a:rPr>
+              <a:t>)</a:t>
+            </a:r>
+          </a:p>
+          <a:p>
+            <a:r>
+              <a:rPr lang="en-US" sz="1600" b="1" dirty="0">
+                <a:cs typeface="Courier New" panose="02070309020205020404" pitchFamily="49" charset="0"/>
+              </a:rPr>
+              <a:t>Negative examples:</a:t>
+            </a:r>
+          </a:p>
+          <a:p>
+            <a:pPr lvl="1"/>
+            <a:r>
+              <a:rPr lang="it-IT" sz="1400" dirty="0">
+                <a:cs typeface="Courier New" panose="02070309020205020404" pitchFamily="49" charset="0"/>
+              </a:rPr>
+              <a:t>4 </a:t>
+            </a:r>
+            <a:r>
+              <a:rPr lang="it-IT" sz="1400" dirty="0" err="1">
+                <a:cs typeface="Courier New" panose="02070309020205020404" pitchFamily="49" charset="0"/>
+              </a:rPr>
+              <a:t>examples</a:t>
+            </a:r>
+            <a:r>
+              <a:rPr lang="it-IT" sz="1400" dirty="0">
+                <a:cs typeface="Courier New" panose="02070309020205020404" pitchFamily="49" charset="0"/>
+              </a:rPr>
+              <a:t> of single steps </a:t>
+            </a:r>
+            <a:r>
+              <a:rPr lang="it-IT" sz="1400" dirty="0" err="1">
+                <a:cs typeface="Courier New" panose="02070309020205020404" pitchFamily="49" charset="0"/>
+              </a:rPr>
+              <a:t>going</a:t>
+            </a:r>
+            <a:r>
+              <a:rPr lang="it-IT" sz="1400" dirty="0">
+                <a:cs typeface="Courier New" panose="02070309020205020404" pitchFamily="49" charset="0"/>
+              </a:rPr>
+              <a:t> out of bounds.</a:t>
+            </a:r>
+          </a:p>
+          <a:p>
+            <a:pPr lvl="1"/>
+            <a:r>
+              <a:rPr lang="it-IT" sz="1400" dirty="0">
+                <a:cs typeface="Courier New" panose="02070309020205020404" pitchFamily="49" charset="0"/>
+              </a:rPr>
+              <a:t>4 </a:t>
+            </a:r>
+            <a:r>
+              <a:rPr lang="it-IT" sz="1400" dirty="0" err="1">
+                <a:cs typeface="Courier New" panose="02070309020205020404" pitchFamily="49" charset="0"/>
+              </a:rPr>
+              <a:t>examples</a:t>
+            </a:r>
+            <a:r>
+              <a:rPr lang="it-IT" sz="1400" dirty="0">
+                <a:cs typeface="Courier New" panose="02070309020205020404" pitchFamily="49" charset="0"/>
+              </a:rPr>
+              <a:t> of single steps </a:t>
+            </a:r>
+            <a:r>
+              <a:rPr lang="it-IT" sz="1400" dirty="0" err="1">
+                <a:cs typeface="Courier New" panose="02070309020205020404" pitchFamily="49" charset="0"/>
+              </a:rPr>
+              <a:t>going</a:t>
+            </a:r>
+            <a:r>
+              <a:rPr lang="it-IT" sz="1400" dirty="0">
+                <a:cs typeface="Courier New" panose="02070309020205020404" pitchFamily="49" charset="0"/>
+              </a:rPr>
+              <a:t> </a:t>
+            </a:r>
+            <a:r>
+              <a:rPr lang="it-IT" sz="1400" dirty="0" err="1">
+                <a:cs typeface="Courier New" panose="02070309020205020404" pitchFamily="49" charset="0"/>
+              </a:rPr>
+              <a:t>into</a:t>
+            </a:r>
+            <a:r>
+              <a:rPr lang="it-IT" sz="1400" dirty="0">
+                <a:cs typeface="Courier New" panose="02070309020205020404" pitchFamily="49" charset="0"/>
+              </a:rPr>
+              <a:t> </a:t>
+            </a:r>
+            <a:r>
+              <a:rPr lang="it-IT" sz="1400" dirty="0" err="1">
+                <a:cs typeface="Courier New" panose="02070309020205020404" pitchFamily="49" charset="0"/>
+              </a:rPr>
+              <a:t>obstacles</a:t>
+            </a:r>
+            <a:r>
+              <a:rPr lang="it-IT" sz="1400" dirty="0">
+                <a:cs typeface="Courier New" panose="02070309020205020404" pitchFamily="49" charset="0"/>
+              </a:rPr>
+              <a:t>.</a:t>
+            </a:r>
+          </a:p>
+          <a:p>
+            <a:endParaRPr lang="it-IT" dirty="0"/>
+          </a:p>
+        </p:txBody>
+      </p:sp>
+    </p:spTree>
+    <p:extLst>
+      <p:ext uri="{BB962C8B-B14F-4D97-AF65-F5344CB8AC3E}">
+        <p14:creationId xmlns:p14="http://schemas.microsoft.com/office/powerpoint/2010/main" val="2777569243"/>
+      </p:ext>
+    </p:extLst>
+  </p:cSld>
+  <p:clrMapOvr>
+    <a:masterClrMapping/>
+  </p:clrMapOvr>
+</p:sld>
+</file>
+
+<file path=ppt/slides/slide12.xml><?xml version="1.0" encoding="utf-8"?>
 <p:sld xmlns:a="http://schemas.openxmlformats.org/drawingml/2006/main" xmlns:r="http://schemas.openxmlformats.org/officeDocument/2006/relationships" xmlns:p="http://schemas.openxmlformats.org/presentationml/2006/main">
   <p:cSld>
     <p:bg>
@@ -8348,7 +9830,7 @@
           <p:nvPr/>
         </p:nvPicPr>
         <p:blipFill rotWithShape="1">
-          <a:blip r:embed="rId2"/>
+          <a:blip r:embed="rId3"/>
           <a:srcRect t="9021"/>
           <a:stretch/>
         </p:blipFill>
@@ -8485,9 +9967,14 @@
           <a:lstStyle/>
           <a:p>
             <a:r>
-              <a:rPr lang="it-IT"/>
-              <a:t>Interesting points</a:t>
-            </a:r>
+              <a:rPr lang="it-IT" dirty="0"/>
+              <a:t>The </a:t>
+            </a:r>
+            <a:r>
+              <a:rPr lang="it-IT" dirty="0" err="1"/>
+              <a:t>result</a:t>
+            </a:r>
+            <a:endParaRPr lang="it-IT" dirty="0"/>
           </a:p>
         </p:txBody>
       </p:sp>
@@ -8519,147 +10006,226 @@
           </a:bodyPr>
           <a:lstStyle/>
           <a:p>
-            <a:r>
-              <a:rPr lang="it-IT" dirty="0" err="1"/>
-              <a:t>Perhaps</a:t>
-            </a:r>
-            <a:r>
-              <a:rPr lang="it-IT" dirty="0"/>
-              <a:t> </a:t>
-            </a:r>
-            <a:r>
-              <a:rPr lang="it-IT" dirty="0" err="1"/>
-              <a:t>we</a:t>
-            </a:r>
-            <a:r>
-              <a:rPr lang="it-IT" dirty="0"/>
-              <a:t> are </a:t>
-            </a:r>
-            <a:r>
-              <a:rPr lang="it-IT" dirty="0" err="1"/>
-              <a:t>not</a:t>
-            </a:r>
-            <a:r>
-              <a:rPr lang="it-IT" dirty="0"/>
-              <a:t> </a:t>
-            </a:r>
-            <a:r>
-              <a:rPr lang="it-IT" dirty="0" err="1"/>
-              <a:t>using</a:t>
-            </a:r>
-            <a:r>
-              <a:rPr lang="it-IT" dirty="0"/>
-              <a:t> </a:t>
-            </a:r>
-            <a:r>
-              <a:rPr lang="it-IT" dirty="0" err="1"/>
-              <a:t>enough</a:t>
-            </a:r>
-            <a:r>
-              <a:rPr lang="it-IT" dirty="0"/>
-              <a:t> </a:t>
-            </a:r>
-            <a:r>
-              <a:rPr lang="it-IT" dirty="0" err="1"/>
-              <a:t>examples</a:t>
-            </a:r>
-            <a:r>
-              <a:rPr lang="it-IT" dirty="0"/>
-              <a:t>.</a:t>
-            </a:r>
-          </a:p>
-          <a:p>
-            <a:r>
-              <a:rPr lang="it-IT" dirty="0" err="1"/>
-              <a:t>Actually</a:t>
-            </a:r>
-            <a:r>
-              <a:rPr lang="it-IT" dirty="0"/>
-              <a:t>, </a:t>
-            </a:r>
-            <a:r>
-              <a:rPr lang="it-IT" dirty="0" err="1"/>
-              <a:t>we</a:t>
-            </a:r>
-            <a:r>
-              <a:rPr lang="it-IT" dirty="0"/>
-              <a:t> are </a:t>
-            </a:r>
-            <a:r>
-              <a:rPr lang="it-IT" dirty="0" err="1"/>
-              <a:t>using</a:t>
-            </a:r>
-            <a:r>
-              <a:rPr lang="it-IT" dirty="0"/>
-              <a:t> </a:t>
-            </a:r>
-            <a:r>
-              <a:rPr lang="it-IT" dirty="0" err="1"/>
-              <a:t>too</a:t>
-            </a:r>
-            <a:r>
-              <a:rPr lang="it-IT" dirty="0"/>
-              <a:t> </a:t>
-            </a:r>
-            <a:r>
-              <a:rPr lang="it-IT" dirty="0" err="1"/>
-              <a:t>many</a:t>
-            </a:r>
-            <a:r>
-              <a:rPr lang="it-IT" dirty="0"/>
-              <a:t>!</a:t>
-            </a:r>
-          </a:p>
-          <a:p>
-            <a:r>
-              <a:rPr lang="it-IT" dirty="0" err="1"/>
-              <a:t>Only</a:t>
-            </a:r>
-            <a:r>
-              <a:rPr lang="it-IT" dirty="0"/>
-              <a:t> </a:t>
-            </a:r>
-            <a:r>
-              <a:rPr lang="it-IT" dirty="0" err="1"/>
-              <a:t>using</a:t>
-            </a:r>
-            <a:r>
-              <a:rPr lang="it-IT" dirty="0"/>
-              <a:t> </a:t>
-            </a:r>
+            <a:pPr marL="274320" lvl="1" indent="0">
+              <a:buNone/>
+            </a:pPr>
             <a:r>
               <a:rPr lang="en-US" dirty="0">
                 <a:latin typeface="Courier New" panose="02070309020205020404" pitchFamily="49" charset="0"/>
                 <a:cs typeface="Courier New" panose="02070309020205020404" pitchFamily="49" charset="0"/>
               </a:rPr>
-              <a:t>reach((1,1), (2,5)). </a:t>
+              <a:t>reach(A,B):-</a:t>
+            </a:r>
+            <a:r>
+              <a:rPr lang="en-US" dirty="0" err="1">
+                <a:latin typeface="Courier New" panose="02070309020205020404" pitchFamily="49" charset="0"/>
+                <a:cs typeface="Courier New" panose="02070309020205020404" pitchFamily="49" charset="0"/>
+              </a:rPr>
+              <a:t>legal_position</a:t>
             </a:r>
             <a:r>
               <a:rPr lang="en-US" dirty="0">
-                <a:cs typeface="Courier New" panose="02070309020205020404" pitchFamily="49" charset="0"/>
-              </a:rPr>
-              <a:t>leads to the same result!</a:t>
-            </a:r>
-          </a:p>
-          <a:p>
+                <a:latin typeface="Courier New" panose="02070309020205020404" pitchFamily="49" charset="0"/>
+                <a:cs typeface="Courier New" panose="02070309020205020404" pitchFamily="49" charset="0"/>
+              </a:rPr>
+              <a:t>(B),reach_1(A,B).</a:t>
+            </a:r>
+          </a:p>
+          <a:p>
+            <a:pPr marL="274320" lvl="1" indent="0">
+              <a:buNone/>
+            </a:pPr>
             <a:r>
               <a:rPr lang="en-US" dirty="0">
-                <a:cs typeface="Courier New" panose="02070309020205020404" pitchFamily="49" charset="0"/>
-              </a:rPr>
-              <a:t>This is possible thanks to how metarules reduce the domain, hence our search space.</a:t>
-            </a:r>
-          </a:p>
-          <a:p>
-            <a:endParaRPr lang="en-US" dirty="0">
+                <a:latin typeface="Courier New" panose="02070309020205020404" pitchFamily="49" charset="0"/>
+                <a:cs typeface="Courier New" panose="02070309020205020404" pitchFamily="49" charset="0"/>
+              </a:rPr>
+              <a:t>reach_1(A,B):-</a:t>
+            </a:r>
+            <a:r>
+              <a:rPr lang="en-US" dirty="0" err="1">
+                <a:latin typeface="Courier New" panose="02070309020205020404" pitchFamily="49" charset="0"/>
+                <a:cs typeface="Courier New" panose="02070309020205020404" pitchFamily="49" charset="0"/>
+              </a:rPr>
+              <a:t>inc_x</a:t>
+            </a:r>
+            <a:r>
+              <a:rPr lang="en-US" dirty="0">
+                <a:latin typeface="Courier New" panose="02070309020205020404" pitchFamily="49" charset="0"/>
+                <a:cs typeface="Courier New" panose="02070309020205020404" pitchFamily="49" charset="0"/>
+              </a:rPr>
+              <a:t>(A,B).</a:t>
+            </a:r>
+          </a:p>
+          <a:p>
+            <a:pPr marL="274320" lvl="1" indent="0">
+              <a:buNone/>
+            </a:pPr>
+            <a:r>
+              <a:rPr lang="en-US" dirty="0">
+                <a:latin typeface="Courier New" panose="02070309020205020404" pitchFamily="49" charset="0"/>
+                <a:cs typeface="Courier New" panose="02070309020205020404" pitchFamily="49" charset="0"/>
+              </a:rPr>
+              <a:t>reach_1(A,B):-</a:t>
+            </a:r>
+            <a:r>
+              <a:rPr lang="en-US" dirty="0" err="1">
+                <a:latin typeface="Courier New" panose="02070309020205020404" pitchFamily="49" charset="0"/>
+                <a:cs typeface="Courier New" panose="02070309020205020404" pitchFamily="49" charset="0"/>
+              </a:rPr>
+              <a:t>dec_y</a:t>
+            </a:r>
+            <a:r>
+              <a:rPr lang="en-US" dirty="0">
+                <a:latin typeface="Courier New" panose="02070309020205020404" pitchFamily="49" charset="0"/>
+                <a:cs typeface="Courier New" panose="02070309020205020404" pitchFamily="49" charset="0"/>
+              </a:rPr>
+              <a:t>(A,B).</a:t>
+            </a:r>
+          </a:p>
+          <a:p>
+            <a:pPr marL="274320" lvl="1" indent="0">
+              <a:buNone/>
+            </a:pPr>
+            <a:r>
+              <a:rPr lang="en-US" dirty="0">
+                <a:latin typeface="Courier New" panose="02070309020205020404" pitchFamily="49" charset="0"/>
+                <a:cs typeface="Courier New" panose="02070309020205020404" pitchFamily="49" charset="0"/>
+              </a:rPr>
+              <a:t>reach_1(A,B):-</a:t>
+            </a:r>
+            <a:r>
+              <a:rPr lang="en-US" dirty="0" err="1">
+                <a:latin typeface="Courier New" panose="02070309020205020404" pitchFamily="49" charset="0"/>
+                <a:cs typeface="Courier New" panose="02070309020205020404" pitchFamily="49" charset="0"/>
+              </a:rPr>
+              <a:t>inc_y</a:t>
+            </a:r>
+            <a:r>
+              <a:rPr lang="en-US" dirty="0">
+                <a:latin typeface="Courier New" panose="02070309020205020404" pitchFamily="49" charset="0"/>
+                <a:cs typeface="Courier New" panose="02070309020205020404" pitchFamily="49" charset="0"/>
+              </a:rPr>
+              <a:t>(A,B).</a:t>
+            </a:r>
+          </a:p>
+          <a:p>
+            <a:pPr marL="274320" lvl="1" indent="0">
+              <a:buNone/>
+            </a:pPr>
+            <a:r>
+              <a:rPr lang="en-US" dirty="0">
+                <a:latin typeface="Courier New" panose="02070309020205020404" pitchFamily="49" charset="0"/>
+                <a:cs typeface="Courier New" panose="02070309020205020404" pitchFamily="49" charset="0"/>
+              </a:rPr>
+              <a:t>reach_1(A,B):-</a:t>
+            </a:r>
+            <a:r>
+              <a:rPr lang="en-US" dirty="0" err="1">
+                <a:latin typeface="Courier New" panose="02070309020205020404" pitchFamily="49" charset="0"/>
+                <a:cs typeface="Courier New" panose="02070309020205020404" pitchFamily="49" charset="0"/>
+              </a:rPr>
+              <a:t>dec_x</a:t>
+            </a:r>
+            <a:r>
+              <a:rPr lang="en-US" dirty="0">
+                <a:latin typeface="Courier New" panose="02070309020205020404" pitchFamily="49" charset="0"/>
+                <a:cs typeface="Courier New" panose="02070309020205020404" pitchFamily="49" charset="0"/>
+              </a:rPr>
+              <a:t>(A,B).</a:t>
+            </a:r>
+          </a:p>
+          <a:p>
+            <a:pPr marL="274320" lvl="1" indent="0">
+              <a:buNone/>
+            </a:pPr>
+            <a:r>
+              <a:rPr lang="en-US" dirty="0">
+                <a:latin typeface="Courier New" panose="02070309020205020404" pitchFamily="49" charset="0"/>
+                <a:cs typeface="Courier New" panose="02070309020205020404" pitchFamily="49" charset="0"/>
+              </a:rPr>
+              <a:t>reach(A,B):-</a:t>
+            </a:r>
+            <a:r>
+              <a:rPr lang="en-US" dirty="0" err="1">
+                <a:latin typeface="Courier New" panose="02070309020205020404" pitchFamily="49" charset="0"/>
+                <a:cs typeface="Courier New" panose="02070309020205020404" pitchFamily="49" charset="0"/>
+              </a:rPr>
+              <a:t>legal_position</a:t>
+            </a:r>
+            <a:r>
+              <a:rPr lang="en-US" dirty="0">
+                <a:latin typeface="Courier New" panose="02070309020205020404" pitchFamily="49" charset="0"/>
+                <a:cs typeface="Courier New" panose="02070309020205020404" pitchFamily="49" charset="0"/>
+              </a:rPr>
+              <a:t>(B),reach_1(A,C),</a:t>
+            </a:r>
+            <a:r>
+              <a:rPr lang="en-US" dirty="0" err="1">
+                <a:latin typeface="Courier New" panose="02070309020205020404" pitchFamily="49" charset="0"/>
+                <a:cs typeface="Courier New" panose="02070309020205020404" pitchFamily="49" charset="0"/>
+              </a:rPr>
+              <a:t>legal_position</a:t>
+            </a:r>
+            <a:r>
+              <a:rPr lang="en-US" dirty="0">
+                <a:latin typeface="Courier New" panose="02070309020205020404" pitchFamily="49" charset="0"/>
+                <a:cs typeface="Courier New" panose="02070309020205020404" pitchFamily="49" charset="0"/>
+              </a:rPr>
+              <a:t>(C),reach(C,B).</a:t>
+            </a:r>
+            <a:endParaRPr lang="it-IT" dirty="0">
               <a:latin typeface="Courier New" panose="02070309020205020404" pitchFamily="49" charset="0"/>
               <a:cs typeface="Courier New" panose="02070309020205020404" pitchFamily="49" charset="0"/>
             </a:endParaRPr>
           </a:p>
           <a:p>
-            <a:endParaRPr lang="it-IT" dirty="0"/>
-          </a:p>
-          <a:p>
-            <a:endParaRPr lang="it-IT" dirty="0"/>
+            <a:r>
+              <a:rPr lang="it-IT" dirty="0" err="1"/>
+              <a:t>Through</a:t>
+            </a:r>
+            <a:r>
+              <a:rPr lang="it-IT" dirty="0"/>
+              <a:t> </a:t>
+            </a:r>
+            <a:r>
+              <a:rPr lang="it-IT" b="1" dirty="0"/>
+              <a:t>predicate </a:t>
+            </a:r>
+            <a:r>
+              <a:rPr lang="it-IT" b="1" dirty="0" err="1"/>
+              <a:t>invention</a:t>
+            </a:r>
+            <a:r>
+              <a:rPr lang="it-IT" dirty="0"/>
+              <a:t> </a:t>
+            </a:r>
+            <a:r>
+              <a:rPr lang="it-IT" dirty="0" err="1"/>
+              <a:t>we</a:t>
+            </a:r>
+            <a:r>
+              <a:rPr lang="it-IT" dirty="0"/>
+              <a:t> are learning </a:t>
+            </a:r>
+            <a:r>
+              <a:rPr lang="it-IT" dirty="0" err="1">
+                <a:latin typeface="Courier New" panose="02070309020205020404" pitchFamily="49" charset="0"/>
+                <a:cs typeface="Courier New" panose="02070309020205020404" pitchFamily="49" charset="0"/>
+              </a:rPr>
+              <a:t>move</a:t>
+            </a:r>
+            <a:r>
+              <a:rPr lang="it-IT">
+                <a:latin typeface="Courier New" panose="02070309020205020404" pitchFamily="49" charset="0"/>
+                <a:cs typeface="Courier New" panose="02070309020205020404" pitchFamily="49" charset="0"/>
+              </a:rPr>
+              <a:t>/2.</a:t>
+            </a:r>
+            <a:endParaRPr lang="it-IT" dirty="0">
+              <a:latin typeface="Courier New" panose="02070309020205020404" pitchFamily="49" charset="0"/>
+              <a:cs typeface="Courier New" panose="02070309020205020404" pitchFamily="49" charset="0"/>
+            </a:endParaRPr>
           </a:p>
         </p:txBody>
       </p:sp>
@@ -8676,7 +10242,7 @@
 </p:sld>
 </file>
 
-<file path=ppt/slides/slide12.xml><?xml version="1.0" encoding="utf-8"?>
+<file path=ppt/slides/slide13.xml><?xml version="1.0" encoding="utf-8"?>
 <p:sld xmlns:a="http://schemas.openxmlformats.org/drawingml/2006/main" xmlns:r="http://schemas.openxmlformats.org/officeDocument/2006/relationships" xmlns:p="http://schemas.openxmlformats.org/presentationml/2006/main">
   <p:cSld>
     <p:bg>
@@ -8853,11 +10419,11 @@
           <a:lstStyle/>
           <a:p>
             <a:r>
-              <a:rPr lang="it-IT" err="1"/>
+              <a:rPr lang="it-IT" dirty="0" err="1"/>
               <a:t>Other</a:t>
             </a:r>
             <a:r>
-              <a:rPr lang="it-IT"/>
+              <a:rPr lang="it-IT" dirty="0"/>
               <a:t> tasks</a:t>
             </a:r>
           </a:p>
@@ -8892,86 +10458,86 @@
           <a:lstStyle/>
           <a:p>
             <a:r>
-              <a:rPr lang="it-IT">
+              <a:rPr lang="it-IT" dirty="0">
                 <a:latin typeface="Courier New" panose="02070309020205020404" pitchFamily="49" charset="0"/>
                 <a:cs typeface="Courier New" panose="02070309020205020404" pitchFamily="49" charset="0"/>
               </a:rPr>
               <a:t>learning_to_travel_memory.pl: </a:t>
             </a:r>
             <a:r>
-              <a:rPr lang="it-IT" err="1">
+              <a:rPr lang="it-IT" dirty="0" err="1">
                 <a:cs typeface="Courier New" panose="02070309020205020404" pitchFamily="49" charset="0"/>
               </a:rPr>
               <a:t>Same</a:t>
             </a:r>
             <a:r>
-              <a:rPr lang="it-IT">
+              <a:rPr lang="it-IT" dirty="0">
                 <a:cs typeface="Courier New" panose="02070309020205020404" pitchFamily="49" charset="0"/>
               </a:rPr>
               <a:t> </a:t>
             </a:r>
             <a:r>
-              <a:rPr lang="it-IT" err="1">
+              <a:rPr lang="it-IT" dirty="0" err="1">
                 <a:cs typeface="Courier New" panose="02070309020205020404" pitchFamily="49" charset="0"/>
               </a:rPr>
               <a:t>as</a:t>
             </a:r>
             <a:r>
-              <a:rPr lang="it-IT">
+              <a:rPr lang="it-IT" dirty="0">
                 <a:cs typeface="Courier New" panose="02070309020205020404" pitchFamily="49" charset="0"/>
               </a:rPr>
               <a:t> </a:t>
             </a:r>
             <a:r>
-              <a:rPr lang="it-IT" i="1">
+              <a:rPr lang="it-IT" i="1" dirty="0">
                 <a:cs typeface="Courier New" panose="02070309020205020404" pitchFamily="49" charset="0"/>
               </a:rPr>
               <a:t>«learning to travel» </a:t>
             </a:r>
             <a:r>
-              <a:rPr lang="it-IT" err="1">
+              <a:rPr lang="it-IT" dirty="0" err="1">
                 <a:cs typeface="Courier New" panose="02070309020205020404" pitchFamily="49" charset="0"/>
               </a:rPr>
               <a:t>but</a:t>
             </a:r>
             <a:r>
-              <a:rPr lang="it-IT">
+              <a:rPr lang="it-IT" dirty="0">
                 <a:cs typeface="Courier New" panose="02070309020205020404" pitchFamily="49" charset="0"/>
               </a:rPr>
               <a:t> </a:t>
             </a:r>
             <a:r>
-              <a:rPr lang="it-IT" err="1">
+              <a:rPr lang="it-IT" dirty="0" err="1">
                 <a:cs typeface="Courier New" panose="02070309020205020404" pitchFamily="49" charset="0"/>
               </a:rPr>
               <a:t>also</a:t>
             </a:r>
             <a:r>
-              <a:rPr lang="it-IT">
+              <a:rPr lang="it-IT" dirty="0">
                 <a:cs typeface="Courier New" panose="02070309020205020404" pitchFamily="49" charset="0"/>
               </a:rPr>
               <a:t> </a:t>
             </a:r>
             <a:r>
-              <a:rPr lang="it-IT" err="1">
+              <a:rPr lang="it-IT" dirty="0" err="1">
                 <a:cs typeface="Courier New" panose="02070309020205020404" pitchFamily="49" charset="0"/>
               </a:rPr>
               <a:t>keeps</a:t>
             </a:r>
             <a:r>
-              <a:rPr lang="it-IT">
+              <a:rPr lang="it-IT" dirty="0">
                 <a:cs typeface="Courier New" panose="02070309020205020404" pitchFamily="49" charset="0"/>
               </a:rPr>
               <a:t> track of the </a:t>
             </a:r>
             <a:r>
-              <a:rPr lang="it-IT" err="1">
+              <a:rPr lang="it-IT" dirty="0" err="1">
                 <a:cs typeface="Courier New" panose="02070309020205020404" pitchFamily="49" charset="0"/>
               </a:rPr>
               <a:t>path</a:t>
             </a:r>
             <a:r>
-              <a:rPr lang="it-IT">
+              <a:rPr lang="it-IT" dirty="0">
                 <a:cs typeface="Courier New" panose="02070309020205020404" pitchFamily="49" charset="0"/>
               </a:rPr>
               <a:t> in a list.</a:t>
@@ -8979,346 +10545,151 @@
           </a:p>
           <a:p>
             <a:r>
-              <a:rPr lang="it-IT">
+              <a:rPr lang="it-IT" dirty="0">
                 <a:latin typeface="Courier New" panose="02070309020205020404" pitchFamily="49" charset="0"/>
                 <a:cs typeface="Courier New" panose="02070309020205020404" pitchFamily="49" charset="0"/>
               </a:rPr>
               <a:t>learn_to_win.pl: </a:t>
             </a:r>
             <a:r>
-              <a:rPr lang="it-IT">
+              <a:rPr lang="it-IT" dirty="0">
                 <a:cs typeface="Courier New" panose="02070309020205020404" pitchFamily="49" charset="0"/>
               </a:rPr>
               <a:t>Solving the </a:t>
             </a:r>
             <a:r>
-              <a:rPr lang="it-IT" err="1">
+              <a:rPr lang="it-IT" dirty="0" err="1">
                 <a:cs typeface="Courier New" panose="02070309020205020404" pitchFamily="49" charset="0"/>
               </a:rPr>
               <a:t>Maze</a:t>
             </a:r>
             <a:r>
-              <a:rPr lang="it-IT">
+              <a:rPr lang="it-IT" dirty="0">
                 <a:cs typeface="Courier New" panose="02070309020205020404" pitchFamily="49" charset="0"/>
               </a:rPr>
               <a:t> </a:t>
             </a:r>
             <a:r>
-              <a:rPr lang="it-IT" err="1">
+              <a:rPr lang="it-IT" dirty="0" err="1">
                 <a:cs typeface="Courier New" panose="02070309020205020404" pitchFamily="49" charset="0"/>
               </a:rPr>
               <a:t>problem</a:t>
             </a:r>
             <a:r>
-              <a:rPr lang="it-IT">
+              <a:rPr lang="it-IT" dirty="0">
                 <a:cs typeface="Courier New" panose="02070309020205020404" pitchFamily="49" charset="0"/>
               </a:rPr>
               <a:t> </a:t>
             </a:r>
             <a:r>
-              <a:rPr lang="it-IT" err="1">
+              <a:rPr lang="it-IT" dirty="0" err="1">
                 <a:cs typeface="Courier New" panose="02070309020205020404" pitchFamily="49" charset="0"/>
               </a:rPr>
               <a:t>directly</a:t>
             </a:r>
             <a:r>
-              <a:rPr lang="it-IT">
+              <a:rPr lang="it-IT" dirty="0">
                 <a:cs typeface="Courier New" panose="02070309020205020404" pitchFamily="49" charset="0"/>
               </a:rPr>
               <a:t> </a:t>
             </a:r>
             <a:r>
-              <a:rPr lang="it-IT" err="1">
+              <a:rPr lang="it-IT" dirty="0" err="1">
                 <a:cs typeface="Courier New" panose="02070309020205020404" pitchFamily="49" charset="0"/>
               </a:rPr>
               <a:t>through</a:t>
             </a:r>
             <a:r>
-              <a:rPr lang="it-IT">
+              <a:rPr lang="it-IT" dirty="0">
                 <a:cs typeface="Courier New" panose="02070309020205020404" pitchFamily="49" charset="0"/>
               </a:rPr>
               <a:t> ILP. </a:t>
             </a:r>
             <a:r>
-              <a:rPr lang="it-IT" err="1">
+              <a:rPr lang="it-IT" dirty="0" err="1">
                 <a:cs typeface="Courier New" panose="02070309020205020404" pitchFamily="49" charset="0"/>
               </a:rPr>
               <a:t>Gives</a:t>
             </a:r>
             <a:r>
-              <a:rPr lang="it-IT">
+              <a:rPr lang="it-IT" dirty="0">
                 <a:cs typeface="Courier New" panose="02070309020205020404" pitchFamily="49" charset="0"/>
               </a:rPr>
               <a:t> a </a:t>
             </a:r>
             <a:r>
-              <a:rPr lang="it-IT" i="1">
+              <a:rPr lang="it-IT" i="1" dirty="0">
                 <a:cs typeface="Courier New" panose="02070309020205020404" pitchFamily="49" charset="0"/>
               </a:rPr>
               <a:t>«</a:t>
             </a:r>
             <a:r>
-              <a:rPr lang="it-IT" i="1" err="1">
+              <a:rPr lang="it-IT" i="1" dirty="0" err="1">
                 <a:cs typeface="Courier New" panose="02070309020205020404" pitchFamily="49" charset="0"/>
               </a:rPr>
               <a:t>sequence</a:t>
             </a:r>
             <a:r>
-              <a:rPr lang="it-IT" i="1">
+              <a:rPr lang="it-IT" i="1" dirty="0">
                 <a:cs typeface="Courier New" panose="02070309020205020404" pitchFamily="49" charset="0"/>
               </a:rPr>
               <a:t> of </a:t>
             </a:r>
             <a:r>
-              <a:rPr lang="it-IT" i="1" err="1">
+              <a:rPr lang="it-IT" i="1" dirty="0" err="1">
                 <a:cs typeface="Courier New" panose="02070309020205020404" pitchFamily="49" charset="0"/>
               </a:rPr>
               <a:t>predicates</a:t>
             </a:r>
             <a:r>
-              <a:rPr lang="it-IT" i="1">
+              <a:rPr lang="it-IT" i="1" dirty="0">
                 <a:cs typeface="Courier New" panose="02070309020205020404" pitchFamily="49" charset="0"/>
               </a:rPr>
               <a:t>» </a:t>
             </a:r>
             <a:r>
-              <a:rPr lang="it-IT">
+              <a:rPr lang="it-IT" dirty="0">
                 <a:cs typeface="Courier New" panose="02070309020205020404" pitchFamily="49" charset="0"/>
               </a:rPr>
               <a:t>to </a:t>
             </a:r>
             <a:r>
-              <a:rPr lang="it-IT" err="1">
+              <a:rPr lang="it-IT" dirty="0" err="1">
                 <a:cs typeface="Courier New" panose="02070309020205020404" pitchFamily="49" charset="0"/>
               </a:rPr>
               <a:t>reach</a:t>
             </a:r>
             <a:r>
-              <a:rPr lang="it-IT">
+              <a:rPr lang="it-IT" dirty="0">
                 <a:cs typeface="Courier New" panose="02070309020205020404" pitchFamily="49" charset="0"/>
               </a:rPr>
               <a:t> the goal </a:t>
             </a:r>
             <a:r>
-              <a:rPr lang="it-IT" err="1">
+              <a:rPr lang="it-IT" dirty="0" err="1">
                 <a:cs typeface="Courier New" panose="02070309020205020404" pitchFamily="49" charset="0"/>
               </a:rPr>
               <a:t>cell</a:t>
             </a:r>
             <a:r>
-              <a:rPr lang="it-IT">
+              <a:rPr lang="it-IT" dirty="0">
                 <a:cs typeface="Courier New" panose="02070309020205020404" pitchFamily="49" charset="0"/>
               </a:rPr>
               <a:t> from the start </a:t>
             </a:r>
             <a:r>
-              <a:rPr lang="it-IT" err="1">
+              <a:rPr lang="it-IT" dirty="0" err="1">
                 <a:cs typeface="Courier New" panose="02070309020205020404" pitchFamily="49" charset="0"/>
               </a:rPr>
               <a:t>cell</a:t>
             </a:r>
             <a:r>
-              <a:rPr lang="it-IT">
+              <a:rPr lang="it-IT" dirty="0">
                 <a:cs typeface="Courier New" panose="02070309020205020404" pitchFamily="49" charset="0"/>
               </a:rPr>
               <a:t>.</a:t>
             </a:r>
-            <a:endParaRPr lang="it-IT">
-              <a:latin typeface="Courier New" panose="02070309020205020404" pitchFamily="49" charset="0"/>
-              <a:cs typeface="Courier New" panose="02070309020205020404" pitchFamily="49" charset="0"/>
-            </a:endParaRPr>
-          </a:p>
-          <a:p>
-            <a:r>
-              <a:rPr lang="it-IT">
-                <a:latin typeface="Courier New" panose="02070309020205020404" pitchFamily="49" charset="0"/>
-                <a:cs typeface="Courier New" panose="02070309020205020404" pitchFamily="49" charset="0"/>
-              </a:rPr>
-              <a:t>reach_from_scratch.pl: </a:t>
-            </a:r>
-            <a:r>
-              <a:rPr lang="it-IT" err="1">
-                <a:cs typeface="Courier New" panose="02070309020205020404" pitchFamily="49" charset="0"/>
-              </a:rPr>
-              <a:t>Learns</a:t>
-            </a:r>
-            <a:r>
-              <a:rPr lang="it-IT">
-                <a:cs typeface="Courier New" panose="02070309020205020404" pitchFamily="49" charset="0"/>
-              </a:rPr>
-              <a:t> to </a:t>
-            </a:r>
-            <a:r>
-              <a:rPr lang="it-IT" err="1">
-                <a:cs typeface="Courier New" panose="02070309020205020404" pitchFamily="49" charset="0"/>
-              </a:rPr>
-              <a:t>move</a:t>
-            </a:r>
-            <a:r>
-              <a:rPr lang="it-IT">
-                <a:cs typeface="Courier New" panose="02070309020205020404" pitchFamily="49" charset="0"/>
-              </a:rPr>
-              <a:t> </a:t>
-            </a:r>
-            <a:r>
-              <a:rPr lang="it-IT" err="1">
-                <a:cs typeface="Courier New" panose="02070309020205020404" pitchFamily="49" charset="0"/>
-              </a:rPr>
-              <a:t>between</a:t>
-            </a:r>
-            <a:r>
-              <a:rPr lang="it-IT">
-                <a:cs typeface="Courier New" panose="02070309020205020404" pitchFamily="49" charset="0"/>
-              </a:rPr>
-              <a:t> </a:t>
-            </a:r>
-            <a:r>
-              <a:rPr lang="it-IT" err="1">
-                <a:cs typeface="Courier New" panose="02070309020205020404" pitchFamily="49" charset="0"/>
-              </a:rPr>
-              <a:t>distant</a:t>
-            </a:r>
-            <a:r>
-              <a:rPr lang="it-IT">
-                <a:cs typeface="Courier New" panose="02070309020205020404" pitchFamily="49" charset="0"/>
-              </a:rPr>
-              <a:t> </a:t>
-            </a:r>
-            <a:r>
-              <a:rPr lang="it-IT" err="1">
-                <a:cs typeface="Courier New" panose="02070309020205020404" pitchFamily="49" charset="0"/>
-              </a:rPr>
-              <a:t>cells</a:t>
-            </a:r>
-            <a:r>
-              <a:rPr lang="it-IT">
-                <a:cs typeface="Courier New" panose="02070309020205020404" pitchFamily="49" charset="0"/>
-              </a:rPr>
-              <a:t> </a:t>
-            </a:r>
-            <a:r>
-              <a:rPr lang="it-IT" err="1">
-                <a:cs typeface="Courier New" panose="02070309020205020404" pitchFamily="49" charset="0"/>
-              </a:rPr>
-              <a:t>but</a:t>
-            </a:r>
-            <a:r>
-              <a:rPr lang="it-IT">
-                <a:cs typeface="Courier New" panose="02070309020205020404" pitchFamily="49" charset="0"/>
-              </a:rPr>
-              <a:t> </a:t>
-            </a:r>
-            <a:r>
-              <a:rPr lang="it-IT" err="1">
-                <a:cs typeface="Courier New" panose="02070309020205020404" pitchFamily="49" charset="0"/>
-              </a:rPr>
-              <a:t>without</a:t>
-            </a:r>
-            <a:r>
-              <a:rPr lang="it-IT">
-                <a:cs typeface="Courier New" panose="02070309020205020404" pitchFamily="49" charset="0"/>
-              </a:rPr>
-              <a:t> </a:t>
-            </a:r>
-            <a:r>
-              <a:rPr lang="it-IT" err="1">
-                <a:cs typeface="Courier New" panose="02070309020205020404" pitchFamily="49" charset="0"/>
-              </a:rPr>
-              <a:t>knowing</a:t>
-            </a:r>
-            <a:r>
-              <a:rPr lang="it-IT">
-                <a:cs typeface="Courier New" panose="02070309020205020404" pitchFamily="49" charset="0"/>
-              </a:rPr>
-              <a:t> </a:t>
-            </a:r>
-            <a:r>
-              <a:rPr lang="it-IT" err="1">
-                <a:cs typeface="Courier New" panose="02070309020205020404" pitchFamily="49" charset="0"/>
-              </a:rPr>
-              <a:t>how</a:t>
-            </a:r>
-            <a:r>
-              <a:rPr lang="it-IT">
-                <a:cs typeface="Courier New" panose="02070309020205020404" pitchFamily="49" charset="0"/>
-              </a:rPr>
-              <a:t> to </a:t>
-            </a:r>
-            <a:r>
-              <a:rPr lang="it-IT" err="1">
-                <a:cs typeface="Courier New" panose="02070309020205020404" pitchFamily="49" charset="0"/>
-              </a:rPr>
-              <a:t>move</a:t>
-            </a:r>
-            <a:r>
-              <a:rPr lang="it-IT">
-                <a:cs typeface="Courier New" panose="02070309020205020404" pitchFamily="49" charset="0"/>
-              </a:rPr>
-              <a:t> </a:t>
-            </a:r>
-            <a:r>
-              <a:rPr lang="it-IT" err="1">
-                <a:cs typeface="Courier New" panose="02070309020205020404" pitchFamily="49" charset="0"/>
-              </a:rPr>
-              <a:t>between</a:t>
-            </a:r>
-            <a:r>
-              <a:rPr lang="it-IT">
-                <a:cs typeface="Courier New" panose="02070309020205020404" pitchFamily="49" charset="0"/>
-              </a:rPr>
-              <a:t> </a:t>
-            </a:r>
-            <a:r>
-              <a:rPr lang="it-IT" err="1">
-                <a:cs typeface="Courier New" panose="02070309020205020404" pitchFamily="49" charset="0"/>
-              </a:rPr>
-              <a:t>adjacent</a:t>
-            </a:r>
-            <a:r>
-              <a:rPr lang="it-IT">
-                <a:cs typeface="Courier New" panose="02070309020205020404" pitchFamily="49" charset="0"/>
-              </a:rPr>
-              <a:t>, </a:t>
-            </a:r>
-            <a:r>
-              <a:rPr lang="it-IT" err="1">
-                <a:cs typeface="Courier New" panose="02070309020205020404" pitchFamily="49" charset="0"/>
-              </a:rPr>
-              <a:t>legal</a:t>
-            </a:r>
-            <a:r>
-              <a:rPr lang="it-IT">
-                <a:cs typeface="Courier New" panose="02070309020205020404" pitchFamily="49" charset="0"/>
-              </a:rPr>
-              <a:t> </a:t>
-            </a:r>
-            <a:r>
-              <a:rPr lang="it-IT" err="1">
-                <a:cs typeface="Courier New" panose="02070309020205020404" pitchFamily="49" charset="0"/>
-              </a:rPr>
-              <a:t>cells</a:t>
-            </a:r>
-            <a:r>
-              <a:rPr lang="it-IT">
-                <a:cs typeface="Courier New" panose="02070309020205020404" pitchFamily="49" charset="0"/>
-              </a:rPr>
-              <a:t>. </a:t>
-            </a:r>
-            <a:r>
-              <a:rPr lang="it-IT" err="1">
-                <a:cs typeface="Courier New" panose="02070309020205020404" pitchFamily="49" charset="0"/>
-              </a:rPr>
-              <a:t>Examples</a:t>
-            </a:r>
-            <a:r>
-              <a:rPr lang="it-IT">
-                <a:cs typeface="Courier New" panose="02070309020205020404" pitchFamily="49" charset="0"/>
-              </a:rPr>
-              <a:t> are key.</a:t>
-            </a:r>
-          </a:p>
-          <a:p>
-            <a:endParaRPr lang="it-IT">
+            <a:endParaRPr lang="it-IT" dirty="0">
               <a:latin typeface="Courier New" panose="02070309020205020404" pitchFamily="49" charset="0"/>
               <a:cs typeface="Courier New" panose="02070309020205020404" pitchFamily="49" charset="0"/>
             </a:endParaRPr>
@@ -10271,7 +11642,7 @@
           <a:lstStyle/>
           <a:p>
             <a:r>
-              <a:rPr lang="it-IT" err="1"/>
+              <a:rPr lang="it-IT" dirty="0" err="1"/>
               <a:t>Metagol</a:t>
             </a:r>
             <a:endParaRPr lang="it-IT" dirty="0"/>
@@ -12588,7 +13959,15 @@
             </a:r>
             <a:r>
               <a:rPr lang="it-IT" sz="1600" dirty="0"/>
-              <a:t> one more </a:t>
+              <a:t> one </a:t>
+            </a:r>
+            <a:r>
+              <a:rPr lang="it-IT" sz="1600" dirty="0" err="1"/>
+              <a:t>added</a:t>
+            </a:r>
+            <a:r>
+              <a:rPr lang="it-IT" sz="1600" dirty="0"/>
+              <a:t> </a:t>
             </a:r>
             <a:r>
               <a:rPr lang="it-IT" sz="1600" dirty="0" err="1"/>
@@ -12604,7 +13983,7 @@
             </a:r>
             <a:r>
               <a:rPr lang="it-IT" sz="1600" dirty="0"/>
-              <a:t> one performance.</a:t>
+              <a:t> on the performance.</a:t>
             </a:r>
           </a:p>
           <a:p>
@@ -13114,4 +14493,299 @@
     </a:ext>
   </a:extLst>
 </a:theme>
+</file>
+
+<file path=ppt/theme/theme2.xml><?xml version="1.0" encoding="utf-8"?>
+<a:theme xmlns:a="http://schemas.openxmlformats.org/drawingml/2006/main" name="Tema di Office">
+  <a:themeElements>
+    <a:clrScheme name="Office">
+      <a:dk1>
+        <a:sysClr val="windowText" lastClr="000000"/>
+      </a:dk1>
+      <a:lt1>
+        <a:sysClr val="window" lastClr="FFFFFF"/>
+      </a:lt1>
+      <a:dk2>
+        <a:srgbClr val="44546A"/>
+      </a:dk2>
+      <a:lt2>
+        <a:srgbClr val="E7E6E6"/>
+      </a:lt2>
+      <a:accent1>
+        <a:srgbClr val="4472C4"/>
+      </a:accent1>
+      <a:accent2>
+        <a:srgbClr val="ED7D31"/>
+      </a:accent2>
+      <a:accent3>
+        <a:srgbClr val="A5A5A5"/>
+      </a:accent3>
+      <a:accent4>
+        <a:srgbClr val="FFC000"/>
+      </a:accent4>
+      <a:accent5>
+        <a:srgbClr val="5B9BD5"/>
+      </a:accent5>
+      <a:accent6>
+        <a:srgbClr val="70AD47"/>
+      </a:accent6>
+      <a:hlink>
+        <a:srgbClr val="0563C1"/>
+      </a:hlink>
+      <a:folHlink>
+        <a:srgbClr val="954F72"/>
+      </a:folHlink>
+    </a:clrScheme>
+    <a:fontScheme name="Office">
+      <a:majorFont>
+        <a:latin typeface="Calibri Light" panose="020F0302020204030204"/>
+        <a:ea typeface=""/>
+        <a:cs typeface=""/>
+        <a:font script="Jpan" typeface="游ゴシック Light"/>
+        <a:font script="Hang" typeface="맑은 고딕"/>
+        <a:font script="Hans" typeface="等线 Light"/>
+        <a:font script="Hant" typeface="新細明體"/>
+        <a:font script="Arab" typeface="Times New Roman"/>
+        <a:font script="Hebr" typeface="Times New Roman"/>
+        <a:font script="Thai" typeface="Angsana New"/>
+        <a:font script="Ethi" typeface="Nyala"/>
+        <a:font script="Beng" typeface="Vrinda"/>
+        <a:font script="Gujr" typeface="Shruti"/>
+        <a:font script="Khmr" typeface="MoolBoran"/>
+        <a:font script="Knda" typeface="Tunga"/>
+        <a:font script="Guru" typeface="Raavi"/>
+        <a:font script="Cans" typeface="Euphemia"/>
+        <a:font script="Cher" typeface="Plantagenet Cherokee"/>
+        <a:font script="Yiii" typeface="Microsoft Yi Baiti"/>
+        <a:font script="Tibt" typeface="Microsoft Himalaya"/>
+        <a:font script="Thaa" typeface="MV Boli"/>
+        <a:font script="Deva" typeface="Mangal"/>
+        <a:font script="Telu" typeface="Gautami"/>
+        <a:font script="Taml" typeface="Latha"/>
+        <a:font script="Syrc" typeface="Estrangelo Edessa"/>
+        <a:font script="Orya" typeface="Kalinga"/>
+        <a:font script="Mlym" typeface="Kartika"/>
+        <a:font script="Laoo" typeface="DokChampa"/>
+        <a:font script="Sinh" typeface="Iskoola Pota"/>
+        <a:font script="Mong" typeface="Mongolian Baiti"/>
+        <a:font script="Viet" typeface="Times New Roman"/>
+        <a:font script="Uigh" typeface="Microsoft Uighur"/>
+        <a:font script="Geor" typeface="Sylfaen"/>
+        <a:font script="Armn" typeface="Arial"/>
+        <a:font script="Bugi" typeface="Leelawadee UI"/>
+        <a:font script="Bopo" typeface="Microsoft JhengHei"/>
+        <a:font script="Java" typeface="Javanese Text"/>
+        <a:font script="Lisu" typeface="Segoe UI"/>
+        <a:font script="Mymr" typeface="Myanmar Text"/>
+        <a:font script="Nkoo" typeface="Ebrima"/>
+        <a:font script="Olck" typeface="Nirmala UI"/>
+        <a:font script="Osma" typeface="Ebrima"/>
+        <a:font script="Phag" typeface="Phagspa"/>
+        <a:font script="Syrn" typeface="Estrangelo Edessa"/>
+        <a:font script="Syrj" typeface="Estrangelo Edessa"/>
+        <a:font script="Syre" typeface="Estrangelo Edessa"/>
+        <a:font script="Sora" typeface="Nirmala UI"/>
+        <a:font script="Tale" typeface="Microsoft Tai Le"/>
+        <a:font script="Talu" typeface="Microsoft New Tai Lue"/>
+        <a:font script="Tfng" typeface="Ebrima"/>
+      </a:majorFont>
+      <a:minorFont>
+        <a:latin typeface="Calibri" panose="020F0502020204030204"/>
+        <a:ea typeface=""/>
+        <a:cs typeface=""/>
+        <a:font script="Jpan" typeface="游ゴシック"/>
+        <a:font script="Hang" typeface="맑은 고딕"/>
+        <a:font script="Hans" typeface="等线"/>
+        <a:font script="Hant" typeface="新細明體"/>
+        <a:font script="Arab" typeface="Arial"/>
+        <a:font script="Hebr" typeface="Arial"/>
+        <a:font script="Thai" typeface="Cordia New"/>
+        <a:font script="Ethi" typeface="Nyala"/>
+        <a:font script="Beng" typeface="Vrinda"/>
+        <a:font script="Gujr" typeface="Shruti"/>
+        <a:font script="Khmr" typeface="DaunPenh"/>
+        <a:font script="Knda" typeface="Tunga"/>
+        <a:font script="Guru" typeface="Raavi"/>
+        <a:font script="Cans" typeface="Euphemia"/>
+        <a:font script="Cher" typeface="Plantagenet Cherokee"/>
+        <a:font script="Yiii" typeface="Microsoft Yi Baiti"/>
+        <a:font script="Tibt" typeface="Microsoft Himalaya"/>
+        <a:font script="Thaa" typeface="MV Boli"/>
+        <a:font script="Deva" typeface="Mangal"/>
+        <a:font script="Telu" typeface="Gautami"/>
+        <a:font script="Taml" typeface="Latha"/>
+        <a:font script="Syrc" typeface="Estrangelo Edessa"/>
+        <a:font script="Orya" typeface="Kalinga"/>
+        <a:font script="Mlym" typeface="Kartika"/>
+        <a:font script="Laoo" typeface="DokChampa"/>
+        <a:font script="Sinh" typeface="Iskoola Pota"/>
+        <a:font script="Mong" typeface="Mongolian Baiti"/>
+        <a:font script="Viet" typeface="Arial"/>
+        <a:font script="Uigh" typeface="Microsoft Uighur"/>
+        <a:font script="Geor" typeface="Sylfaen"/>
+        <a:font script="Armn" typeface="Arial"/>
+        <a:font script="Bugi" typeface="Leelawadee UI"/>
+        <a:font script="Bopo" typeface="Microsoft JhengHei"/>
+        <a:font script="Java" typeface="Javanese Text"/>
+        <a:font script="Lisu" typeface="Segoe UI"/>
+        <a:font script="Mymr" typeface="Myanmar Text"/>
+        <a:font script="Nkoo" typeface="Ebrima"/>
+        <a:font script="Olck" typeface="Nirmala UI"/>
+        <a:font script="Osma" typeface="Ebrima"/>
+        <a:font script="Phag" typeface="Phagspa"/>
+        <a:font script="Syrn" typeface="Estrangelo Edessa"/>
+        <a:font script="Syrj" typeface="Estrangelo Edessa"/>
+        <a:font script="Syre" typeface="Estrangelo Edessa"/>
+        <a:font script="Sora" typeface="Nirmala UI"/>
+        <a:font script="Tale" typeface="Microsoft Tai Le"/>
+        <a:font script="Talu" typeface="Microsoft New Tai Lue"/>
+        <a:font script="Tfng" typeface="Ebrima"/>
+      </a:minorFont>
+    </a:fontScheme>
+    <a:fmtScheme name="Office">
+      <a:fillStyleLst>
+        <a:solidFill>
+          <a:schemeClr val="phClr"/>
+        </a:solidFill>
+        <a:gradFill rotWithShape="1">
+          <a:gsLst>
+            <a:gs pos="0">
+              <a:schemeClr val="phClr">
+                <a:lumMod val="110000"/>
+                <a:satMod val="105000"/>
+                <a:tint val="67000"/>
+              </a:schemeClr>
+            </a:gs>
+            <a:gs pos="50000">
+              <a:schemeClr val="phClr">
+                <a:lumMod val="105000"/>
+                <a:satMod val="103000"/>
+                <a:tint val="73000"/>
+              </a:schemeClr>
+            </a:gs>
+            <a:gs pos="100000">
+              <a:schemeClr val="phClr">
+                <a:lumMod val="105000"/>
+                <a:satMod val="109000"/>
+                <a:tint val="81000"/>
+              </a:schemeClr>
+            </a:gs>
+          </a:gsLst>
+          <a:lin ang="5400000" scaled="0"/>
+        </a:gradFill>
+        <a:gradFill rotWithShape="1">
+          <a:gsLst>
+            <a:gs pos="0">
+              <a:schemeClr val="phClr">
+                <a:satMod val="103000"/>
+                <a:lumMod val="102000"/>
+                <a:tint val="94000"/>
+              </a:schemeClr>
+            </a:gs>
+            <a:gs pos="50000">
+              <a:schemeClr val="phClr">
+                <a:satMod val="110000"/>
+                <a:lumMod val="100000"/>
+                <a:shade val="100000"/>
+              </a:schemeClr>
+            </a:gs>
+            <a:gs pos="100000">
+              <a:schemeClr val="phClr">
+                <a:lumMod val="99000"/>
+                <a:satMod val="120000"/>
+                <a:shade val="78000"/>
+              </a:schemeClr>
+            </a:gs>
+          </a:gsLst>
+          <a:lin ang="5400000" scaled="0"/>
+        </a:gradFill>
+      </a:fillStyleLst>
+      <a:lnStyleLst>
+        <a:ln w="6350" cap="flat" cmpd="sng" algn="ctr">
+          <a:solidFill>
+            <a:schemeClr val="phClr"/>
+          </a:solidFill>
+          <a:prstDash val="solid"/>
+          <a:miter lim="800000"/>
+        </a:ln>
+        <a:ln w="12700" cap="flat" cmpd="sng" algn="ctr">
+          <a:solidFill>
+            <a:schemeClr val="phClr"/>
+          </a:solidFill>
+          <a:prstDash val="solid"/>
+          <a:miter lim="800000"/>
+        </a:ln>
+        <a:ln w="19050" cap="flat" cmpd="sng" algn="ctr">
+          <a:solidFill>
+            <a:schemeClr val="phClr"/>
+          </a:solidFill>
+          <a:prstDash val="solid"/>
+          <a:miter lim="800000"/>
+        </a:ln>
+      </a:lnStyleLst>
+      <a:effectStyleLst>
+        <a:effectStyle>
+          <a:effectLst/>
+        </a:effectStyle>
+        <a:effectStyle>
+          <a:effectLst/>
+        </a:effectStyle>
+        <a:effectStyle>
+          <a:effectLst>
+            <a:outerShdw blurRad="57150" dist="19050" dir="5400000" algn="ctr" rotWithShape="0">
+              <a:srgbClr val="000000">
+                <a:alpha val="63000"/>
+              </a:srgbClr>
+            </a:outerShdw>
+          </a:effectLst>
+        </a:effectStyle>
+      </a:effectStyleLst>
+      <a:bgFillStyleLst>
+        <a:solidFill>
+          <a:schemeClr val="phClr"/>
+        </a:solidFill>
+        <a:solidFill>
+          <a:schemeClr val="phClr">
+            <a:tint val="95000"/>
+            <a:satMod val="170000"/>
+          </a:schemeClr>
+        </a:solidFill>
+        <a:gradFill rotWithShape="1">
+          <a:gsLst>
+            <a:gs pos="0">
+              <a:schemeClr val="phClr">
+                <a:tint val="93000"/>
+                <a:satMod val="150000"/>
+                <a:shade val="98000"/>
+                <a:lumMod val="102000"/>
+              </a:schemeClr>
+            </a:gs>
+            <a:gs pos="50000">
+              <a:schemeClr val="phClr">
+                <a:tint val="98000"/>
+                <a:satMod val="130000"/>
+                <a:shade val="90000"/>
+                <a:lumMod val="103000"/>
+              </a:schemeClr>
+            </a:gs>
+            <a:gs pos="100000">
+              <a:schemeClr val="phClr">
+                <a:shade val="63000"/>
+                <a:satMod val="120000"/>
+              </a:schemeClr>
+            </a:gs>
+          </a:gsLst>
+          <a:lin ang="5400000" scaled="0"/>
+        </a:gradFill>
+      </a:bgFillStyleLst>
+    </a:fmtScheme>
+  </a:themeElements>
+  <a:objectDefaults/>
+  <a:extraClrSchemeLst/>
+  <a:extLst>
+    <a:ext uri="{05A4C25C-085E-4340-85A3-A5531E510DB2}">
+      <thm15:themeFamily xmlns:thm15="http://schemas.microsoft.com/office/thememl/2012/main" name="Office Theme" id="{62F939B6-93AF-4DB8-9C6B-D6C7DFDC589F}" vid="{4A3C46E8-61CC-4603-A589-7422A47A8E4A}"/>
+    </a:ext>
+  </a:extLst>
+</a:theme>
 </file>
</xml_diff>

<commit_message>
Small mods on report
</commit_message>
<xml_diff>
--- a/ATAI_Presentation.pptx
+++ b/ATAI_Presentation.pptx
@@ -25362,7 +25362,7 @@
             </a:r>
             <a:r>
               <a:rPr lang="en-US" sz="2400" dirty="0"/>
-              <a:t>are coordinates on the grid. </a:t>
+              <a:t>are coordinates. </a:t>
             </a:r>
           </a:p>
           <a:p>
@@ -25565,7 +25565,7 @@
             </a:r>
             <a:r>
               <a:rPr lang="en-US" sz="2400" dirty="0"/>
-              <a:t>are coordinates on the grid.</a:t>
+              <a:t>are coordinates.</a:t>
             </a:r>
           </a:p>
           <a:p>

</xml_diff>